<commit_message>
fixed paper format and edited figure 1
</commit_message>
<xml_diff>
--- a/latex/sc18/fig/cpdecomposition.pptx
+++ b/latex/sc18/fig/cpdecomposition.pptx
@@ -134,7 +134,7 @@
           <p:cNvPr id="2" name="Title 1">
             <a:extLst>
               <a:ext uri="{FF2B5EF4-FFF2-40B4-BE49-F238E27FC236}">
-                <a16:creationId xmlns:a16="http://schemas.microsoft.com/office/drawing/2014/main" id="{2203C950-46B6-B84F-B792-82887D8310B5}"/>
+                <a16:creationId xmlns:a16="http://schemas.microsoft.com/office/drawing/2014/main" xmlns="" id="{2203C950-46B6-B84F-B792-82887D8310B5}"/>
               </a:ext>
             </a:extLst>
           </p:cNvPr>
@@ -171,7 +171,7 @@
           <p:cNvPr id="3" name="Subtitle 2">
             <a:extLst>
               <a:ext uri="{FF2B5EF4-FFF2-40B4-BE49-F238E27FC236}">
-                <a16:creationId xmlns:a16="http://schemas.microsoft.com/office/drawing/2014/main" id="{F0ACF1D1-5BD1-7041-859C-37F5149B02E1}"/>
+                <a16:creationId xmlns:a16="http://schemas.microsoft.com/office/drawing/2014/main" xmlns="" id="{F0ACF1D1-5BD1-7041-859C-37F5149B02E1}"/>
               </a:ext>
             </a:extLst>
           </p:cNvPr>
@@ -241,7 +241,7 @@
           <p:cNvPr id="4" name="Date Placeholder 3">
             <a:extLst>
               <a:ext uri="{FF2B5EF4-FFF2-40B4-BE49-F238E27FC236}">
-                <a16:creationId xmlns:a16="http://schemas.microsoft.com/office/drawing/2014/main" id="{ED11034F-D1C3-D044-8EE1-833B6BA6A3CD}"/>
+                <a16:creationId xmlns:a16="http://schemas.microsoft.com/office/drawing/2014/main" xmlns="" id="{ED11034F-D1C3-D044-8EE1-833B6BA6A3CD}"/>
               </a:ext>
             </a:extLst>
           </p:cNvPr>
@@ -259,7 +259,7 @@
           <a:p>
             <a:fld id="{FBAD1D64-A1EB-234F-98E8-4C3AB8D17E77}" type="datetimeFigureOut">
               <a:rPr lang="en-US" smtClean="0"/>
-              <a:t>3/28/18</a:t>
+              <a:t>5/17/18</a:t>
             </a:fld>
             <a:endParaRPr lang="en-US"/>
           </a:p>
@@ -270,7 +270,7 @@
           <p:cNvPr id="5" name="Footer Placeholder 4">
             <a:extLst>
               <a:ext uri="{FF2B5EF4-FFF2-40B4-BE49-F238E27FC236}">
-                <a16:creationId xmlns:a16="http://schemas.microsoft.com/office/drawing/2014/main" id="{C0F1744A-F092-1840-812F-DC5ED640861C}"/>
+                <a16:creationId xmlns:a16="http://schemas.microsoft.com/office/drawing/2014/main" xmlns="" id="{C0F1744A-F092-1840-812F-DC5ED640861C}"/>
               </a:ext>
             </a:extLst>
           </p:cNvPr>
@@ -295,7 +295,7 @@
           <p:cNvPr id="6" name="Slide Number Placeholder 5">
             <a:extLst>
               <a:ext uri="{FF2B5EF4-FFF2-40B4-BE49-F238E27FC236}">
-                <a16:creationId xmlns:a16="http://schemas.microsoft.com/office/drawing/2014/main" id="{ED4E1BDC-4A2B-0644-87D8-BE6BB18B4709}"/>
+                <a16:creationId xmlns:a16="http://schemas.microsoft.com/office/drawing/2014/main" xmlns="" id="{ED4E1BDC-4A2B-0644-87D8-BE6BB18B4709}"/>
               </a:ext>
             </a:extLst>
           </p:cNvPr>
@@ -354,7 +354,7 @@
           <p:cNvPr id="2" name="Title 1">
             <a:extLst>
               <a:ext uri="{FF2B5EF4-FFF2-40B4-BE49-F238E27FC236}">
-                <a16:creationId xmlns:a16="http://schemas.microsoft.com/office/drawing/2014/main" id="{304313E6-D5F8-704E-9964-3C4BFDBAE551}"/>
+                <a16:creationId xmlns:a16="http://schemas.microsoft.com/office/drawing/2014/main" xmlns="" id="{304313E6-D5F8-704E-9964-3C4BFDBAE551}"/>
               </a:ext>
             </a:extLst>
           </p:cNvPr>
@@ -382,7 +382,7 @@
           <p:cNvPr id="3" name="Vertical Text Placeholder 2">
             <a:extLst>
               <a:ext uri="{FF2B5EF4-FFF2-40B4-BE49-F238E27FC236}">
-                <a16:creationId xmlns:a16="http://schemas.microsoft.com/office/drawing/2014/main" id="{A384E0FF-07E9-ED40-B298-5196D2255A94}"/>
+                <a16:creationId xmlns:a16="http://schemas.microsoft.com/office/drawing/2014/main" xmlns="" id="{A384E0FF-07E9-ED40-B298-5196D2255A94}"/>
               </a:ext>
             </a:extLst>
           </p:cNvPr>
@@ -439,7 +439,7 @@
           <p:cNvPr id="4" name="Date Placeholder 3">
             <a:extLst>
               <a:ext uri="{FF2B5EF4-FFF2-40B4-BE49-F238E27FC236}">
-                <a16:creationId xmlns:a16="http://schemas.microsoft.com/office/drawing/2014/main" id="{6161D46B-6093-6640-8759-DFDA9A4F84A5}"/>
+                <a16:creationId xmlns:a16="http://schemas.microsoft.com/office/drawing/2014/main" xmlns="" id="{6161D46B-6093-6640-8759-DFDA9A4F84A5}"/>
               </a:ext>
             </a:extLst>
           </p:cNvPr>
@@ -457,7 +457,7 @@
           <a:p>
             <a:fld id="{FBAD1D64-A1EB-234F-98E8-4C3AB8D17E77}" type="datetimeFigureOut">
               <a:rPr lang="en-US" smtClean="0"/>
-              <a:t>3/28/18</a:t>
+              <a:t>5/17/18</a:t>
             </a:fld>
             <a:endParaRPr lang="en-US"/>
           </a:p>
@@ -468,7 +468,7 @@
           <p:cNvPr id="5" name="Footer Placeholder 4">
             <a:extLst>
               <a:ext uri="{FF2B5EF4-FFF2-40B4-BE49-F238E27FC236}">
-                <a16:creationId xmlns:a16="http://schemas.microsoft.com/office/drawing/2014/main" id="{C4B4DB2F-D5E7-7849-B114-FDD827B2E4A8}"/>
+                <a16:creationId xmlns:a16="http://schemas.microsoft.com/office/drawing/2014/main" xmlns="" id="{C4B4DB2F-D5E7-7849-B114-FDD827B2E4A8}"/>
               </a:ext>
             </a:extLst>
           </p:cNvPr>
@@ -493,7 +493,7 @@
           <p:cNvPr id="6" name="Slide Number Placeholder 5">
             <a:extLst>
               <a:ext uri="{FF2B5EF4-FFF2-40B4-BE49-F238E27FC236}">
-                <a16:creationId xmlns:a16="http://schemas.microsoft.com/office/drawing/2014/main" id="{9B6955DF-9093-1249-BC76-A5BC95B34854}"/>
+                <a16:creationId xmlns:a16="http://schemas.microsoft.com/office/drawing/2014/main" xmlns="" id="{9B6955DF-9093-1249-BC76-A5BC95B34854}"/>
               </a:ext>
             </a:extLst>
           </p:cNvPr>
@@ -552,7 +552,7 @@
           <p:cNvPr id="2" name="Vertical Title 1">
             <a:extLst>
               <a:ext uri="{FF2B5EF4-FFF2-40B4-BE49-F238E27FC236}">
-                <a16:creationId xmlns:a16="http://schemas.microsoft.com/office/drawing/2014/main" id="{A30B0EFD-13DE-024E-8BAA-FC5554B0857C}"/>
+                <a16:creationId xmlns:a16="http://schemas.microsoft.com/office/drawing/2014/main" xmlns="" id="{A30B0EFD-13DE-024E-8BAA-FC5554B0857C}"/>
               </a:ext>
             </a:extLst>
           </p:cNvPr>
@@ -585,7 +585,7 @@
           <p:cNvPr id="3" name="Vertical Text Placeholder 2">
             <a:extLst>
               <a:ext uri="{FF2B5EF4-FFF2-40B4-BE49-F238E27FC236}">
-                <a16:creationId xmlns:a16="http://schemas.microsoft.com/office/drawing/2014/main" id="{CE34D38D-5161-CB44-95B5-EECC796F9D84}"/>
+                <a16:creationId xmlns:a16="http://schemas.microsoft.com/office/drawing/2014/main" xmlns="" id="{CE34D38D-5161-CB44-95B5-EECC796F9D84}"/>
               </a:ext>
             </a:extLst>
           </p:cNvPr>
@@ -647,7 +647,7 @@
           <p:cNvPr id="4" name="Date Placeholder 3">
             <a:extLst>
               <a:ext uri="{FF2B5EF4-FFF2-40B4-BE49-F238E27FC236}">
-                <a16:creationId xmlns:a16="http://schemas.microsoft.com/office/drawing/2014/main" id="{04B86DA9-B058-8A47-BB01-86EE1FE7EC88}"/>
+                <a16:creationId xmlns:a16="http://schemas.microsoft.com/office/drawing/2014/main" xmlns="" id="{04B86DA9-B058-8A47-BB01-86EE1FE7EC88}"/>
               </a:ext>
             </a:extLst>
           </p:cNvPr>
@@ -665,7 +665,7 @@
           <a:p>
             <a:fld id="{FBAD1D64-A1EB-234F-98E8-4C3AB8D17E77}" type="datetimeFigureOut">
               <a:rPr lang="en-US" smtClean="0"/>
-              <a:t>3/28/18</a:t>
+              <a:t>5/17/18</a:t>
             </a:fld>
             <a:endParaRPr lang="en-US"/>
           </a:p>
@@ -676,7 +676,7 @@
           <p:cNvPr id="5" name="Footer Placeholder 4">
             <a:extLst>
               <a:ext uri="{FF2B5EF4-FFF2-40B4-BE49-F238E27FC236}">
-                <a16:creationId xmlns:a16="http://schemas.microsoft.com/office/drawing/2014/main" id="{9FD0E609-1F7D-2049-9D59-8CDD72B63D02}"/>
+                <a16:creationId xmlns:a16="http://schemas.microsoft.com/office/drawing/2014/main" xmlns="" id="{9FD0E609-1F7D-2049-9D59-8CDD72B63D02}"/>
               </a:ext>
             </a:extLst>
           </p:cNvPr>
@@ -701,7 +701,7 @@
           <p:cNvPr id="6" name="Slide Number Placeholder 5">
             <a:extLst>
               <a:ext uri="{FF2B5EF4-FFF2-40B4-BE49-F238E27FC236}">
-                <a16:creationId xmlns:a16="http://schemas.microsoft.com/office/drawing/2014/main" id="{F2B51CAD-0317-9348-AA27-C96DCA3C8BD6}"/>
+                <a16:creationId xmlns:a16="http://schemas.microsoft.com/office/drawing/2014/main" xmlns="" id="{F2B51CAD-0317-9348-AA27-C96DCA3C8BD6}"/>
               </a:ext>
             </a:extLst>
           </p:cNvPr>
@@ -760,7 +760,7 @@
           <p:cNvPr id="2" name="Title 1">
             <a:extLst>
               <a:ext uri="{FF2B5EF4-FFF2-40B4-BE49-F238E27FC236}">
-                <a16:creationId xmlns:a16="http://schemas.microsoft.com/office/drawing/2014/main" id="{DF417ACB-4C6D-8B44-9500-61D527C3E8BC}"/>
+                <a16:creationId xmlns:a16="http://schemas.microsoft.com/office/drawing/2014/main" xmlns="" id="{DF417ACB-4C6D-8B44-9500-61D527C3E8BC}"/>
               </a:ext>
             </a:extLst>
           </p:cNvPr>
@@ -788,7 +788,7 @@
           <p:cNvPr id="3" name="Content Placeholder 2">
             <a:extLst>
               <a:ext uri="{FF2B5EF4-FFF2-40B4-BE49-F238E27FC236}">
-                <a16:creationId xmlns:a16="http://schemas.microsoft.com/office/drawing/2014/main" id="{4C47F0AA-7AEF-1B4F-9E2D-1B6C6077E234}"/>
+                <a16:creationId xmlns:a16="http://schemas.microsoft.com/office/drawing/2014/main" xmlns="" id="{4C47F0AA-7AEF-1B4F-9E2D-1B6C6077E234}"/>
               </a:ext>
             </a:extLst>
           </p:cNvPr>
@@ -845,7 +845,7 @@
           <p:cNvPr id="4" name="Date Placeholder 3">
             <a:extLst>
               <a:ext uri="{FF2B5EF4-FFF2-40B4-BE49-F238E27FC236}">
-                <a16:creationId xmlns:a16="http://schemas.microsoft.com/office/drawing/2014/main" id="{8FC9C071-6594-3C4F-9443-33228CBC69F5}"/>
+                <a16:creationId xmlns:a16="http://schemas.microsoft.com/office/drawing/2014/main" xmlns="" id="{8FC9C071-6594-3C4F-9443-33228CBC69F5}"/>
               </a:ext>
             </a:extLst>
           </p:cNvPr>
@@ -863,7 +863,7 @@
           <a:p>
             <a:fld id="{FBAD1D64-A1EB-234F-98E8-4C3AB8D17E77}" type="datetimeFigureOut">
               <a:rPr lang="en-US" smtClean="0"/>
-              <a:t>3/28/18</a:t>
+              <a:t>5/17/18</a:t>
             </a:fld>
             <a:endParaRPr lang="en-US"/>
           </a:p>
@@ -874,7 +874,7 @@
           <p:cNvPr id="5" name="Footer Placeholder 4">
             <a:extLst>
               <a:ext uri="{FF2B5EF4-FFF2-40B4-BE49-F238E27FC236}">
-                <a16:creationId xmlns:a16="http://schemas.microsoft.com/office/drawing/2014/main" id="{248550B1-D24C-674E-8377-A112FEBD4592}"/>
+                <a16:creationId xmlns:a16="http://schemas.microsoft.com/office/drawing/2014/main" xmlns="" id="{248550B1-D24C-674E-8377-A112FEBD4592}"/>
               </a:ext>
             </a:extLst>
           </p:cNvPr>
@@ -899,7 +899,7 @@
           <p:cNvPr id="6" name="Slide Number Placeholder 5">
             <a:extLst>
               <a:ext uri="{FF2B5EF4-FFF2-40B4-BE49-F238E27FC236}">
-                <a16:creationId xmlns:a16="http://schemas.microsoft.com/office/drawing/2014/main" id="{5ED0A860-A7BD-DF4A-AE51-D57492204E47}"/>
+                <a16:creationId xmlns:a16="http://schemas.microsoft.com/office/drawing/2014/main" xmlns="" id="{5ED0A860-A7BD-DF4A-AE51-D57492204E47}"/>
               </a:ext>
             </a:extLst>
           </p:cNvPr>
@@ -958,7 +958,7 @@
           <p:cNvPr id="2" name="Title 1">
             <a:extLst>
               <a:ext uri="{FF2B5EF4-FFF2-40B4-BE49-F238E27FC236}">
-                <a16:creationId xmlns:a16="http://schemas.microsoft.com/office/drawing/2014/main" id="{89D29632-E379-274F-B024-5BD89AF240AE}"/>
+                <a16:creationId xmlns:a16="http://schemas.microsoft.com/office/drawing/2014/main" xmlns="" id="{89D29632-E379-274F-B024-5BD89AF240AE}"/>
               </a:ext>
             </a:extLst>
           </p:cNvPr>
@@ -995,7 +995,7 @@
           <p:cNvPr id="3" name="Text Placeholder 2">
             <a:extLst>
               <a:ext uri="{FF2B5EF4-FFF2-40B4-BE49-F238E27FC236}">
-                <a16:creationId xmlns:a16="http://schemas.microsoft.com/office/drawing/2014/main" id="{7641B6AB-FD2A-F44F-8C01-A2EDF28376F7}"/>
+                <a16:creationId xmlns:a16="http://schemas.microsoft.com/office/drawing/2014/main" xmlns="" id="{7641B6AB-FD2A-F44F-8C01-A2EDF28376F7}"/>
               </a:ext>
             </a:extLst>
           </p:cNvPr>
@@ -1120,7 +1120,7 @@
           <p:cNvPr id="4" name="Date Placeholder 3">
             <a:extLst>
               <a:ext uri="{FF2B5EF4-FFF2-40B4-BE49-F238E27FC236}">
-                <a16:creationId xmlns:a16="http://schemas.microsoft.com/office/drawing/2014/main" id="{88F60399-0926-3A43-913C-A9EF64CEFD8E}"/>
+                <a16:creationId xmlns:a16="http://schemas.microsoft.com/office/drawing/2014/main" xmlns="" id="{88F60399-0926-3A43-913C-A9EF64CEFD8E}"/>
               </a:ext>
             </a:extLst>
           </p:cNvPr>
@@ -1138,7 +1138,7 @@
           <a:p>
             <a:fld id="{FBAD1D64-A1EB-234F-98E8-4C3AB8D17E77}" type="datetimeFigureOut">
               <a:rPr lang="en-US" smtClean="0"/>
-              <a:t>3/28/18</a:t>
+              <a:t>5/17/18</a:t>
             </a:fld>
             <a:endParaRPr lang="en-US"/>
           </a:p>
@@ -1149,7 +1149,7 @@
           <p:cNvPr id="5" name="Footer Placeholder 4">
             <a:extLst>
               <a:ext uri="{FF2B5EF4-FFF2-40B4-BE49-F238E27FC236}">
-                <a16:creationId xmlns:a16="http://schemas.microsoft.com/office/drawing/2014/main" id="{4F230852-8F85-E245-9D77-5EDA1D133F12}"/>
+                <a16:creationId xmlns:a16="http://schemas.microsoft.com/office/drawing/2014/main" xmlns="" id="{4F230852-8F85-E245-9D77-5EDA1D133F12}"/>
               </a:ext>
             </a:extLst>
           </p:cNvPr>
@@ -1174,7 +1174,7 @@
           <p:cNvPr id="6" name="Slide Number Placeholder 5">
             <a:extLst>
               <a:ext uri="{FF2B5EF4-FFF2-40B4-BE49-F238E27FC236}">
-                <a16:creationId xmlns:a16="http://schemas.microsoft.com/office/drawing/2014/main" id="{551AF32E-C6DD-D449-A5A5-C77E2B2D0D4F}"/>
+                <a16:creationId xmlns:a16="http://schemas.microsoft.com/office/drawing/2014/main" xmlns="" id="{551AF32E-C6DD-D449-A5A5-C77E2B2D0D4F}"/>
               </a:ext>
             </a:extLst>
           </p:cNvPr>
@@ -1233,7 +1233,7 @@
           <p:cNvPr id="2" name="Title 1">
             <a:extLst>
               <a:ext uri="{FF2B5EF4-FFF2-40B4-BE49-F238E27FC236}">
-                <a16:creationId xmlns:a16="http://schemas.microsoft.com/office/drawing/2014/main" id="{6CD16079-6355-394C-8CD8-D62BBAD3E909}"/>
+                <a16:creationId xmlns:a16="http://schemas.microsoft.com/office/drawing/2014/main" xmlns="" id="{6CD16079-6355-394C-8CD8-D62BBAD3E909}"/>
               </a:ext>
             </a:extLst>
           </p:cNvPr>
@@ -1261,7 +1261,7 @@
           <p:cNvPr id="3" name="Content Placeholder 2">
             <a:extLst>
               <a:ext uri="{FF2B5EF4-FFF2-40B4-BE49-F238E27FC236}">
-                <a16:creationId xmlns:a16="http://schemas.microsoft.com/office/drawing/2014/main" id="{2BA8C904-7337-644F-AF2F-F75E94F21B46}"/>
+                <a16:creationId xmlns:a16="http://schemas.microsoft.com/office/drawing/2014/main" xmlns="" id="{2BA8C904-7337-644F-AF2F-F75E94F21B46}"/>
               </a:ext>
             </a:extLst>
           </p:cNvPr>
@@ -1323,7 +1323,7 @@
           <p:cNvPr id="4" name="Content Placeholder 3">
             <a:extLst>
               <a:ext uri="{FF2B5EF4-FFF2-40B4-BE49-F238E27FC236}">
-                <a16:creationId xmlns:a16="http://schemas.microsoft.com/office/drawing/2014/main" id="{73F8FA93-210D-DA4D-BF09-1487451AD9D0}"/>
+                <a16:creationId xmlns:a16="http://schemas.microsoft.com/office/drawing/2014/main" xmlns="" id="{73F8FA93-210D-DA4D-BF09-1487451AD9D0}"/>
               </a:ext>
             </a:extLst>
           </p:cNvPr>
@@ -1385,7 +1385,7 @@
           <p:cNvPr id="5" name="Date Placeholder 4">
             <a:extLst>
               <a:ext uri="{FF2B5EF4-FFF2-40B4-BE49-F238E27FC236}">
-                <a16:creationId xmlns:a16="http://schemas.microsoft.com/office/drawing/2014/main" id="{3234240E-D099-4944-9811-1C1901DC1E3D}"/>
+                <a16:creationId xmlns:a16="http://schemas.microsoft.com/office/drawing/2014/main" xmlns="" id="{3234240E-D099-4944-9811-1C1901DC1E3D}"/>
               </a:ext>
             </a:extLst>
           </p:cNvPr>
@@ -1403,7 +1403,7 @@
           <a:p>
             <a:fld id="{FBAD1D64-A1EB-234F-98E8-4C3AB8D17E77}" type="datetimeFigureOut">
               <a:rPr lang="en-US" smtClean="0"/>
-              <a:t>3/28/18</a:t>
+              <a:t>5/17/18</a:t>
             </a:fld>
             <a:endParaRPr lang="en-US"/>
           </a:p>
@@ -1414,7 +1414,7 @@
           <p:cNvPr id="6" name="Footer Placeholder 5">
             <a:extLst>
               <a:ext uri="{FF2B5EF4-FFF2-40B4-BE49-F238E27FC236}">
-                <a16:creationId xmlns:a16="http://schemas.microsoft.com/office/drawing/2014/main" id="{8D45CAD9-E591-EB42-B33A-6235DBAFC344}"/>
+                <a16:creationId xmlns:a16="http://schemas.microsoft.com/office/drawing/2014/main" xmlns="" id="{8D45CAD9-E591-EB42-B33A-6235DBAFC344}"/>
               </a:ext>
             </a:extLst>
           </p:cNvPr>
@@ -1439,7 +1439,7 @@
           <p:cNvPr id="7" name="Slide Number Placeholder 6">
             <a:extLst>
               <a:ext uri="{FF2B5EF4-FFF2-40B4-BE49-F238E27FC236}">
-                <a16:creationId xmlns:a16="http://schemas.microsoft.com/office/drawing/2014/main" id="{DFA8FF24-9B3B-0543-8B10-07F7305BDA20}"/>
+                <a16:creationId xmlns:a16="http://schemas.microsoft.com/office/drawing/2014/main" xmlns="" id="{DFA8FF24-9B3B-0543-8B10-07F7305BDA20}"/>
               </a:ext>
             </a:extLst>
           </p:cNvPr>
@@ -1498,7 +1498,7 @@
           <p:cNvPr id="2" name="Title 1">
             <a:extLst>
               <a:ext uri="{FF2B5EF4-FFF2-40B4-BE49-F238E27FC236}">
-                <a16:creationId xmlns:a16="http://schemas.microsoft.com/office/drawing/2014/main" id="{1896D4FC-F7DB-EF41-AA93-55EFE4319F5E}"/>
+                <a16:creationId xmlns:a16="http://schemas.microsoft.com/office/drawing/2014/main" xmlns="" id="{1896D4FC-F7DB-EF41-AA93-55EFE4319F5E}"/>
               </a:ext>
             </a:extLst>
           </p:cNvPr>
@@ -1531,7 +1531,7 @@
           <p:cNvPr id="3" name="Text Placeholder 2">
             <a:extLst>
               <a:ext uri="{FF2B5EF4-FFF2-40B4-BE49-F238E27FC236}">
-                <a16:creationId xmlns:a16="http://schemas.microsoft.com/office/drawing/2014/main" id="{59370946-C754-004C-A0F9-4003360114ED}"/>
+                <a16:creationId xmlns:a16="http://schemas.microsoft.com/office/drawing/2014/main" xmlns="" id="{59370946-C754-004C-A0F9-4003360114ED}"/>
               </a:ext>
             </a:extLst>
           </p:cNvPr>
@@ -1602,7 +1602,7 @@
           <p:cNvPr id="4" name="Content Placeholder 3">
             <a:extLst>
               <a:ext uri="{FF2B5EF4-FFF2-40B4-BE49-F238E27FC236}">
-                <a16:creationId xmlns:a16="http://schemas.microsoft.com/office/drawing/2014/main" id="{CAB44559-CFEB-6945-ADF2-F2892795B1DE}"/>
+                <a16:creationId xmlns:a16="http://schemas.microsoft.com/office/drawing/2014/main" xmlns="" id="{CAB44559-CFEB-6945-ADF2-F2892795B1DE}"/>
               </a:ext>
             </a:extLst>
           </p:cNvPr>
@@ -1664,7 +1664,7 @@
           <p:cNvPr id="5" name="Text Placeholder 4">
             <a:extLst>
               <a:ext uri="{FF2B5EF4-FFF2-40B4-BE49-F238E27FC236}">
-                <a16:creationId xmlns:a16="http://schemas.microsoft.com/office/drawing/2014/main" id="{F0FE1A74-3CC8-DA43-89D3-B76AAEB9BBC5}"/>
+                <a16:creationId xmlns:a16="http://schemas.microsoft.com/office/drawing/2014/main" xmlns="" id="{F0FE1A74-3CC8-DA43-89D3-B76AAEB9BBC5}"/>
               </a:ext>
             </a:extLst>
           </p:cNvPr>
@@ -1735,7 +1735,7 @@
           <p:cNvPr id="6" name="Content Placeholder 5">
             <a:extLst>
               <a:ext uri="{FF2B5EF4-FFF2-40B4-BE49-F238E27FC236}">
-                <a16:creationId xmlns:a16="http://schemas.microsoft.com/office/drawing/2014/main" id="{9B2081C8-D09F-7747-85E9-A264529AC2FC}"/>
+                <a16:creationId xmlns:a16="http://schemas.microsoft.com/office/drawing/2014/main" xmlns="" id="{9B2081C8-D09F-7747-85E9-A264529AC2FC}"/>
               </a:ext>
             </a:extLst>
           </p:cNvPr>
@@ -1797,7 +1797,7 @@
           <p:cNvPr id="7" name="Date Placeholder 6">
             <a:extLst>
               <a:ext uri="{FF2B5EF4-FFF2-40B4-BE49-F238E27FC236}">
-                <a16:creationId xmlns:a16="http://schemas.microsoft.com/office/drawing/2014/main" id="{3F6A04AF-FCF3-3340-BB37-756F75B86520}"/>
+                <a16:creationId xmlns:a16="http://schemas.microsoft.com/office/drawing/2014/main" xmlns="" id="{3F6A04AF-FCF3-3340-BB37-756F75B86520}"/>
               </a:ext>
             </a:extLst>
           </p:cNvPr>
@@ -1815,7 +1815,7 @@
           <a:p>
             <a:fld id="{FBAD1D64-A1EB-234F-98E8-4C3AB8D17E77}" type="datetimeFigureOut">
               <a:rPr lang="en-US" smtClean="0"/>
-              <a:t>3/28/18</a:t>
+              <a:t>5/17/18</a:t>
             </a:fld>
             <a:endParaRPr lang="en-US"/>
           </a:p>
@@ -1826,7 +1826,7 @@
           <p:cNvPr id="8" name="Footer Placeholder 7">
             <a:extLst>
               <a:ext uri="{FF2B5EF4-FFF2-40B4-BE49-F238E27FC236}">
-                <a16:creationId xmlns:a16="http://schemas.microsoft.com/office/drawing/2014/main" id="{541F9F76-9433-A84A-A148-7FEC28CFDFDD}"/>
+                <a16:creationId xmlns:a16="http://schemas.microsoft.com/office/drawing/2014/main" xmlns="" id="{541F9F76-9433-A84A-A148-7FEC28CFDFDD}"/>
               </a:ext>
             </a:extLst>
           </p:cNvPr>
@@ -1851,7 +1851,7 @@
           <p:cNvPr id="9" name="Slide Number Placeholder 8">
             <a:extLst>
               <a:ext uri="{FF2B5EF4-FFF2-40B4-BE49-F238E27FC236}">
-                <a16:creationId xmlns:a16="http://schemas.microsoft.com/office/drawing/2014/main" id="{F23C94D1-F433-E94F-A2F1-71013BCF6C7C}"/>
+                <a16:creationId xmlns:a16="http://schemas.microsoft.com/office/drawing/2014/main" xmlns="" id="{F23C94D1-F433-E94F-A2F1-71013BCF6C7C}"/>
               </a:ext>
             </a:extLst>
           </p:cNvPr>
@@ -1910,7 +1910,7 @@
           <p:cNvPr id="2" name="Title 1">
             <a:extLst>
               <a:ext uri="{FF2B5EF4-FFF2-40B4-BE49-F238E27FC236}">
-                <a16:creationId xmlns:a16="http://schemas.microsoft.com/office/drawing/2014/main" id="{7ED4F92F-9ABB-624E-9FF7-CD14162EE32A}"/>
+                <a16:creationId xmlns:a16="http://schemas.microsoft.com/office/drawing/2014/main" xmlns="" id="{7ED4F92F-9ABB-624E-9FF7-CD14162EE32A}"/>
               </a:ext>
             </a:extLst>
           </p:cNvPr>
@@ -1938,7 +1938,7 @@
           <p:cNvPr id="3" name="Date Placeholder 2">
             <a:extLst>
               <a:ext uri="{FF2B5EF4-FFF2-40B4-BE49-F238E27FC236}">
-                <a16:creationId xmlns:a16="http://schemas.microsoft.com/office/drawing/2014/main" id="{148C439F-4968-3F4F-BF83-0CCBB85CAFEF}"/>
+                <a16:creationId xmlns:a16="http://schemas.microsoft.com/office/drawing/2014/main" xmlns="" id="{148C439F-4968-3F4F-BF83-0CCBB85CAFEF}"/>
               </a:ext>
             </a:extLst>
           </p:cNvPr>
@@ -1956,7 +1956,7 @@
           <a:p>
             <a:fld id="{FBAD1D64-A1EB-234F-98E8-4C3AB8D17E77}" type="datetimeFigureOut">
               <a:rPr lang="en-US" smtClean="0"/>
-              <a:t>3/28/18</a:t>
+              <a:t>5/17/18</a:t>
             </a:fld>
             <a:endParaRPr lang="en-US"/>
           </a:p>
@@ -1967,7 +1967,7 @@
           <p:cNvPr id="4" name="Footer Placeholder 3">
             <a:extLst>
               <a:ext uri="{FF2B5EF4-FFF2-40B4-BE49-F238E27FC236}">
-                <a16:creationId xmlns:a16="http://schemas.microsoft.com/office/drawing/2014/main" id="{D9737FF7-4192-844F-9582-F2219BE3B3C2}"/>
+                <a16:creationId xmlns:a16="http://schemas.microsoft.com/office/drawing/2014/main" xmlns="" id="{D9737FF7-4192-844F-9582-F2219BE3B3C2}"/>
               </a:ext>
             </a:extLst>
           </p:cNvPr>
@@ -1992,7 +1992,7 @@
           <p:cNvPr id="5" name="Slide Number Placeholder 4">
             <a:extLst>
               <a:ext uri="{FF2B5EF4-FFF2-40B4-BE49-F238E27FC236}">
-                <a16:creationId xmlns:a16="http://schemas.microsoft.com/office/drawing/2014/main" id="{46C92447-511A-1D4F-8164-E23B0C79A777}"/>
+                <a16:creationId xmlns:a16="http://schemas.microsoft.com/office/drawing/2014/main" xmlns="" id="{46C92447-511A-1D4F-8164-E23B0C79A777}"/>
               </a:ext>
             </a:extLst>
           </p:cNvPr>
@@ -2051,7 +2051,7 @@
           <p:cNvPr id="2" name="Date Placeholder 1">
             <a:extLst>
               <a:ext uri="{FF2B5EF4-FFF2-40B4-BE49-F238E27FC236}">
-                <a16:creationId xmlns:a16="http://schemas.microsoft.com/office/drawing/2014/main" id="{4FB50A23-5F5E-3B41-AFF3-A03520598E3A}"/>
+                <a16:creationId xmlns:a16="http://schemas.microsoft.com/office/drawing/2014/main" xmlns="" id="{4FB50A23-5F5E-3B41-AFF3-A03520598E3A}"/>
               </a:ext>
             </a:extLst>
           </p:cNvPr>
@@ -2069,7 +2069,7 @@
           <a:p>
             <a:fld id="{FBAD1D64-A1EB-234F-98E8-4C3AB8D17E77}" type="datetimeFigureOut">
               <a:rPr lang="en-US" smtClean="0"/>
-              <a:t>3/28/18</a:t>
+              <a:t>5/17/18</a:t>
             </a:fld>
             <a:endParaRPr lang="en-US"/>
           </a:p>
@@ -2080,7 +2080,7 @@
           <p:cNvPr id="3" name="Footer Placeholder 2">
             <a:extLst>
               <a:ext uri="{FF2B5EF4-FFF2-40B4-BE49-F238E27FC236}">
-                <a16:creationId xmlns:a16="http://schemas.microsoft.com/office/drawing/2014/main" id="{468642F9-7F85-2F47-B5D6-9BD5B6251CD7}"/>
+                <a16:creationId xmlns:a16="http://schemas.microsoft.com/office/drawing/2014/main" xmlns="" id="{468642F9-7F85-2F47-B5D6-9BD5B6251CD7}"/>
               </a:ext>
             </a:extLst>
           </p:cNvPr>
@@ -2105,7 +2105,7 @@
           <p:cNvPr id="4" name="Slide Number Placeholder 3">
             <a:extLst>
               <a:ext uri="{FF2B5EF4-FFF2-40B4-BE49-F238E27FC236}">
-                <a16:creationId xmlns:a16="http://schemas.microsoft.com/office/drawing/2014/main" id="{72B91790-BC2C-D44E-8CFD-4549039D877E}"/>
+                <a16:creationId xmlns:a16="http://schemas.microsoft.com/office/drawing/2014/main" xmlns="" id="{72B91790-BC2C-D44E-8CFD-4549039D877E}"/>
               </a:ext>
             </a:extLst>
           </p:cNvPr>
@@ -2164,7 +2164,7 @@
           <p:cNvPr id="2" name="Title 1">
             <a:extLst>
               <a:ext uri="{FF2B5EF4-FFF2-40B4-BE49-F238E27FC236}">
-                <a16:creationId xmlns:a16="http://schemas.microsoft.com/office/drawing/2014/main" id="{AB6FC595-A5F1-CE4F-BD64-38DB138D393E}"/>
+                <a16:creationId xmlns:a16="http://schemas.microsoft.com/office/drawing/2014/main" xmlns="" id="{AB6FC595-A5F1-CE4F-BD64-38DB138D393E}"/>
               </a:ext>
             </a:extLst>
           </p:cNvPr>
@@ -2201,7 +2201,7 @@
           <p:cNvPr id="3" name="Content Placeholder 2">
             <a:extLst>
               <a:ext uri="{FF2B5EF4-FFF2-40B4-BE49-F238E27FC236}">
-                <a16:creationId xmlns:a16="http://schemas.microsoft.com/office/drawing/2014/main" id="{9C2510ED-DDDC-6C43-87CD-C96256798A07}"/>
+                <a16:creationId xmlns:a16="http://schemas.microsoft.com/office/drawing/2014/main" xmlns="" id="{9C2510ED-DDDC-6C43-87CD-C96256798A07}"/>
               </a:ext>
             </a:extLst>
           </p:cNvPr>
@@ -2291,7 +2291,7 @@
           <p:cNvPr id="4" name="Text Placeholder 3">
             <a:extLst>
               <a:ext uri="{FF2B5EF4-FFF2-40B4-BE49-F238E27FC236}">
-                <a16:creationId xmlns:a16="http://schemas.microsoft.com/office/drawing/2014/main" id="{3FC44D5C-8981-4F4F-A0A1-53D8D913A0EA}"/>
+                <a16:creationId xmlns:a16="http://schemas.microsoft.com/office/drawing/2014/main" xmlns="" id="{3FC44D5C-8981-4F4F-A0A1-53D8D913A0EA}"/>
               </a:ext>
             </a:extLst>
           </p:cNvPr>
@@ -2362,7 +2362,7 @@
           <p:cNvPr id="5" name="Date Placeholder 4">
             <a:extLst>
               <a:ext uri="{FF2B5EF4-FFF2-40B4-BE49-F238E27FC236}">
-                <a16:creationId xmlns:a16="http://schemas.microsoft.com/office/drawing/2014/main" id="{307963D8-68AD-5041-B1D7-A42CE5572A38}"/>
+                <a16:creationId xmlns:a16="http://schemas.microsoft.com/office/drawing/2014/main" xmlns="" id="{307963D8-68AD-5041-B1D7-A42CE5572A38}"/>
               </a:ext>
             </a:extLst>
           </p:cNvPr>
@@ -2380,7 +2380,7 @@
           <a:p>
             <a:fld id="{FBAD1D64-A1EB-234F-98E8-4C3AB8D17E77}" type="datetimeFigureOut">
               <a:rPr lang="en-US" smtClean="0"/>
-              <a:t>3/28/18</a:t>
+              <a:t>5/17/18</a:t>
             </a:fld>
             <a:endParaRPr lang="en-US"/>
           </a:p>
@@ -2391,7 +2391,7 @@
           <p:cNvPr id="6" name="Footer Placeholder 5">
             <a:extLst>
               <a:ext uri="{FF2B5EF4-FFF2-40B4-BE49-F238E27FC236}">
-                <a16:creationId xmlns:a16="http://schemas.microsoft.com/office/drawing/2014/main" id="{E16CB6BB-C33D-B440-B4B0-0DCCAF011D56}"/>
+                <a16:creationId xmlns:a16="http://schemas.microsoft.com/office/drawing/2014/main" xmlns="" id="{E16CB6BB-C33D-B440-B4B0-0DCCAF011D56}"/>
               </a:ext>
             </a:extLst>
           </p:cNvPr>
@@ -2416,7 +2416,7 @@
           <p:cNvPr id="7" name="Slide Number Placeholder 6">
             <a:extLst>
               <a:ext uri="{FF2B5EF4-FFF2-40B4-BE49-F238E27FC236}">
-                <a16:creationId xmlns:a16="http://schemas.microsoft.com/office/drawing/2014/main" id="{2728C1E8-969C-CD48-868A-5714C1F2B504}"/>
+                <a16:creationId xmlns:a16="http://schemas.microsoft.com/office/drawing/2014/main" xmlns="" id="{2728C1E8-969C-CD48-868A-5714C1F2B504}"/>
               </a:ext>
             </a:extLst>
           </p:cNvPr>
@@ -2475,7 +2475,7 @@
           <p:cNvPr id="2" name="Title 1">
             <a:extLst>
               <a:ext uri="{FF2B5EF4-FFF2-40B4-BE49-F238E27FC236}">
-                <a16:creationId xmlns:a16="http://schemas.microsoft.com/office/drawing/2014/main" id="{077F4233-DC0E-5043-A842-2F4D063A9D6A}"/>
+                <a16:creationId xmlns:a16="http://schemas.microsoft.com/office/drawing/2014/main" xmlns="" id="{077F4233-DC0E-5043-A842-2F4D063A9D6A}"/>
               </a:ext>
             </a:extLst>
           </p:cNvPr>
@@ -2512,7 +2512,7 @@
           <p:cNvPr id="3" name="Picture Placeholder 2">
             <a:extLst>
               <a:ext uri="{FF2B5EF4-FFF2-40B4-BE49-F238E27FC236}">
-                <a16:creationId xmlns:a16="http://schemas.microsoft.com/office/drawing/2014/main" id="{C6208DC8-B365-3046-BFE4-3A5B78CB37C7}"/>
+                <a16:creationId xmlns:a16="http://schemas.microsoft.com/office/drawing/2014/main" xmlns="" id="{C6208DC8-B365-3046-BFE4-3A5B78CB37C7}"/>
               </a:ext>
             </a:extLst>
           </p:cNvPr>
@@ -2579,7 +2579,7 @@
           <p:cNvPr id="4" name="Text Placeholder 3">
             <a:extLst>
               <a:ext uri="{FF2B5EF4-FFF2-40B4-BE49-F238E27FC236}">
-                <a16:creationId xmlns:a16="http://schemas.microsoft.com/office/drawing/2014/main" id="{3545EB9B-57CB-9B4A-B454-BFC3680C2147}"/>
+                <a16:creationId xmlns:a16="http://schemas.microsoft.com/office/drawing/2014/main" xmlns="" id="{3545EB9B-57CB-9B4A-B454-BFC3680C2147}"/>
               </a:ext>
             </a:extLst>
           </p:cNvPr>
@@ -2650,7 +2650,7 @@
           <p:cNvPr id="5" name="Date Placeholder 4">
             <a:extLst>
               <a:ext uri="{FF2B5EF4-FFF2-40B4-BE49-F238E27FC236}">
-                <a16:creationId xmlns:a16="http://schemas.microsoft.com/office/drawing/2014/main" id="{CEA4AD08-AA23-AC4E-944E-D6BD4BF4D223}"/>
+                <a16:creationId xmlns:a16="http://schemas.microsoft.com/office/drawing/2014/main" xmlns="" id="{CEA4AD08-AA23-AC4E-944E-D6BD4BF4D223}"/>
               </a:ext>
             </a:extLst>
           </p:cNvPr>
@@ -2668,7 +2668,7 @@
           <a:p>
             <a:fld id="{FBAD1D64-A1EB-234F-98E8-4C3AB8D17E77}" type="datetimeFigureOut">
               <a:rPr lang="en-US" smtClean="0"/>
-              <a:t>3/28/18</a:t>
+              <a:t>5/17/18</a:t>
             </a:fld>
             <a:endParaRPr lang="en-US"/>
           </a:p>
@@ -2679,7 +2679,7 @@
           <p:cNvPr id="6" name="Footer Placeholder 5">
             <a:extLst>
               <a:ext uri="{FF2B5EF4-FFF2-40B4-BE49-F238E27FC236}">
-                <a16:creationId xmlns:a16="http://schemas.microsoft.com/office/drawing/2014/main" id="{729032B1-A0CA-B442-9874-E8712F1C65DC}"/>
+                <a16:creationId xmlns:a16="http://schemas.microsoft.com/office/drawing/2014/main" xmlns="" id="{729032B1-A0CA-B442-9874-E8712F1C65DC}"/>
               </a:ext>
             </a:extLst>
           </p:cNvPr>
@@ -2704,7 +2704,7 @@
           <p:cNvPr id="7" name="Slide Number Placeholder 6">
             <a:extLst>
               <a:ext uri="{FF2B5EF4-FFF2-40B4-BE49-F238E27FC236}">
-                <a16:creationId xmlns:a16="http://schemas.microsoft.com/office/drawing/2014/main" id="{BE851F97-06B7-3049-BC2F-5498BE91C7FD}"/>
+                <a16:creationId xmlns:a16="http://schemas.microsoft.com/office/drawing/2014/main" xmlns="" id="{BE851F97-06B7-3049-BC2F-5498BE91C7FD}"/>
               </a:ext>
             </a:extLst>
           </p:cNvPr>
@@ -2768,7 +2768,7 @@
           <p:cNvPr id="2" name="Title Placeholder 1">
             <a:extLst>
               <a:ext uri="{FF2B5EF4-FFF2-40B4-BE49-F238E27FC236}">
-                <a16:creationId xmlns:a16="http://schemas.microsoft.com/office/drawing/2014/main" id="{CF084213-CF34-1341-BF2C-DFD98DFB30CA}"/>
+                <a16:creationId xmlns:a16="http://schemas.microsoft.com/office/drawing/2014/main" xmlns="" id="{CF084213-CF34-1341-BF2C-DFD98DFB30CA}"/>
               </a:ext>
             </a:extLst>
           </p:cNvPr>
@@ -2806,7 +2806,7 @@
           <p:cNvPr id="3" name="Text Placeholder 2">
             <a:extLst>
               <a:ext uri="{FF2B5EF4-FFF2-40B4-BE49-F238E27FC236}">
-                <a16:creationId xmlns:a16="http://schemas.microsoft.com/office/drawing/2014/main" id="{5FC3C1A9-BBE2-D645-8535-CB27A8163E06}"/>
+                <a16:creationId xmlns:a16="http://schemas.microsoft.com/office/drawing/2014/main" xmlns="" id="{5FC3C1A9-BBE2-D645-8535-CB27A8163E06}"/>
               </a:ext>
             </a:extLst>
           </p:cNvPr>
@@ -2873,7 +2873,7 @@
           <p:cNvPr id="4" name="Date Placeholder 3">
             <a:extLst>
               <a:ext uri="{FF2B5EF4-FFF2-40B4-BE49-F238E27FC236}">
-                <a16:creationId xmlns:a16="http://schemas.microsoft.com/office/drawing/2014/main" id="{4C915417-60A1-134B-A4CC-47BC77265975}"/>
+                <a16:creationId xmlns:a16="http://schemas.microsoft.com/office/drawing/2014/main" xmlns="" id="{4C915417-60A1-134B-A4CC-47BC77265975}"/>
               </a:ext>
             </a:extLst>
           </p:cNvPr>
@@ -2909,7 +2909,7 @@
           <a:p>
             <a:fld id="{FBAD1D64-A1EB-234F-98E8-4C3AB8D17E77}" type="datetimeFigureOut">
               <a:rPr lang="en-US" smtClean="0"/>
-              <a:t>3/28/18</a:t>
+              <a:t>5/17/18</a:t>
             </a:fld>
             <a:endParaRPr lang="en-US"/>
           </a:p>
@@ -2920,7 +2920,7 @@
           <p:cNvPr id="5" name="Footer Placeholder 4">
             <a:extLst>
               <a:ext uri="{FF2B5EF4-FFF2-40B4-BE49-F238E27FC236}">
-                <a16:creationId xmlns:a16="http://schemas.microsoft.com/office/drawing/2014/main" id="{94EF5D26-CFDD-1044-BD8E-F349F41BA1DD}"/>
+                <a16:creationId xmlns:a16="http://schemas.microsoft.com/office/drawing/2014/main" xmlns="" id="{94EF5D26-CFDD-1044-BD8E-F349F41BA1DD}"/>
               </a:ext>
             </a:extLst>
           </p:cNvPr>
@@ -2963,7 +2963,7 @@
           <p:cNvPr id="6" name="Slide Number Placeholder 5">
             <a:extLst>
               <a:ext uri="{FF2B5EF4-FFF2-40B4-BE49-F238E27FC236}">
-                <a16:creationId xmlns:a16="http://schemas.microsoft.com/office/drawing/2014/main" id="{F886F422-1EE7-7C4F-937D-7C1030EF8186}"/>
+                <a16:creationId xmlns:a16="http://schemas.microsoft.com/office/drawing/2014/main" xmlns="" id="{F886F422-1EE7-7C4F-937D-7C1030EF8186}"/>
               </a:ext>
             </a:extLst>
           </p:cNvPr>
@@ -3326,118 +3326,26 @@
           <a:chExt cx="0" cy="0"/>
         </a:xfrm>
       </p:grpSpPr>
-      <p:sp>
-        <p:nvSpPr>
-          <p:cNvPr id="4" name="Cube 3">
-            <a:extLst>
-              <a:ext uri="{FF2B5EF4-FFF2-40B4-BE49-F238E27FC236}">
-                <a16:creationId xmlns:a16="http://schemas.microsoft.com/office/drawing/2014/main" id="{14681C96-FC69-8C49-BB63-9B4E11E86089}"/>
-              </a:ext>
-            </a:extLst>
-          </p:cNvPr>
-          <p:cNvSpPr/>
-          <p:nvPr/>
-        </p:nvSpPr>
-        <p:spPr>
-          <a:xfrm>
-            <a:off x="394855" y="3572753"/>
-            <a:ext cx="1953491" cy="1745673"/>
-          </a:xfrm>
-          <a:prstGeom prst="cube">
-            <a:avLst/>
-          </a:prstGeom>
-          <a:solidFill>
-            <a:schemeClr val="accent6">
-              <a:lumMod val="40000"/>
-              <a:lumOff val="60000"/>
-            </a:schemeClr>
-          </a:solidFill>
-        </p:spPr>
-        <p:style>
-          <a:lnRef idx="2">
-            <a:schemeClr val="accent1">
-              <a:shade val="50000"/>
-            </a:schemeClr>
-          </a:lnRef>
-          <a:fillRef idx="1">
-            <a:schemeClr val="accent1"/>
-          </a:fillRef>
-          <a:effectRef idx="0">
-            <a:schemeClr val="accent1"/>
-          </a:effectRef>
-          <a:fontRef idx="minor">
-            <a:schemeClr val="lt1"/>
-          </a:fontRef>
-        </p:style>
-        <p:txBody>
-          <a:bodyPr rtlCol="0" anchor="ctr"/>
-          <a:lstStyle/>
-          <a:p>
-            <a:pPr algn="ctr"/>
-            <a:endParaRPr lang="en-US"/>
-          </a:p>
-        </p:txBody>
-      </p:sp>
-      <p:sp>
-        <p:nvSpPr>
-          <p:cNvPr id="6" name="Rectangle 5">
-            <a:extLst>
-              <a:ext uri="{FF2B5EF4-FFF2-40B4-BE49-F238E27FC236}">
-                <a16:creationId xmlns:a16="http://schemas.microsoft.com/office/drawing/2014/main" id="{2DC0D371-4078-EF4A-8866-3AF74253591D}"/>
-              </a:ext>
-            </a:extLst>
-          </p:cNvPr>
-          <p:cNvSpPr/>
-          <p:nvPr/>
-        </p:nvSpPr>
-        <p:spPr>
-          <a:xfrm>
-            <a:off x="2426182" y="3824920"/>
-            <a:ext cx="857345" cy="1077218"/>
-          </a:xfrm>
-          <a:prstGeom prst="rect">
-            <a:avLst/>
-          </a:prstGeom>
-        </p:spPr>
-        <p:txBody>
-          <a:bodyPr wrap="square">
-            <a:spAutoFit/>
-          </a:bodyPr>
-          <a:lstStyle/>
-          <a:p>
-            <a:r>
-              <a:rPr lang="en-US" sz="6400" dirty="0"/>
-              <a:t>≈</a:t>
-            </a:r>
-          </a:p>
-        </p:txBody>
-      </p:sp>
       <p:grpSp>
         <p:nvGrpSpPr>
-          <p:cNvPr id="10" name="Group 9">
-            <a:extLst>
-              <a:ext uri="{FF2B5EF4-FFF2-40B4-BE49-F238E27FC236}">
-                <a16:creationId xmlns:a16="http://schemas.microsoft.com/office/drawing/2014/main" id="{F8AD85C5-D7C8-5D4D-B442-C9A44CA46B76}"/>
-              </a:ext>
-            </a:extLst>
-          </p:cNvPr>
+          <p:cNvPr id="3" name="Group 2"/>
           <p:cNvGrpSpPr/>
           <p:nvPr/>
         </p:nvGrpSpPr>
         <p:grpSpPr>
           <a:xfrm>
-            <a:off x="3283527" y="728136"/>
-            <a:ext cx="2157769" cy="2530398"/>
-            <a:chOff x="3286342" y="1145198"/>
-            <a:chExt cx="2157769" cy="2530398"/>
+            <a:off x="-116840" y="172347"/>
+            <a:ext cx="12145354" cy="6640039"/>
+            <a:chOff x="-116840" y="172347"/>
+            <a:chExt cx="12145354" cy="6640039"/>
           </a:xfrm>
         </p:grpSpPr>
         <p:sp>
           <p:nvSpPr>
-            <p:cNvPr id="7" name="Rectangle 6">
+            <p:cNvPr id="4" name="Cube 3">
               <a:extLst>
                 <a:ext uri="{FF2B5EF4-FFF2-40B4-BE49-F238E27FC236}">
-                  <a16:creationId xmlns:a16="http://schemas.microsoft.com/office/drawing/2014/main" id="{0A096853-3819-0F40-A183-40352AF0CA57}"/>
+                  <a16:creationId xmlns:a16="http://schemas.microsoft.com/office/drawing/2014/main" xmlns="" id="{14681C96-FC69-8C49-BB63-9B4E11E86089}"/>
                 </a:ext>
               </a:extLst>
             </p:cNvPr>
@@ -3446,8 +3354,693 @@
           </p:nvSpPr>
           <p:spPr>
             <a:xfrm>
-              <a:off x="3286342" y="1993335"/>
-              <a:ext cx="150041" cy="1682261"/>
+              <a:off x="394855" y="3572753"/>
+              <a:ext cx="1953491" cy="1745673"/>
+            </a:xfrm>
+            <a:prstGeom prst="cube">
+              <a:avLst/>
+            </a:prstGeom>
+            <a:solidFill>
+              <a:schemeClr val="accent6">
+                <a:lumMod val="40000"/>
+                <a:lumOff val="60000"/>
+              </a:schemeClr>
+            </a:solidFill>
+          </p:spPr>
+          <p:style>
+            <a:lnRef idx="2">
+              <a:schemeClr val="accent1">
+                <a:shade val="50000"/>
+              </a:schemeClr>
+            </a:lnRef>
+            <a:fillRef idx="1">
+              <a:schemeClr val="accent1"/>
+            </a:fillRef>
+            <a:effectRef idx="0">
+              <a:schemeClr val="accent1"/>
+            </a:effectRef>
+            <a:fontRef idx="minor">
+              <a:schemeClr val="lt1"/>
+            </a:fontRef>
+          </p:style>
+          <p:txBody>
+            <a:bodyPr rtlCol="0" anchor="ctr"/>
+            <a:lstStyle/>
+            <a:p>
+              <a:pPr algn="ctr"/>
+              <a:endParaRPr lang="en-US"/>
+            </a:p>
+          </p:txBody>
+        </p:sp>
+        <p:sp>
+          <p:nvSpPr>
+            <p:cNvPr id="6" name="Rectangle 5">
+              <a:extLst>
+                <a:ext uri="{FF2B5EF4-FFF2-40B4-BE49-F238E27FC236}">
+                  <a16:creationId xmlns:a16="http://schemas.microsoft.com/office/drawing/2014/main" xmlns="" id="{2DC0D371-4078-EF4A-8866-3AF74253591D}"/>
+                </a:ext>
+              </a:extLst>
+            </p:cNvPr>
+            <p:cNvSpPr/>
+            <p:nvPr/>
+          </p:nvSpPr>
+          <p:spPr>
+            <a:xfrm>
+              <a:off x="2426182" y="3824920"/>
+              <a:ext cx="857345" cy="1077218"/>
+            </a:xfrm>
+            <a:prstGeom prst="rect">
+              <a:avLst/>
+            </a:prstGeom>
+          </p:spPr>
+          <p:txBody>
+            <a:bodyPr wrap="square">
+              <a:spAutoFit/>
+            </a:bodyPr>
+            <a:lstStyle/>
+            <a:p>
+              <a:r>
+                <a:rPr lang="en-US" sz="6400" dirty="0"/>
+                <a:t>≈</a:t>
+              </a:r>
+            </a:p>
+          </p:txBody>
+        </p:sp>
+        <p:grpSp>
+          <p:nvGrpSpPr>
+            <p:cNvPr id="10" name="Group 9">
+              <a:extLst>
+                <a:ext uri="{FF2B5EF4-FFF2-40B4-BE49-F238E27FC236}">
+                  <a16:creationId xmlns:a16="http://schemas.microsoft.com/office/drawing/2014/main" xmlns="" id="{F8AD85C5-D7C8-5D4D-B442-C9A44CA46B76}"/>
+                </a:ext>
+              </a:extLst>
+            </p:cNvPr>
+            <p:cNvGrpSpPr/>
+            <p:nvPr/>
+          </p:nvGrpSpPr>
+          <p:grpSpPr>
+            <a:xfrm>
+              <a:off x="3283527" y="728136"/>
+              <a:ext cx="2157769" cy="2530398"/>
+              <a:chOff x="3286342" y="1145198"/>
+              <a:chExt cx="2157769" cy="2530398"/>
+            </a:xfrm>
+          </p:grpSpPr>
+          <p:sp>
+            <p:nvSpPr>
+              <p:cNvPr id="7" name="Rectangle 6">
+                <a:extLst>
+                  <a:ext uri="{FF2B5EF4-FFF2-40B4-BE49-F238E27FC236}">
+                    <a16:creationId xmlns:a16="http://schemas.microsoft.com/office/drawing/2014/main" xmlns="" id="{0A096853-3819-0F40-A183-40352AF0CA57}"/>
+                  </a:ext>
+                </a:extLst>
+              </p:cNvPr>
+              <p:cNvSpPr/>
+              <p:nvPr/>
+            </p:nvSpPr>
+            <p:spPr>
+              <a:xfrm>
+                <a:off x="3286342" y="1993335"/>
+                <a:ext cx="150041" cy="1682261"/>
+              </a:xfrm>
+              <a:prstGeom prst="rect">
+                <a:avLst/>
+              </a:prstGeom>
+              <a:solidFill>
+                <a:schemeClr val="accent4">
+                  <a:lumMod val="40000"/>
+                  <a:lumOff val="60000"/>
+                </a:schemeClr>
+              </a:solidFill>
+            </p:spPr>
+            <p:style>
+              <a:lnRef idx="2">
+                <a:schemeClr val="accent1">
+                  <a:shade val="50000"/>
+                </a:schemeClr>
+              </a:lnRef>
+              <a:fillRef idx="1">
+                <a:schemeClr val="accent1"/>
+              </a:fillRef>
+              <a:effectRef idx="0">
+                <a:schemeClr val="accent1"/>
+              </a:effectRef>
+              <a:fontRef idx="minor">
+                <a:schemeClr val="lt1"/>
+              </a:fontRef>
+            </p:style>
+            <p:txBody>
+              <a:bodyPr rtlCol="0" anchor="ctr"/>
+              <a:lstStyle/>
+              <a:p>
+                <a:pPr algn="ctr"/>
+                <a:endParaRPr lang="en-US"/>
+              </a:p>
+            </p:txBody>
+          </p:sp>
+          <p:sp>
+            <p:nvSpPr>
+              <p:cNvPr id="8" name="Rectangle 7">
+                <a:extLst>
+                  <a:ext uri="{FF2B5EF4-FFF2-40B4-BE49-F238E27FC236}">
+                    <a16:creationId xmlns:a16="http://schemas.microsoft.com/office/drawing/2014/main" xmlns="" id="{9FEF0690-2D46-D24F-ADAA-07DA61F80E3C}"/>
+                  </a:ext>
+                </a:extLst>
+              </p:cNvPr>
+              <p:cNvSpPr/>
+              <p:nvPr/>
+            </p:nvSpPr>
+            <p:spPr>
+              <a:xfrm rot="5400000">
+                <a:off x="4527960" y="1077184"/>
+                <a:ext cx="150041" cy="1682261"/>
+              </a:xfrm>
+              <a:prstGeom prst="rect">
+                <a:avLst/>
+              </a:prstGeom>
+              <a:solidFill>
+                <a:schemeClr val="accent2">
+                  <a:lumMod val="60000"/>
+                  <a:lumOff val="40000"/>
+                </a:schemeClr>
+              </a:solidFill>
+            </p:spPr>
+            <p:style>
+              <a:lnRef idx="2">
+                <a:schemeClr val="accent1">
+                  <a:shade val="50000"/>
+                </a:schemeClr>
+              </a:lnRef>
+              <a:fillRef idx="1">
+                <a:schemeClr val="accent1"/>
+              </a:fillRef>
+              <a:effectRef idx="0">
+                <a:schemeClr val="accent1"/>
+              </a:effectRef>
+              <a:fontRef idx="minor">
+                <a:schemeClr val="lt1"/>
+              </a:fontRef>
+            </p:style>
+            <p:txBody>
+              <a:bodyPr rtlCol="0" anchor="ctr"/>
+              <a:lstStyle/>
+              <a:p>
+                <a:pPr algn="ctr"/>
+                <a:endParaRPr lang="en-US"/>
+              </a:p>
+            </p:txBody>
+          </p:sp>
+          <p:sp>
+            <p:nvSpPr>
+              <p:cNvPr id="9" name="Rectangle 8">
+                <a:extLst>
+                  <a:ext uri="{FF2B5EF4-FFF2-40B4-BE49-F238E27FC236}">
+                    <a16:creationId xmlns:a16="http://schemas.microsoft.com/office/drawing/2014/main" xmlns="" id="{B277A1CA-AE92-C149-9C1C-71769A0464A3}"/>
+                  </a:ext>
+                </a:extLst>
+              </p:cNvPr>
+              <p:cNvSpPr/>
+              <p:nvPr/>
+            </p:nvSpPr>
+            <p:spPr>
+              <a:xfrm rot="3016596">
+                <a:off x="4116846" y="379088"/>
+                <a:ext cx="150041" cy="1682261"/>
+              </a:xfrm>
+              <a:prstGeom prst="rect">
+                <a:avLst/>
+              </a:prstGeom>
+              <a:solidFill>
+                <a:schemeClr val="accent5">
+                  <a:lumMod val="60000"/>
+                  <a:lumOff val="40000"/>
+                </a:schemeClr>
+              </a:solidFill>
+            </p:spPr>
+            <p:style>
+              <a:lnRef idx="2">
+                <a:schemeClr val="accent1">
+                  <a:shade val="50000"/>
+                </a:schemeClr>
+              </a:lnRef>
+              <a:fillRef idx="1">
+                <a:schemeClr val="accent1"/>
+              </a:fillRef>
+              <a:effectRef idx="0">
+                <a:schemeClr val="accent1"/>
+              </a:effectRef>
+              <a:fontRef idx="minor">
+                <a:schemeClr val="lt1"/>
+              </a:fontRef>
+            </p:style>
+            <p:txBody>
+              <a:bodyPr rtlCol="0" anchor="ctr"/>
+              <a:lstStyle/>
+              <a:p>
+                <a:pPr algn="ctr"/>
+                <a:endParaRPr lang="en-US"/>
+              </a:p>
+            </p:txBody>
+          </p:sp>
+        </p:grpSp>
+        <p:sp>
+          <p:nvSpPr>
+            <p:cNvPr id="11" name="Cube 10">
+              <a:extLst>
+                <a:ext uri="{FF2B5EF4-FFF2-40B4-BE49-F238E27FC236}">
+                  <a16:creationId xmlns:a16="http://schemas.microsoft.com/office/drawing/2014/main" xmlns="" id="{9E2D64BF-3B9A-CF4A-9F35-66E17CC31B66}"/>
+                </a:ext>
+              </a:extLst>
+            </p:cNvPr>
+            <p:cNvSpPr/>
+            <p:nvPr/>
+          </p:nvSpPr>
+          <p:spPr>
+            <a:xfrm>
+              <a:off x="3494161" y="3490692"/>
+              <a:ext cx="1953491" cy="1745673"/>
+            </a:xfrm>
+            <a:prstGeom prst="cube">
+              <a:avLst/>
+            </a:prstGeom>
+            <a:noFill/>
+          </p:spPr>
+          <p:style>
+            <a:lnRef idx="2">
+              <a:schemeClr val="accent1">
+                <a:shade val="50000"/>
+              </a:schemeClr>
+            </a:lnRef>
+            <a:fillRef idx="1">
+              <a:schemeClr val="accent1"/>
+            </a:fillRef>
+            <a:effectRef idx="0">
+              <a:schemeClr val="accent1"/>
+            </a:effectRef>
+            <a:fontRef idx="minor">
+              <a:schemeClr val="lt1"/>
+            </a:fontRef>
+          </p:style>
+          <p:txBody>
+            <a:bodyPr rtlCol="0" anchor="ctr"/>
+            <a:lstStyle/>
+            <a:p>
+              <a:pPr algn="ctr"/>
+              <a:r>
+                <a:rPr lang="en-US" sz="2400" b="1" dirty="0">
+                  <a:solidFill>
+                    <a:schemeClr val="tx1"/>
+                  </a:solidFill>
+                </a:rPr>
+                <a:t>Rank 1 </a:t>
+              </a:r>
+            </a:p>
+            <a:p>
+              <a:pPr algn="ctr"/>
+              <a:r>
+                <a:rPr lang="en-US" sz="2400" b="1" dirty="0">
+                  <a:solidFill>
+                    <a:schemeClr val="tx1"/>
+                  </a:solidFill>
+                </a:rPr>
+                <a:t>Tensor</a:t>
+              </a:r>
+            </a:p>
+          </p:txBody>
+        </p:sp>
+        <p:sp>
+          <p:nvSpPr>
+            <p:cNvPr id="12" name="Rectangle 11">
+              <a:extLst>
+                <a:ext uri="{FF2B5EF4-FFF2-40B4-BE49-F238E27FC236}">
+                  <a16:creationId xmlns:a16="http://schemas.microsoft.com/office/drawing/2014/main" xmlns="" id="{9F890458-C12C-1D48-A5F5-7208D5C23FA5}"/>
+                </a:ext>
+              </a:extLst>
+            </p:cNvPr>
+            <p:cNvSpPr/>
+            <p:nvPr/>
+          </p:nvSpPr>
+          <p:spPr>
+            <a:xfrm>
+              <a:off x="5697306" y="3795838"/>
+              <a:ext cx="857345" cy="1077218"/>
+            </a:xfrm>
+            <a:prstGeom prst="rect">
+              <a:avLst/>
+            </a:prstGeom>
+          </p:spPr>
+          <p:txBody>
+            <a:bodyPr wrap="square">
+              <a:spAutoFit/>
+            </a:bodyPr>
+            <a:lstStyle/>
+            <a:p>
+              <a:r>
+                <a:rPr lang="en-US" sz="6400" dirty="0"/>
+                <a:t>+</a:t>
+              </a:r>
+            </a:p>
+          </p:txBody>
+        </p:sp>
+        <p:sp>
+          <p:nvSpPr>
+            <p:cNvPr id="13" name="Rectangle 12">
+              <a:extLst>
+                <a:ext uri="{FF2B5EF4-FFF2-40B4-BE49-F238E27FC236}">
+                  <a16:creationId xmlns:a16="http://schemas.microsoft.com/office/drawing/2014/main" xmlns="" id="{1298196F-01F6-3B4E-AA95-7D1D7CB29320}"/>
+                </a:ext>
+              </a:extLst>
+            </p:cNvPr>
+            <p:cNvSpPr/>
+            <p:nvPr/>
+          </p:nvSpPr>
+          <p:spPr>
+            <a:xfrm>
+              <a:off x="5518104" y="1576273"/>
+              <a:ext cx="857345" cy="1077218"/>
+            </a:xfrm>
+            <a:prstGeom prst="rect">
+              <a:avLst/>
+            </a:prstGeom>
+          </p:spPr>
+          <p:txBody>
+            <a:bodyPr wrap="square">
+              <a:spAutoFit/>
+            </a:bodyPr>
+            <a:lstStyle/>
+            <a:p>
+              <a:r>
+                <a:rPr lang="en-US" sz="6400" dirty="0"/>
+                <a:t>+</a:t>
+              </a:r>
+            </a:p>
+          </p:txBody>
+        </p:sp>
+        <p:sp>
+          <p:nvSpPr>
+            <p:cNvPr id="18" name="Cube 17">
+              <a:extLst>
+                <a:ext uri="{FF2B5EF4-FFF2-40B4-BE49-F238E27FC236}">
+                  <a16:creationId xmlns:a16="http://schemas.microsoft.com/office/drawing/2014/main" xmlns="" id="{6AB45F70-E3EA-3B44-8BFB-1E47B3113D14}"/>
+                </a:ext>
+              </a:extLst>
+            </p:cNvPr>
+            <p:cNvSpPr/>
+            <p:nvPr/>
+          </p:nvSpPr>
+          <p:spPr>
+            <a:xfrm>
+              <a:off x="6584470" y="3490692"/>
+              <a:ext cx="1953491" cy="1745673"/>
+            </a:xfrm>
+            <a:prstGeom prst="cube">
+              <a:avLst/>
+            </a:prstGeom>
+            <a:noFill/>
+          </p:spPr>
+          <p:style>
+            <a:lnRef idx="2">
+              <a:schemeClr val="accent1">
+                <a:shade val="50000"/>
+              </a:schemeClr>
+            </a:lnRef>
+            <a:fillRef idx="1">
+              <a:schemeClr val="accent1"/>
+            </a:fillRef>
+            <a:effectRef idx="0">
+              <a:schemeClr val="accent1"/>
+            </a:effectRef>
+            <a:fontRef idx="minor">
+              <a:schemeClr val="lt1"/>
+            </a:fontRef>
+          </p:style>
+          <p:txBody>
+            <a:bodyPr rtlCol="0" anchor="ctr"/>
+            <a:lstStyle/>
+            <a:p>
+              <a:pPr algn="ctr"/>
+              <a:r>
+                <a:rPr lang="en-US" sz="2400" b="1" dirty="0">
+                  <a:solidFill>
+                    <a:schemeClr val="tx1"/>
+                  </a:solidFill>
+                </a:rPr>
+                <a:t>Rank 1 </a:t>
+              </a:r>
+            </a:p>
+            <a:p>
+              <a:pPr algn="ctr"/>
+              <a:r>
+                <a:rPr lang="en-US" sz="2400" b="1" dirty="0">
+                  <a:solidFill>
+                    <a:schemeClr val="tx1"/>
+                  </a:solidFill>
+                </a:rPr>
+                <a:t>Tensor</a:t>
+              </a:r>
+            </a:p>
+          </p:txBody>
+        </p:sp>
+        <p:sp>
+          <p:nvSpPr>
+            <p:cNvPr id="19" name="Rectangle 18">
+              <a:extLst>
+                <a:ext uri="{FF2B5EF4-FFF2-40B4-BE49-F238E27FC236}">
+                  <a16:creationId xmlns:a16="http://schemas.microsoft.com/office/drawing/2014/main" xmlns="" id="{1C30946E-E4E1-E54D-8DC5-29CC3B250EEC}"/>
+                </a:ext>
+              </a:extLst>
+            </p:cNvPr>
+            <p:cNvSpPr/>
+            <p:nvPr/>
+          </p:nvSpPr>
+          <p:spPr>
+            <a:xfrm>
+              <a:off x="8830950" y="1581649"/>
+              <a:ext cx="857345" cy="1077218"/>
+            </a:xfrm>
+            <a:prstGeom prst="rect">
+              <a:avLst/>
+            </a:prstGeom>
+          </p:spPr>
+          <p:txBody>
+            <a:bodyPr wrap="square">
+              <a:spAutoFit/>
+            </a:bodyPr>
+            <a:lstStyle/>
+            <a:p>
+              <a:r>
+                <a:rPr lang="en-US" sz="6400" dirty="0"/>
+                <a:t>…</a:t>
+              </a:r>
+            </a:p>
+          </p:txBody>
+        </p:sp>
+        <p:sp>
+          <p:nvSpPr>
+            <p:cNvPr id="20" name="Rectangle 19">
+              <a:extLst>
+                <a:ext uri="{FF2B5EF4-FFF2-40B4-BE49-F238E27FC236}">
+                  <a16:creationId xmlns:a16="http://schemas.microsoft.com/office/drawing/2014/main" xmlns="" id="{50346170-8EAF-E444-A413-4ADCE13616C9}"/>
+                </a:ext>
+              </a:extLst>
+            </p:cNvPr>
+            <p:cNvSpPr/>
+            <p:nvPr/>
+          </p:nvSpPr>
+          <p:spPr>
+            <a:xfrm>
+              <a:off x="9025710" y="3572753"/>
+              <a:ext cx="857345" cy="1077218"/>
+            </a:xfrm>
+            <a:prstGeom prst="rect">
+              <a:avLst/>
+            </a:prstGeom>
+          </p:spPr>
+          <p:txBody>
+            <a:bodyPr wrap="square">
+              <a:spAutoFit/>
+            </a:bodyPr>
+            <a:lstStyle/>
+            <a:p>
+              <a:r>
+                <a:rPr lang="en-US" sz="6400" dirty="0"/>
+                <a:t>…</a:t>
+              </a:r>
+            </a:p>
+          </p:txBody>
+        </p:sp>
+        <p:sp>
+          <p:nvSpPr>
+            <p:cNvPr id="25" name="Cube 24">
+              <a:extLst>
+                <a:ext uri="{FF2B5EF4-FFF2-40B4-BE49-F238E27FC236}">
+                  <a16:creationId xmlns:a16="http://schemas.microsoft.com/office/drawing/2014/main" xmlns="" id="{29145AF9-FBB3-FC4B-BE6E-0221C298916B}"/>
+                </a:ext>
+              </a:extLst>
+            </p:cNvPr>
+            <p:cNvSpPr/>
+            <p:nvPr/>
+          </p:nvSpPr>
+          <p:spPr>
+            <a:xfrm>
+              <a:off x="10075023" y="3490691"/>
+              <a:ext cx="1953491" cy="1745673"/>
+            </a:xfrm>
+            <a:prstGeom prst="cube">
+              <a:avLst/>
+            </a:prstGeom>
+            <a:noFill/>
+          </p:spPr>
+          <p:style>
+            <a:lnRef idx="2">
+              <a:schemeClr val="accent1">
+                <a:shade val="50000"/>
+              </a:schemeClr>
+            </a:lnRef>
+            <a:fillRef idx="1">
+              <a:schemeClr val="accent1"/>
+            </a:fillRef>
+            <a:effectRef idx="0">
+              <a:schemeClr val="accent1"/>
+            </a:effectRef>
+            <a:fontRef idx="minor">
+              <a:schemeClr val="lt1"/>
+            </a:fontRef>
+          </p:style>
+          <p:txBody>
+            <a:bodyPr rtlCol="0" anchor="ctr"/>
+            <a:lstStyle/>
+            <a:p>
+              <a:pPr algn="ctr"/>
+              <a:r>
+                <a:rPr lang="en-US" sz="2400" b="1" dirty="0">
+                  <a:solidFill>
+                    <a:schemeClr val="tx1"/>
+                  </a:solidFill>
+                </a:rPr>
+                <a:t>Rank 1 </a:t>
+              </a:r>
+            </a:p>
+            <a:p>
+              <a:pPr algn="ctr"/>
+              <a:r>
+                <a:rPr lang="en-US" sz="2400" b="1" dirty="0">
+                  <a:solidFill>
+                    <a:schemeClr val="tx1"/>
+                  </a:solidFill>
+                </a:rPr>
+                <a:t>Tensor</a:t>
+              </a:r>
+            </a:p>
+          </p:txBody>
+        </p:sp>
+        <p:sp>
+          <p:nvSpPr>
+            <p:cNvPr id="27" name="Right Brace 26">
+              <a:extLst>
+                <a:ext uri="{FF2B5EF4-FFF2-40B4-BE49-F238E27FC236}">
+                  <a16:creationId xmlns:a16="http://schemas.microsoft.com/office/drawing/2014/main" xmlns="" id="{7AD8FFBB-3BD6-0344-AD20-A94601E2F6A6}"/>
+                </a:ext>
+              </a:extLst>
+            </p:cNvPr>
+            <p:cNvSpPr/>
+            <p:nvPr/>
+          </p:nvSpPr>
+          <p:spPr>
+            <a:xfrm rot="5400000">
+              <a:off x="7078753" y="1277852"/>
+              <a:ext cx="1154531" cy="8744986"/>
+            </a:xfrm>
+            <a:prstGeom prst="rightBrace">
+              <a:avLst/>
+            </a:prstGeom>
+          </p:spPr>
+          <p:style>
+            <a:lnRef idx="1">
+              <a:schemeClr val="accent1"/>
+            </a:lnRef>
+            <a:fillRef idx="0">
+              <a:schemeClr val="accent1"/>
+            </a:fillRef>
+            <a:effectRef idx="0">
+              <a:schemeClr val="accent1"/>
+            </a:effectRef>
+            <a:fontRef idx="minor">
+              <a:schemeClr val="tx1"/>
+            </a:fontRef>
+          </p:style>
+          <p:txBody>
+            <a:bodyPr rtlCol="0" anchor="ctr"/>
+            <a:lstStyle/>
+            <a:p>
+              <a:pPr algn="ctr"/>
+              <a:endParaRPr lang="en-US"/>
+            </a:p>
+          </p:txBody>
+        </p:sp>
+        <p:sp>
+          <p:nvSpPr>
+            <p:cNvPr id="28" name="TextBox 27">
+              <a:extLst>
+                <a:ext uri="{FF2B5EF4-FFF2-40B4-BE49-F238E27FC236}">
+                  <a16:creationId xmlns:a16="http://schemas.microsoft.com/office/drawing/2014/main" xmlns="" id="{336CD24E-53D1-114C-933B-A0D24B169223}"/>
+                </a:ext>
+              </a:extLst>
+            </p:cNvPr>
+            <p:cNvSpPr txBox="1"/>
+            <p:nvPr/>
+          </p:nvSpPr>
+          <p:spPr>
+            <a:xfrm>
+              <a:off x="5624946" y="6227611"/>
+              <a:ext cx="4338367" cy="584775"/>
+            </a:xfrm>
+            <a:prstGeom prst="rect">
+              <a:avLst/>
+            </a:prstGeom>
+            <a:noFill/>
+          </p:spPr>
+          <p:txBody>
+            <a:bodyPr wrap="none" rtlCol="0">
+              <a:spAutoFit/>
+            </a:bodyPr>
+            <a:lstStyle/>
+            <a:p>
+              <a:r>
+                <a:rPr lang="en-US" sz="3200" b="1" dirty="0"/>
+                <a:t>Sum of </a:t>
+              </a:r>
+              <a:r>
+                <a:rPr lang="en-US" sz="3200" b="1" dirty="0"/>
+                <a:t>R</a:t>
+              </a:r>
+              <a:r>
+                <a:rPr lang="en-US" sz="3200" b="1" dirty="0" smtClean="0"/>
+                <a:t> </a:t>
+              </a:r>
+              <a:r>
+                <a:rPr lang="en-US" sz="3200" b="1" dirty="0"/>
+                <a:t>Rank-1 Tensors</a:t>
+              </a:r>
+            </a:p>
+          </p:txBody>
+        </p:sp>
+        <p:sp>
+          <p:nvSpPr>
+            <p:cNvPr id="29" name="Rectangle 28">
+              <a:extLst>
+                <a:ext uri="{FF2B5EF4-FFF2-40B4-BE49-F238E27FC236}">
+                  <a16:creationId xmlns:a16="http://schemas.microsoft.com/office/drawing/2014/main" xmlns="" id="{13C48D46-FF52-4346-8104-87570B61E5ED}"/>
+                </a:ext>
+              </a:extLst>
+            </p:cNvPr>
+            <p:cNvSpPr/>
+            <p:nvPr/>
+          </p:nvSpPr>
+          <p:spPr>
+            <a:xfrm>
+              <a:off x="274634" y="1571410"/>
+              <a:ext cx="504049" cy="1611808"/>
             </a:xfrm>
             <a:prstGeom prst="rect">
               <a:avLst/>
@@ -3480,16 +4073,16 @@
             <a:lstStyle/>
             <a:p>
               <a:pPr algn="ctr"/>
-              <a:endParaRPr lang="en-US"/>
+              <a:endParaRPr lang="en-US" dirty="0"/>
             </a:p>
           </p:txBody>
         </p:sp>
         <p:sp>
           <p:nvSpPr>
-            <p:cNvPr id="8" name="Rectangle 7">
+            <p:cNvPr id="30" name="Rectangle 29">
               <a:extLst>
                 <a:ext uri="{FF2B5EF4-FFF2-40B4-BE49-F238E27FC236}">
-                  <a16:creationId xmlns:a16="http://schemas.microsoft.com/office/drawing/2014/main" id="{9FEF0690-2D46-D24F-ADAA-07DA61F80E3C}"/>
+                  <a16:creationId xmlns:a16="http://schemas.microsoft.com/office/drawing/2014/main" xmlns="" id="{35761B2C-077F-CB4A-A6E3-5E4CC641A657}"/>
                 </a:ext>
               </a:extLst>
             </p:cNvPr>
@@ -3498,8 +4091,8 @@
           </p:nvSpPr>
           <p:spPr>
             <a:xfrm rot="5400000">
-              <a:off x="4527960" y="1077184"/>
-              <a:ext cx="150041" cy="1682261"/>
+              <a:off x="1479910" y="1002527"/>
+              <a:ext cx="504049" cy="1611808"/>
             </a:xfrm>
             <a:prstGeom prst="rect">
               <a:avLst/>
@@ -3538,10 +4131,10 @@
         </p:sp>
         <p:sp>
           <p:nvSpPr>
-            <p:cNvPr id="9" name="Rectangle 8">
+            <p:cNvPr id="31" name="Rectangle 30">
               <a:extLst>
                 <a:ext uri="{FF2B5EF4-FFF2-40B4-BE49-F238E27FC236}">
-                  <a16:creationId xmlns:a16="http://schemas.microsoft.com/office/drawing/2014/main" id="{B277A1CA-AE92-C149-9C1C-71769A0464A3}"/>
+                  <a16:creationId xmlns:a16="http://schemas.microsoft.com/office/drawing/2014/main" xmlns="" id="{5CABFAEE-739B-704E-84D2-8CB46A25E166}"/>
                 </a:ext>
               </a:extLst>
             </p:cNvPr>
@@ -3549,9 +4142,9 @@
             <p:nvPr/>
           </p:nvSpPr>
           <p:spPr>
-            <a:xfrm rot="3016596">
-              <a:off x="4116846" y="379088"/>
-              <a:ext cx="150041" cy="1682261"/>
+            <a:xfrm rot="3070037">
+              <a:off x="927969" y="-82181"/>
+              <a:ext cx="504049" cy="1611808"/>
             </a:xfrm>
             <a:prstGeom prst="rect">
               <a:avLst/>
@@ -3588,704 +4181,1284 @@
             </a:p>
           </p:txBody>
         </p:sp>
-      </p:grpSp>
-      <p:sp>
-        <p:nvSpPr>
-          <p:cNvPr id="11" name="Cube 10">
-            <a:extLst>
-              <a:ext uri="{FF2B5EF4-FFF2-40B4-BE49-F238E27FC236}">
-                <a16:creationId xmlns:a16="http://schemas.microsoft.com/office/drawing/2014/main" id="{9E2D64BF-3B9A-CF4A-9F35-66E17CC31B66}"/>
-              </a:ext>
-            </a:extLst>
-          </p:cNvPr>
-          <p:cNvSpPr/>
-          <p:nvPr/>
-        </p:nvSpPr>
-        <p:spPr>
-          <a:xfrm>
-            <a:off x="3494161" y="3490692"/>
-            <a:ext cx="1953491" cy="1745673"/>
-          </a:xfrm>
-          <a:prstGeom prst="cube">
-            <a:avLst/>
-          </a:prstGeom>
-          <a:noFill/>
-        </p:spPr>
-        <p:style>
-          <a:lnRef idx="2">
-            <a:schemeClr val="accent1">
-              <a:shade val="50000"/>
-            </a:schemeClr>
-          </a:lnRef>
-          <a:fillRef idx="1">
-            <a:schemeClr val="accent1"/>
-          </a:fillRef>
-          <a:effectRef idx="0">
-            <a:schemeClr val="accent1"/>
-          </a:effectRef>
-          <a:fontRef idx="minor">
-            <a:schemeClr val="lt1"/>
-          </a:fontRef>
-        </p:style>
-        <p:txBody>
-          <a:bodyPr rtlCol="0" anchor="ctr"/>
-          <a:lstStyle/>
-          <a:p>
-            <a:pPr algn="ctr"/>
-            <a:r>
-              <a:rPr lang="en-US" sz="2400" b="1" dirty="0">
-                <a:solidFill>
-                  <a:schemeClr val="tx1"/>
-                </a:solidFill>
-              </a:rPr>
-              <a:t>Rank 1 </a:t>
-            </a:r>
-          </a:p>
-          <a:p>
-            <a:pPr algn="ctr"/>
-            <a:r>
-              <a:rPr lang="en-US" sz="2400" b="1" dirty="0">
-                <a:solidFill>
-                  <a:schemeClr val="tx1"/>
-                </a:solidFill>
-              </a:rPr>
-              <a:t>Tensor</a:t>
-            </a:r>
-          </a:p>
-        </p:txBody>
-      </p:sp>
-      <p:sp>
-        <p:nvSpPr>
-          <p:cNvPr id="12" name="Rectangle 11">
-            <a:extLst>
-              <a:ext uri="{FF2B5EF4-FFF2-40B4-BE49-F238E27FC236}">
-                <a16:creationId xmlns:a16="http://schemas.microsoft.com/office/drawing/2014/main" id="{9F890458-C12C-1D48-A5F5-7208D5C23FA5}"/>
-              </a:ext>
-            </a:extLst>
-          </p:cNvPr>
-          <p:cNvSpPr/>
-          <p:nvPr/>
-        </p:nvSpPr>
-        <p:spPr>
-          <a:xfrm>
-            <a:off x="5697306" y="3795838"/>
-            <a:ext cx="857345" cy="1077218"/>
-          </a:xfrm>
-          <a:prstGeom prst="rect">
-            <a:avLst/>
-          </a:prstGeom>
-        </p:spPr>
-        <p:txBody>
-          <a:bodyPr wrap="square">
-            <a:spAutoFit/>
-          </a:bodyPr>
-          <a:lstStyle/>
-          <a:p>
-            <a:r>
-              <a:rPr lang="en-US" sz="6400" dirty="0"/>
-              <a:t>+</a:t>
-            </a:r>
-          </a:p>
-        </p:txBody>
-      </p:sp>
-      <p:sp>
-        <p:nvSpPr>
-          <p:cNvPr id="13" name="Rectangle 12">
-            <a:extLst>
-              <a:ext uri="{FF2B5EF4-FFF2-40B4-BE49-F238E27FC236}">
-                <a16:creationId xmlns:a16="http://schemas.microsoft.com/office/drawing/2014/main" id="{1298196F-01F6-3B4E-AA95-7D1D7CB29320}"/>
-              </a:ext>
-            </a:extLst>
-          </p:cNvPr>
-          <p:cNvSpPr/>
-          <p:nvPr/>
-        </p:nvSpPr>
-        <p:spPr>
-          <a:xfrm>
-            <a:off x="5518104" y="1576273"/>
-            <a:ext cx="857345" cy="1077218"/>
-          </a:xfrm>
-          <a:prstGeom prst="rect">
-            <a:avLst/>
-          </a:prstGeom>
-        </p:spPr>
-        <p:txBody>
-          <a:bodyPr wrap="square">
-            <a:spAutoFit/>
-          </a:bodyPr>
-          <a:lstStyle/>
-          <a:p>
-            <a:r>
-              <a:rPr lang="en-US" sz="6400" dirty="0"/>
-              <a:t>+</a:t>
-            </a:r>
-          </a:p>
-        </p:txBody>
-      </p:sp>
-      <p:sp>
-        <p:nvSpPr>
-          <p:cNvPr id="18" name="Cube 17">
-            <a:extLst>
-              <a:ext uri="{FF2B5EF4-FFF2-40B4-BE49-F238E27FC236}">
-                <a16:creationId xmlns:a16="http://schemas.microsoft.com/office/drawing/2014/main" id="{6AB45F70-E3EA-3B44-8BFB-1E47B3113D14}"/>
-              </a:ext>
-            </a:extLst>
-          </p:cNvPr>
-          <p:cNvSpPr/>
-          <p:nvPr/>
-        </p:nvSpPr>
-        <p:spPr>
-          <a:xfrm>
-            <a:off x="6584470" y="3490692"/>
-            <a:ext cx="1953491" cy="1745673"/>
-          </a:xfrm>
-          <a:prstGeom prst="cube">
-            <a:avLst/>
-          </a:prstGeom>
-          <a:noFill/>
-        </p:spPr>
-        <p:style>
-          <a:lnRef idx="2">
-            <a:schemeClr val="accent1">
-              <a:shade val="50000"/>
-            </a:schemeClr>
-          </a:lnRef>
-          <a:fillRef idx="1">
-            <a:schemeClr val="accent1"/>
-          </a:fillRef>
-          <a:effectRef idx="0">
-            <a:schemeClr val="accent1"/>
-          </a:effectRef>
-          <a:fontRef idx="minor">
-            <a:schemeClr val="lt1"/>
-          </a:fontRef>
-        </p:style>
-        <p:txBody>
-          <a:bodyPr rtlCol="0" anchor="ctr"/>
-          <a:lstStyle/>
-          <a:p>
-            <a:pPr algn="ctr"/>
-            <a:r>
-              <a:rPr lang="en-US" sz="2400" b="1" dirty="0">
-                <a:solidFill>
-                  <a:schemeClr val="tx1"/>
-                </a:solidFill>
-              </a:rPr>
-              <a:t>Rank 1 </a:t>
-            </a:r>
-          </a:p>
-          <a:p>
-            <a:pPr algn="ctr"/>
-            <a:r>
-              <a:rPr lang="en-US" sz="2400" b="1" dirty="0">
-                <a:solidFill>
-                  <a:schemeClr val="tx1"/>
-                </a:solidFill>
-              </a:rPr>
-              <a:t>Tensor</a:t>
-            </a:r>
-          </a:p>
-        </p:txBody>
-      </p:sp>
-      <p:sp>
-        <p:nvSpPr>
-          <p:cNvPr id="19" name="Rectangle 18">
-            <a:extLst>
-              <a:ext uri="{FF2B5EF4-FFF2-40B4-BE49-F238E27FC236}">
-                <a16:creationId xmlns:a16="http://schemas.microsoft.com/office/drawing/2014/main" id="{1C30946E-E4E1-E54D-8DC5-29CC3B250EEC}"/>
-              </a:ext>
-            </a:extLst>
-          </p:cNvPr>
-          <p:cNvSpPr/>
-          <p:nvPr/>
-        </p:nvSpPr>
-        <p:spPr>
-          <a:xfrm>
-            <a:off x="8830950" y="1581649"/>
-            <a:ext cx="857345" cy="1077218"/>
-          </a:xfrm>
-          <a:prstGeom prst="rect">
-            <a:avLst/>
-          </a:prstGeom>
-        </p:spPr>
-        <p:txBody>
-          <a:bodyPr wrap="square">
-            <a:spAutoFit/>
-          </a:bodyPr>
-          <a:lstStyle/>
-          <a:p>
-            <a:r>
-              <a:rPr lang="en-US" sz="6400" dirty="0"/>
-              <a:t>…</a:t>
-            </a:r>
-          </a:p>
-        </p:txBody>
-      </p:sp>
-      <p:sp>
-        <p:nvSpPr>
-          <p:cNvPr id="20" name="Rectangle 19">
-            <a:extLst>
-              <a:ext uri="{FF2B5EF4-FFF2-40B4-BE49-F238E27FC236}">
-                <a16:creationId xmlns:a16="http://schemas.microsoft.com/office/drawing/2014/main" id="{50346170-8EAF-E444-A413-4ADCE13616C9}"/>
-              </a:ext>
-            </a:extLst>
-          </p:cNvPr>
-          <p:cNvSpPr/>
-          <p:nvPr/>
-        </p:nvSpPr>
-        <p:spPr>
-          <a:xfrm>
-            <a:off x="9025710" y="3572753"/>
-            <a:ext cx="857345" cy="1077218"/>
-          </a:xfrm>
-          <a:prstGeom prst="rect">
-            <a:avLst/>
-          </a:prstGeom>
-        </p:spPr>
-        <p:txBody>
-          <a:bodyPr wrap="square">
-            <a:spAutoFit/>
-          </a:bodyPr>
-          <a:lstStyle/>
-          <a:p>
-            <a:r>
-              <a:rPr lang="en-US" sz="6400" dirty="0"/>
-              <a:t>…</a:t>
-            </a:r>
-          </a:p>
-        </p:txBody>
-      </p:sp>
-      <p:sp>
-        <p:nvSpPr>
-          <p:cNvPr id="25" name="Cube 24">
-            <a:extLst>
-              <a:ext uri="{FF2B5EF4-FFF2-40B4-BE49-F238E27FC236}">
-                <a16:creationId xmlns:a16="http://schemas.microsoft.com/office/drawing/2014/main" id="{29145AF9-FBB3-FC4B-BE6E-0221C298916B}"/>
-              </a:ext>
-            </a:extLst>
-          </p:cNvPr>
-          <p:cNvSpPr/>
-          <p:nvPr/>
-        </p:nvSpPr>
-        <p:spPr>
-          <a:xfrm>
-            <a:off x="10075023" y="3490691"/>
-            <a:ext cx="1953491" cy="1745673"/>
-          </a:xfrm>
-          <a:prstGeom prst="cube">
-            <a:avLst/>
-          </a:prstGeom>
-          <a:noFill/>
-        </p:spPr>
-        <p:style>
-          <a:lnRef idx="2">
-            <a:schemeClr val="accent1">
-              <a:shade val="50000"/>
-            </a:schemeClr>
-          </a:lnRef>
-          <a:fillRef idx="1">
-            <a:schemeClr val="accent1"/>
-          </a:fillRef>
-          <a:effectRef idx="0">
-            <a:schemeClr val="accent1"/>
-          </a:effectRef>
-          <a:fontRef idx="minor">
-            <a:schemeClr val="lt1"/>
-          </a:fontRef>
-        </p:style>
-        <p:txBody>
-          <a:bodyPr rtlCol="0" anchor="ctr"/>
-          <a:lstStyle/>
-          <a:p>
-            <a:pPr algn="ctr"/>
-            <a:r>
-              <a:rPr lang="en-US" sz="2400" b="1" dirty="0">
-                <a:solidFill>
-                  <a:schemeClr val="tx1"/>
-                </a:solidFill>
-              </a:rPr>
-              <a:t>Rank 1 </a:t>
-            </a:r>
-          </a:p>
-          <a:p>
-            <a:pPr algn="ctr"/>
-            <a:r>
-              <a:rPr lang="en-US" sz="2400" b="1" dirty="0">
-                <a:solidFill>
-                  <a:schemeClr val="tx1"/>
-                </a:solidFill>
-              </a:rPr>
-              <a:t>Tensor</a:t>
-            </a:r>
-          </a:p>
-        </p:txBody>
-      </p:sp>
-      <p:sp>
-        <p:nvSpPr>
-          <p:cNvPr id="27" name="Right Brace 26">
-            <a:extLst>
-              <a:ext uri="{FF2B5EF4-FFF2-40B4-BE49-F238E27FC236}">
-                <a16:creationId xmlns:a16="http://schemas.microsoft.com/office/drawing/2014/main" id="{7AD8FFBB-3BD6-0344-AD20-A94601E2F6A6}"/>
-              </a:ext>
-            </a:extLst>
-          </p:cNvPr>
-          <p:cNvSpPr/>
-          <p:nvPr/>
-        </p:nvSpPr>
-        <p:spPr>
-          <a:xfrm rot="5400000">
-            <a:off x="7078753" y="1277852"/>
-            <a:ext cx="1154531" cy="8744986"/>
-          </a:xfrm>
-          <a:prstGeom prst="rightBrace">
-            <a:avLst/>
-          </a:prstGeom>
-        </p:spPr>
-        <p:style>
-          <a:lnRef idx="1">
-            <a:schemeClr val="accent1"/>
-          </a:lnRef>
-          <a:fillRef idx="0">
-            <a:schemeClr val="accent1"/>
-          </a:fillRef>
-          <a:effectRef idx="0">
-            <a:schemeClr val="accent1"/>
-          </a:effectRef>
-          <a:fontRef idx="minor">
-            <a:schemeClr val="tx1"/>
-          </a:fontRef>
-        </p:style>
-        <p:txBody>
-          <a:bodyPr rtlCol="0" anchor="ctr"/>
-          <a:lstStyle/>
-          <a:p>
-            <a:pPr algn="ctr"/>
-            <a:endParaRPr lang="en-US"/>
-          </a:p>
-        </p:txBody>
-      </p:sp>
-      <p:sp>
-        <p:nvSpPr>
-          <p:cNvPr id="28" name="TextBox 27">
-            <a:extLst>
-              <a:ext uri="{FF2B5EF4-FFF2-40B4-BE49-F238E27FC236}">
-                <a16:creationId xmlns:a16="http://schemas.microsoft.com/office/drawing/2014/main" id="{336CD24E-53D1-114C-933B-A0D24B169223}"/>
-              </a:ext>
-            </a:extLst>
-          </p:cNvPr>
-          <p:cNvSpPr txBox="1"/>
-          <p:nvPr/>
-        </p:nvSpPr>
-        <p:spPr>
-          <a:xfrm>
-            <a:off x="5624946" y="6227611"/>
-            <a:ext cx="4479688" cy="584775"/>
-          </a:xfrm>
-          <a:prstGeom prst="rect">
-            <a:avLst/>
-          </a:prstGeom>
-          <a:noFill/>
-        </p:spPr>
-        <p:txBody>
-          <a:bodyPr wrap="none" rtlCol="0">
-            <a:spAutoFit/>
-          </a:bodyPr>
-          <a:lstStyle/>
-          <a:p>
-            <a:r>
-              <a:rPr lang="en-US" sz="3200" b="1" dirty="0"/>
-              <a:t>Sum of ‘r’ Rank-1 Tensors</a:t>
-            </a:r>
-          </a:p>
-        </p:txBody>
-      </p:sp>
-      <p:sp>
-        <p:nvSpPr>
-          <p:cNvPr id="29" name="Rectangle 28">
-            <a:extLst>
-              <a:ext uri="{FF2B5EF4-FFF2-40B4-BE49-F238E27FC236}">
-                <a16:creationId xmlns:a16="http://schemas.microsoft.com/office/drawing/2014/main" id="{13C48D46-FF52-4346-8104-87570B61E5ED}"/>
-              </a:ext>
-            </a:extLst>
-          </p:cNvPr>
-          <p:cNvSpPr/>
-          <p:nvPr/>
-        </p:nvSpPr>
-        <p:spPr>
-          <a:xfrm>
-            <a:off x="274634" y="1571410"/>
-            <a:ext cx="504049" cy="1611808"/>
-          </a:xfrm>
-          <a:prstGeom prst="rect">
-            <a:avLst/>
-          </a:prstGeom>
-          <a:solidFill>
-            <a:schemeClr val="accent4">
-              <a:lumMod val="40000"/>
-              <a:lumOff val="60000"/>
-            </a:schemeClr>
-          </a:solidFill>
-        </p:spPr>
-        <p:style>
-          <a:lnRef idx="2">
-            <a:schemeClr val="accent1">
-              <a:shade val="50000"/>
-            </a:schemeClr>
-          </a:lnRef>
-          <a:fillRef idx="1">
-            <a:schemeClr val="accent1"/>
-          </a:fillRef>
-          <a:effectRef idx="0">
-            <a:schemeClr val="accent1"/>
-          </a:effectRef>
-          <a:fontRef idx="minor">
-            <a:schemeClr val="lt1"/>
-          </a:fontRef>
-        </p:style>
-        <p:txBody>
-          <a:bodyPr rtlCol="0" anchor="ctr"/>
-          <a:lstStyle/>
-          <a:p>
-            <a:pPr algn="ctr"/>
-            <a:endParaRPr lang="en-US" dirty="0"/>
-          </a:p>
-        </p:txBody>
-      </p:sp>
-      <p:sp>
-        <p:nvSpPr>
-          <p:cNvPr id="30" name="Rectangle 29">
-            <a:extLst>
-              <a:ext uri="{FF2B5EF4-FFF2-40B4-BE49-F238E27FC236}">
-                <a16:creationId xmlns:a16="http://schemas.microsoft.com/office/drawing/2014/main" id="{35761B2C-077F-CB4A-A6E3-5E4CC641A657}"/>
-              </a:ext>
-            </a:extLst>
-          </p:cNvPr>
-          <p:cNvSpPr/>
-          <p:nvPr/>
-        </p:nvSpPr>
-        <p:spPr>
-          <a:xfrm rot="5400000">
-            <a:off x="1479910" y="1002527"/>
-            <a:ext cx="504049" cy="1611808"/>
-          </a:xfrm>
-          <a:prstGeom prst="rect">
-            <a:avLst/>
-          </a:prstGeom>
-          <a:solidFill>
-            <a:schemeClr val="accent2">
-              <a:lumMod val="60000"/>
-              <a:lumOff val="40000"/>
-            </a:schemeClr>
-          </a:solidFill>
-        </p:spPr>
-        <p:style>
-          <a:lnRef idx="2">
-            <a:schemeClr val="accent1">
-              <a:shade val="50000"/>
-            </a:schemeClr>
-          </a:lnRef>
-          <a:fillRef idx="1">
-            <a:schemeClr val="accent1"/>
-          </a:fillRef>
-          <a:effectRef idx="0">
-            <a:schemeClr val="accent1"/>
-          </a:effectRef>
-          <a:fontRef idx="minor">
-            <a:schemeClr val="lt1"/>
-          </a:fontRef>
-        </p:style>
-        <p:txBody>
-          <a:bodyPr rtlCol="0" anchor="ctr"/>
-          <a:lstStyle/>
-          <a:p>
-            <a:pPr algn="ctr"/>
-            <a:endParaRPr lang="en-US"/>
-          </a:p>
-        </p:txBody>
-      </p:sp>
-      <p:sp>
-        <p:nvSpPr>
-          <p:cNvPr id="31" name="Rectangle 30">
-            <a:extLst>
-              <a:ext uri="{FF2B5EF4-FFF2-40B4-BE49-F238E27FC236}">
-                <a16:creationId xmlns:a16="http://schemas.microsoft.com/office/drawing/2014/main" id="{5CABFAEE-739B-704E-84D2-8CB46A25E166}"/>
-              </a:ext>
-            </a:extLst>
-          </p:cNvPr>
-          <p:cNvSpPr/>
-          <p:nvPr/>
-        </p:nvSpPr>
-        <p:spPr>
-          <a:xfrm rot="3070037">
-            <a:off x="927969" y="-82181"/>
-            <a:ext cx="504049" cy="1611808"/>
-          </a:xfrm>
-          <a:prstGeom prst="rect">
-            <a:avLst/>
-          </a:prstGeom>
-          <a:solidFill>
-            <a:schemeClr val="accent5">
-              <a:lumMod val="60000"/>
-              <a:lumOff val="40000"/>
-            </a:schemeClr>
-          </a:solidFill>
-        </p:spPr>
-        <p:style>
-          <a:lnRef idx="2">
-            <a:schemeClr val="accent1">
-              <a:shade val="50000"/>
-            </a:schemeClr>
-          </a:lnRef>
-          <a:fillRef idx="1">
-            <a:schemeClr val="accent1"/>
-          </a:fillRef>
-          <a:effectRef idx="0">
-            <a:schemeClr val="accent1"/>
-          </a:effectRef>
-          <a:fontRef idx="minor">
-            <a:schemeClr val="lt1"/>
-          </a:fontRef>
-        </p:style>
-        <p:txBody>
-          <a:bodyPr rtlCol="0" anchor="ctr"/>
-          <a:lstStyle/>
-          <a:p>
-            <a:pPr algn="ctr"/>
-            <a:endParaRPr lang="en-US"/>
-          </a:p>
-        </p:txBody>
-      </p:sp>
-      <p:sp>
-        <p:nvSpPr>
-          <p:cNvPr id="32" name="TextBox 31">
-            <a:extLst>
-              <a:ext uri="{FF2B5EF4-FFF2-40B4-BE49-F238E27FC236}">
-                <a16:creationId xmlns:a16="http://schemas.microsoft.com/office/drawing/2014/main" id="{EFF00613-8EA2-A14E-8A44-962FC5BF30A9}"/>
-              </a:ext>
-            </a:extLst>
-          </p:cNvPr>
-          <p:cNvSpPr txBox="1"/>
-          <p:nvPr/>
-        </p:nvSpPr>
-        <p:spPr>
-          <a:xfrm>
-            <a:off x="346046" y="3089409"/>
-            <a:ext cx="292068" cy="461665"/>
-          </a:xfrm>
-          <a:prstGeom prst="rect">
-            <a:avLst/>
-          </a:prstGeom>
-          <a:noFill/>
-        </p:spPr>
-        <p:txBody>
-          <a:bodyPr wrap="none" rtlCol="0">
-            <a:spAutoFit/>
-          </a:bodyPr>
-          <a:lstStyle/>
-          <a:p>
-            <a:r>
-              <a:rPr lang="en-US" sz="2400" dirty="0"/>
-              <a:t>r</a:t>
-            </a:r>
-          </a:p>
-        </p:txBody>
-      </p:sp>
-      <p:sp>
-        <p:nvSpPr>
-          <p:cNvPr id="33" name="TextBox 32">
-            <a:extLst>
-              <a:ext uri="{FF2B5EF4-FFF2-40B4-BE49-F238E27FC236}">
-                <a16:creationId xmlns:a16="http://schemas.microsoft.com/office/drawing/2014/main" id="{6DC2D984-5B98-5942-826D-3B5B7D3FEE03}"/>
-              </a:ext>
-            </a:extLst>
-          </p:cNvPr>
-          <p:cNvSpPr txBox="1"/>
-          <p:nvPr/>
-        </p:nvSpPr>
-        <p:spPr>
-          <a:xfrm>
-            <a:off x="2535750" y="1560556"/>
-            <a:ext cx="292068" cy="461665"/>
-          </a:xfrm>
-          <a:prstGeom prst="rect">
-            <a:avLst/>
-          </a:prstGeom>
-          <a:noFill/>
-        </p:spPr>
-        <p:txBody>
-          <a:bodyPr wrap="none" rtlCol="0">
-            <a:spAutoFit/>
-          </a:bodyPr>
-          <a:lstStyle/>
-          <a:p>
-            <a:r>
-              <a:rPr lang="en-US" sz="2400" dirty="0"/>
-              <a:t>r</a:t>
-            </a:r>
-          </a:p>
-        </p:txBody>
-      </p:sp>
-      <p:sp>
-        <p:nvSpPr>
-          <p:cNvPr id="34" name="TextBox 33">
-            <a:extLst>
-              <a:ext uri="{FF2B5EF4-FFF2-40B4-BE49-F238E27FC236}">
-                <a16:creationId xmlns:a16="http://schemas.microsoft.com/office/drawing/2014/main" id="{B7258640-ED44-2843-96FC-1DA85DE23AA1}"/>
-              </a:ext>
-            </a:extLst>
-          </p:cNvPr>
-          <p:cNvSpPr txBox="1"/>
-          <p:nvPr/>
-        </p:nvSpPr>
-        <p:spPr>
-          <a:xfrm rot="2879544">
-            <a:off x="296116" y="1067913"/>
-            <a:ext cx="292068" cy="461665"/>
-          </a:xfrm>
-          <a:prstGeom prst="rect">
-            <a:avLst/>
-          </a:prstGeom>
-          <a:noFill/>
-        </p:spPr>
-        <p:txBody>
-          <a:bodyPr wrap="none" rtlCol="0">
-            <a:spAutoFit/>
-          </a:bodyPr>
-          <a:lstStyle/>
-          <a:p>
-            <a:r>
-              <a:rPr lang="en-US" sz="2400" dirty="0"/>
-              <a:t>r</a:t>
-            </a:r>
-          </a:p>
-        </p:txBody>
-      </p:sp>
-      <p:grpSp>
-        <p:nvGrpSpPr>
-          <p:cNvPr id="35" name="Group 34">
-            <a:extLst>
-              <a:ext uri="{FF2B5EF4-FFF2-40B4-BE49-F238E27FC236}">
-                <a16:creationId xmlns:a16="http://schemas.microsoft.com/office/drawing/2014/main" id="{51BC2AF0-F82E-FB45-A032-966C83A932EB}"/>
-              </a:ext>
-            </a:extLst>
-          </p:cNvPr>
-          <p:cNvGrpSpPr/>
-          <p:nvPr/>
-        </p:nvGrpSpPr>
-        <p:grpSpPr>
-          <a:xfrm>
-            <a:off x="6246027" y="849683"/>
-            <a:ext cx="2157769" cy="2530398"/>
-            <a:chOff x="3286342" y="1145198"/>
-            <a:chExt cx="2157769" cy="2530398"/>
-          </a:xfrm>
-        </p:grpSpPr>
         <p:sp>
           <p:nvSpPr>
-            <p:cNvPr id="36" name="Rectangle 35">
+            <p:cNvPr id="32" name="TextBox 31">
               <a:extLst>
                 <a:ext uri="{FF2B5EF4-FFF2-40B4-BE49-F238E27FC236}">
-                  <a16:creationId xmlns:a16="http://schemas.microsoft.com/office/drawing/2014/main" id="{062F52CE-FF25-A342-96BB-F1B2C9D4F7E1}"/>
+                  <a16:creationId xmlns:a16="http://schemas.microsoft.com/office/drawing/2014/main" xmlns="" id="{EFF00613-8EA2-A14E-8A44-962FC5BF30A9}"/>
+                </a:ext>
+              </a:extLst>
+            </p:cNvPr>
+            <p:cNvSpPr txBox="1"/>
+            <p:nvPr/>
+          </p:nvSpPr>
+          <p:spPr>
+            <a:xfrm>
+              <a:off x="346046" y="3089409"/>
+              <a:ext cx="292068" cy="461665"/>
+            </a:xfrm>
+            <a:prstGeom prst="rect">
+              <a:avLst/>
+            </a:prstGeom>
+            <a:noFill/>
+          </p:spPr>
+          <p:txBody>
+            <a:bodyPr wrap="none" rtlCol="0">
+              <a:spAutoFit/>
+            </a:bodyPr>
+            <a:lstStyle/>
+            <a:p>
+              <a:r>
+                <a:rPr lang="en-US" sz="2400" dirty="0"/>
+                <a:t>r</a:t>
+              </a:r>
+            </a:p>
+          </p:txBody>
+        </p:sp>
+        <p:sp>
+          <p:nvSpPr>
+            <p:cNvPr id="33" name="TextBox 32">
+              <a:extLst>
+                <a:ext uri="{FF2B5EF4-FFF2-40B4-BE49-F238E27FC236}">
+                  <a16:creationId xmlns:a16="http://schemas.microsoft.com/office/drawing/2014/main" xmlns="" id="{6DC2D984-5B98-5942-826D-3B5B7D3FEE03}"/>
+                </a:ext>
+              </a:extLst>
+            </p:cNvPr>
+            <p:cNvSpPr txBox="1"/>
+            <p:nvPr/>
+          </p:nvSpPr>
+          <p:spPr>
+            <a:xfrm>
+              <a:off x="2535750" y="1560556"/>
+              <a:ext cx="292068" cy="461665"/>
+            </a:xfrm>
+            <a:prstGeom prst="rect">
+              <a:avLst/>
+            </a:prstGeom>
+            <a:noFill/>
+          </p:spPr>
+          <p:txBody>
+            <a:bodyPr wrap="none" rtlCol="0">
+              <a:spAutoFit/>
+            </a:bodyPr>
+            <a:lstStyle/>
+            <a:p>
+              <a:r>
+                <a:rPr lang="en-US" sz="2400" dirty="0"/>
+                <a:t>r</a:t>
+              </a:r>
+            </a:p>
+          </p:txBody>
+        </p:sp>
+        <p:sp>
+          <p:nvSpPr>
+            <p:cNvPr id="34" name="TextBox 33">
+              <a:extLst>
+                <a:ext uri="{FF2B5EF4-FFF2-40B4-BE49-F238E27FC236}">
+                  <a16:creationId xmlns:a16="http://schemas.microsoft.com/office/drawing/2014/main" xmlns="" id="{B7258640-ED44-2843-96FC-1DA85DE23AA1}"/>
+                </a:ext>
+              </a:extLst>
+            </p:cNvPr>
+            <p:cNvSpPr txBox="1"/>
+            <p:nvPr/>
+          </p:nvSpPr>
+          <p:spPr>
+            <a:xfrm rot="2879544">
+              <a:off x="296116" y="1067913"/>
+              <a:ext cx="292068" cy="461665"/>
+            </a:xfrm>
+            <a:prstGeom prst="rect">
+              <a:avLst/>
+            </a:prstGeom>
+            <a:noFill/>
+          </p:spPr>
+          <p:txBody>
+            <a:bodyPr wrap="none" rtlCol="0">
+              <a:spAutoFit/>
+            </a:bodyPr>
+            <a:lstStyle/>
+            <a:p>
+              <a:r>
+                <a:rPr lang="en-US" sz="2400" dirty="0"/>
+                <a:t>r</a:t>
+              </a:r>
+            </a:p>
+          </p:txBody>
+        </p:sp>
+        <p:grpSp>
+          <p:nvGrpSpPr>
+            <p:cNvPr id="35" name="Group 34">
+              <a:extLst>
+                <a:ext uri="{FF2B5EF4-FFF2-40B4-BE49-F238E27FC236}">
+                  <a16:creationId xmlns:a16="http://schemas.microsoft.com/office/drawing/2014/main" xmlns="" id="{51BC2AF0-F82E-FB45-A032-966C83A932EB}"/>
+                </a:ext>
+              </a:extLst>
+            </p:cNvPr>
+            <p:cNvGrpSpPr/>
+            <p:nvPr/>
+          </p:nvGrpSpPr>
+          <p:grpSpPr>
+            <a:xfrm>
+              <a:off x="6246027" y="849683"/>
+              <a:ext cx="2157769" cy="2530398"/>
+              <a:chOff x="3286342" y="1145198"/>
+              <a:chExt cx="2157769" cy="2530398"/>
+            </a:xfrm>
+          </p:grpSpPr>
+          <p:sp>
+            <p:nvSpPr>
+              <p:cNvPr id="36" name="Rectangle 35">
+                <a:extLst>
+                  <a:ext uri="{FF2B5EF4-FFF2-40B4-BE49-F238E27FC236}">
+                    <a16:creationId xmlns:a16="http://schemas.microsoft.com/office/drawing/2014/main" xmlns="" id="{062F52CE-FF25-A342-96BB-F1B2C9D4F7E1}"/>
+                  </a:ext>
+                </a:extLst>
+              </p:cNvPr>
+              <p:cNvSpPr/>
+              <p:nvPr/>
+            </p:nvSpPr>
+            <p:spPr>
+              <a:xfrm>
+                <a:off x="3286342" y="1993335"/>
+                <a:ext cx="150041" cy="1682261"/>
+              </a:xfrm>
+              <a:prstGeom prst="rect">
+                <a:avLst/>
+              </a:prstGeom>
+              <a:solidFill>
+                <a:schemeClr val="accent4">
+                  <a:lumMod val="40000"/>
+                  <a:lumOff val="60000"/>
+                </a:schemeClr>
+              </a:solidFill>
+            </p:spPr>
+            <p:style>
+              <a:lnRef idx="2">
+                <a:schemeClr val="accent1">
+                  <a:shade val="50000"/>
+                </a:schemeClr>
+              </a:lnRef>
+              <a:fillRef idx="1">
+                <a:schemeClr val="accent1"/>
+              </a:fillRef>
+              <a:effectRef idx="0">
+                <a:schemeClr val="accent1"/>
+              </a:effectRef>
+              <a:fontRef idx="minor">
+                <a:schemeClr val="lt1"/>
+              </a:fontRef>
+            </p:style>
+            <p:txBody>
+              <a:bodyPr rtlCol="0" anchor="ctr"/>
+              <a:lstStyle/>
+              <a:p>
+                <a:pPr algn="ctr"/>
+                <a:endParaRPr lang="en-US"/>
+              </a:p>
+            </p:txBody>
+          </p:sp>
+          <p:sp>
+            <p:nvSpPr>
+              <p:cNvPr id="37" name="Rectangle 36">
+                <a:extLst>
+                  <a:ext uri="{FF2B5EF4-FFF2-40B4-BE49-F238E27FC236}">
+                    <a16:creationId xmlns:a16="http://schemas.microsoft.com/office/drawing/2014/main" xmlns="" id="{EE054CD7-4A36-A44E-89B6-D7B22590944D}"/>
+                  </a:ext>
+                </a:extLst>
+              </p:cNvPr>
+              <p:cNvSpPr/>
+              <p:nvPr/>
+            </p:nvSpPr>
+            <p:spPr>
+              <a:xfrm rot="5400000">
+                <a:off x="4527960" y="1077184"/>
+                <a:ext cx="150041" cy="1682261"/>
+              </a:xfrm>
+              <a:prstGeom prst="rect">
+                <a:avLst/>
+              </a:prstGeom>
+              <a:solidFill>
+                <a:schemeClr val="accent2">
+                  <a:lumMod val="60000"/>
+                  <a:lumOff val="40000"/>
+                </a:schemeClr>
+              </a:solidFill>
+            </p:spPr>
+            <p:style>
+              <a:lnRef idx="2">
+                <a:schemeClr val="accent1">
+                  <a:shade val="50000"/>
+                </a:schemeClr>
+              </a:lnRef>
+              <a:fillRef idx="1">
+                <a:schemeClr val="accent1"/>
+              </a:fillRef>
+              <a:effectRef idx="0">
+                <a:schemeClr val="accent1"/>
+              </a:effectRef>
+              <a:fontRef idx="minor">
+                <a:schemeClr val="lt1"/>
+              </a:fontRef>
+            </p:style>
+            <p:txBody>
+              <a:bodyPr rtlCol="0" anchor="ctr"/>
+              <a:lstStyle/>
+              <a:p>
+                <a:pPr algn="ctr"/>
+                <a:endParaRPr lang="en-US"/>
+              </a:p>
+            </p:txBody>
+          </p:sp>
+          <p:sp>
+            <p:nvSpPr>
+              <p:cNvPr id="38" name="Rectangle 37">
+                <a:extLst>
+                  <a:ext uri="{FF2B5EF4-FFF2-40B4-BE49-F238E27FC236}">
+                    <a16:creationId xmlns:a16="http://schemas.microsoft.com/office/drawing/2014/main" xmlns="" id="{2A69634C-3C8F-7349-81AB-203E88AAFC1D}"/>
+                  </a:ext>
+                </a:extLst>
+              </p:cNvPr>
+              <p:cNvSpPr/>
+              <p:nvPr/>
+            </p:nvSpPr>
+            <p:spPr>
+              <a:xfrm rot="3016596">
+                <a:off x="4116846" y="379088"/>
+                <a:ext cx="150041" cy="1682261"/>
+              </a:xfrm>
+              <a:prstGeom prst="rect">
+                <a:avLst/>
+              </a:prstGeom>
+              <a:solidFill>
+                <a:schemeClr val="accent5">
+                  <a:lumMod val="60000"/>
+                  <a:lumOff val="40000"/>
+                </a:schemeClr>
+              </a:solidFill>
+            </p:spPr>
+            <p:style>
+              <a:lnRef idx="2">
+                <a:schemeClr val="accent1">
+                  <a:shade val="50000"/>
+                </a:schemeClr>
+              </a:lnRef>
+              <a:fillRef idx="1">
+                <a:schemeClr val="accent1"/>
+              </a:fillRef>
+              <a:effectRef idx="0">
+                <a:schemeClr val="accent1"/>
+              </a:effectRef>
+              <a:fontRef idx="minor">
+                <a:schemeClr val="lt1"/>
+              </a:fontRef>
+            </p:style>
+            <p:txBody>
+              <a:bodyPr rtlCol="0" anchor="ctr"/>
+              <a:lstStyle/>
+              <a:p>
+                <a:pPr algn="ctr"/>
+                <a:endParaRPr lang="en-US"/>
+              </a:p>
+            </p:txBody>
+          </p:sp>
+        </p:grpSp>
+        <p:grpSp>
+          <p:nvGrpSpPr>
+            <p:cNvPr id="39" name="Group 38">
+              <a:extLst>
+                <a:ext uri="{FF2B5EF4-FFF2-40B4-BE49-F238E27FC236}">
+                  <a16:creationId xmlns:a16="http://schemas.microsoft.com/office/drawing/2014/main" xmlns="" id="{D8CC6D81-4B92-E649-B350-1A3670F20B49}"/>
+                </a:ext>
+              </a:extLst>
+            </p:cNvPr>
+            <p:cNvGrpSpPr/>
+            <p:nvPr/>
+          </p:nvGrpSpPr>
+          <p:grpSpPr>
+            <a:xfrm>
+              <a:off x="9808035" y="849683"/>
+              <a:ext cx="2157769" cy="2530398"/>
+              <a:chOff x="3286342" y="1145198"/>
+              <a:chExt cx="2157769" cy="2530398"/>
+            </a:xfrm>
+          </p:grpSpPr>
+          <p:sp>
+            <p:nvSpPr>
+              <p:cNvPr id="40" name="Rectangle 39">
+                <a:extLst>
+                  <a:ext uri="{FF2B5EF4-FFF2-40B4-BE49-F238E27FC236}">
+                    <a16:creationId xmlns:a16="http://schemas.microsoft.com/office/drawing/2014/main" xmlns="" id="{35304DB2-6E07-9843-8F75-5DB92C1077FC}"/>
+                  </a:ext>
+                </a:extLst>
+              </p:cNvPr>
+              <p:cNvSpPr/>
+              <p:nvPr/>
+            </p:nvSpPr>
+            <p:spPr>
+              <a:xfrm>
+                <a:off x="3286342" y="1993335"/>
+                <a:ext cx="150041" cy="1682261"/>
+              </a:xfrm>
+              <a:prstGeom prst="rect">
+                <a:avLst/>
+              </a:prstGeom>
+              <a:solidFill>
+                <a:schemeClr val="accent4">
+                  <a:lumMod val="40000"/>
+                  <a:lumOff val="60000"/>
+                </a:schemeClr>
+              </a:solidFill>
+            </p:spPr>
+            <p:style>
+              <a:lnRef idx="2">
+                <a:schemeClr val="accent1">
+                  <a:shade val="50000"/>
+                </a:schemeClr>
+              </a:lnRef>
+              <a:fillRef idx="1">
+                <a:schemeClr val="accent1"/>
+              </a:fillRef>
+              <a:effectRef idx="0">
+                <a:schemeClr val="accent1"/>
+              </a:effectRef>
+              <a:fontRef idx="minor">
+                <a:schemeClr val="lt1"/>
+              </a:fontRef>
+            </p:style>
+            <p:txBody>
+              <a:bodyPr rtlCol="0" anchor="ctr"/>
+              <a:lstStyle/>
+              <a:p>
+                <a:pPr algn="ctr"/>
+                <a:endParaRPr lang="en-US"/>
+              </a:p>
+            </p:txBody>
+          </p:sp>
+          <p:sp>
+            <p:nvSpPr>
+              <p:cNvPr id="41" name="Rectangle 40">
+                <a:extLst>
+                  <a:ext uri="{FF2B5EF4-FFF2-40B4-BE49-F238E27FC236}">
+                    <a16:creationId xmlns:a16="http://schemas.microsoft.com/office/drawing/2014/main" xmlns="" id="{C40B7C67-EAEB-6B42-8369-4058C9B561F5}"/>
+                  </a:ext>
+                </a:extLst>
+              </p:cNvPr>
+              <p:cNvSpPr/>
+              <p:nvPr/>
+            </p:nvSpPr>
+            <p:spPr>
+              <a:xfrm rot="5400000">
+                <a:off x="4527960" y="1077184"/>
+                <a:ext cx="150041" cy="1682261"/>
+              </a:xfrm>
+              <a:prstGeom prst="rect">
+                <a:avLst/>
+              </a:prstGeom>
+              <a:solidFill>
+                <a:schemeClr val="accent2">
+                  <a:lumMod val="60000"/>
+                  <a:lumOff val="40000"/>
+                </a:schemeClr>
+              </a:solidFill>
+            </p:spPr>
+            <p:style>
+              <a:lnRef idx="2">
+                <a:schemeClr val="accent1">
+                  <a:shade val="50000"/>
+                </a:schemeClr>
+              </a:lnRef>
+              <a:fillRef idx="1">
+                <a:schemeClr val="accent1"/>
+              </a:fillRef>
+              <a:effectRef idx="0">
+                <a:schemeClr val="accent1"/>
+              </a:effectRef>
+              <a:fontRef idx="minor">
+                <a:schemeClr val="lt1"/>
+              </a:fontRef>
+            </p:style>
+            <p:txBody>
+              <a:bodyPr rtlCol="0" anchor="ctr"/>
+              <a:lstStyle/>
+              <a:p>
+                <a:pPr algn="ctr"/>
+                <a:endParaRPr lang="en-US"/>
+              </a:p>
+            </p:txBody>
+          </p:sp>
+          <p:sp>
+            <p:nvSpPr>
+              <p:cNvPr id="42" name="Rectangle 41">
+                <a:extLst>
+                  <a:ext uri="{FF2B5EF4-FFF2-40B4-BE49-F238E27FC236}">
+                    <a16:creationId xmlns:a16="http://schemas.microsoft.com/office/drawing/2014/main" xmlns="" id="{59424E4C-7210-F44A-938A-DA90DBD1F614}"/>
+                  </a:ext>
+                </a:extLst>
+              </p:cNvPr>
+              <p:cNvSpPr/>
+              <p:nvPr/>
+            </p:nvSpPr>
+            <p:spPr>
+              <a:xfrm rot="3016596">
+                <a:off x="4116846" y="379088"/>
+                <a:ext cx="150041" cy="1682261"/>
+              </a:xfrm>
+              <a:prstGeom prst="rect">
+                <a:avLst/>
+              </a:prstGeom>
+              <a:solidFill>
+                <a:schemeClr val="accent5">
+                  <a:lumMod val="60000"/>
+                  <a:lumOff val="40000"/>
+                </a:schemeClr>
+              </a:solidFill>
+            </p:spPr>
+            <p:style>
+              <a:lnRef idx="2">
+                <a:schemeClr val="accent1">
+                  <a:shade val="50000"/>
+                </a:schemeClr>
+              </a:lnRef>
+              <a:fillRef idx="1">
+                <a:schemeClr val="accent1"/>
+              </a:fillRef>
+              <a:effectRef idx="0">
+                <a:schemeClr val="accent1"/>
+              </a:effectRef>
+              <a:fontRef idx="minor">
+                <a:schemeClr val="lt1"/>
+              </a:fontRef>
+            </p:style>
+            <p:txBody>
+              <a:bodyPr rtlCol="0" anchor="ctr"/>
+              <a:lstStyle/>
+              <a:p>
+                <a:pPr algn="ctr"/>
+                <a:endParaRPr lang="en-US"/>
+              </a:p>
+            </p:txBody>
+          </p:sp>
+        </p:grpSp>
+        <mc:AlternateContent xmlns:mc="http://schemas.openxmlformats.org/markup-compatibility/2006">
+          <mc:Choice xmlns:a14="http://schemas.microsoft.com/office/drawing/2010/main" Requires="a14">
+            <p:sp>
+              <p:nvSpPr>
+                <p:cNvPr id="44" name="TextBox 43">
+                  <a:extLst>
+                    <a:ext uri="{FF2B5EF4-FFF2-40B4-BE49-F238E27FC236}">
+                      <a16:creationId xmlns:a16="http://schemas.microsoft.com/office/drawing/2014/main" xmlns="" id="{3B1F6128-78F6-AD40-A889-8CE98CB2BA37}"/>
+                    </a:ext>
+                  </a:extLst>
+                </p:cNvPr>
+                <p:cNvSpPr txBox="1"/>
+                <p:nvPr/>
+              </p:nvSpPr>
+              <p:spPr>
+                <a:xfrm>
+                  <a:off x="912163" y="5353952"/>
+                  <a:ext cx="535659" cy="461665"/>
+                </a:xfrm>
+                <a:prstGeom prst="rect">
+                  <a:avLst/>
+                </a:prstGeom>
+                <a:noFill/>
+              </p:spPr>
+              <p:txBody>
+                <a:bodyPr wrap="none" rtlCol="0">
+                  <a:spAutoFit/>
+                </a:bodyPr>
+                <a:lstStyle/>
+                <a:p>
+                  <a:pPr/>
+                  <a14:m>
+                    <m:oMathPara xmlns:m="http://schemas.openxmlformats.org/officeDocument/2006/math">
+                      <m:oMathParaPr>
+                        <m:jc m:val="centerGroup"/>
+                      </m:oMathParaPr>
+                      <m:oMath xmlns:m="http://schemas.openxmlformats.org/officeDocument/2006/math">
+                        <m:sSub>
+                          <m:sSubPr>
+                            <m:ctrlPr>
+                              <a:rPr lang="en-US" sz="2400" b="1" i="1" smtClean="0">
+                                <a:latin typeface="Cambria Math" charset="0"/>
+                              </a:rPr>
+                            </m:ctrlPr>
+                          </m:sSubPr>
+                          <m:e>
+                            <m:r>
+                              <a:rPr lang="en-US" sz="2400" b="1" i="1" smtClean="0">
+                                <a:latin typeface="Cambria Math" panose="02040503050406030204" pitchFamily="18" charset="0"/>
+                              </a:rPr>
+                              <m:t>𝑰</m:t>
+                            </m:r>
+                          </m:e>
+                          <m:sub>
+                            <m:r>
+                              <a:rPr lang="en-US" sz="2400" b="1" i="1" smtClean="0">
+                                <a:latin typeface="Cambria Math" panose="02040503050406030204" pitchFamily="18" charset="0"/>
+                              </a:rPr>
+                              <m:t>𝟐</m:t>
+                            </m:r>
+                          </m:sub>
+                        </m:sSub>
+                      </m:oMath>
+                    </m:oMathPara>
+                  </a14:m>
+                  <a:endParaRPr lang="en-US" sz="2400" b="1" dirty="0"/>
+                </a:p>
+              </p:txBody>
+            </p:sp>
+          </mc:Choice>
+          <mc:Fallback>
+            <p:sp>
+              <p:nvSpPr>
+                <p:cNvPr id="44" name="TextBox 43">
+                  <a:extLst>
+                    <a:ext uri="{FF2B5EF4-FFF2-40B4-BE49-F238E27FC236}">
+                      <a16:creationId xmlns:a16="http://schemas.microsoft.com/office/drawing/2014/main" xmlns:a14="http://schemas.microsoft.com/office/drawing/2010/main" xmlns="" id="{3B1F6128-78F6-AD40-A889-8CE98CB2BA37}"/>
+                    </a:ext>
+                  </a:extLst>
+                </p:cNvPr>
+                <p:cNvSpPr txBox="1">
+                  <a:spLocks noRot="1" noChangeAspect="1" noMove="1" noResize="1" noEditPoints="1" noAdjustHandles="1" noChangeArrowheads="1" noChangeShapeType="1" noTextEdit="1"/>
+                </p:cNvSpPr>
+                <p:nvPr/>
+              </p:nvSpPr>
+              <p:spPr>
+                <a:xfrm>
+                  <a:off x="912163" y="5353952"/>
+                  <a:ext cx="535659" cy="461665"/>
+                </a:xfrm>
+                <a:prstGeom prst="rect">
+                  <a:avLst/>
+                </a:prstGeom>
+                <a:blipFill rotWithShape="0">
+                  <a:blip r:embed="rId2"/>
+                  <a:stretch>
+                    <a:fillRect b="-2632"/>
+                  </a:stretch>
+                </a:blipFill>
+              </p:spPr>
+              <p:txBody>
+                <a:bodyPr/>
+                <a:lstStyle/>
+                <a:p>
+                  <a:r>
+                    <a:rPr lang="en-US">
+                      <a:noFill/>
+                    </a:rPr>
+                    <a:t> </a:t>
+                  </a:r>
+                </a:p>
+              </p:txBody>
+            </p:sp>
+          </mc:Fallback>
+        </mc:AlternateContent>
+        <mc:AlternateContent xmlns:mc="http://schemas.openxmlformats.org/markup-compatibility/2006">
+          <mc:Choice xmlns:a14="http://schemas.microsoft.com/office/drawing/2010/main" Requires="a14">
+            <p:sp>
+              <p:nvSpPr>
+                <p:cNvPr id="45" name="TextBox 44">
+                  <a:extLst>
+                    <a:ext uri="{FF2B5EF4-FFF2-40B4-BE49-F238E27FC236}">
+                      <a16:creationId xmlns:a16="http://schemas.microsoft.com/office/drawing/2014/main" xmlns="" id="{789EE21D-8264-6B4F-A914-288BD7311E73}"/>
+                    </a:ext>
+                  </a:extLst>
+                </p:cNvPr>
+                <p:cNvSpPr txBox="1"/>
+                <p:nvPr/>
+              </p:nvSpPr>
+              <p:spPr>
+                <a:xfrm>
+                  <a:off x="-61420" y="4255872"/>
+                  <a:ext cx="535659" cy="461665"/>
+                </a:xfrm>
+                <a:prstGeom prst="rect">
+                  <a:avLst/>
+                </a:prstGeom>
+                <a:noFill/>
+              </p:spPr>
+              <p:txBody>
+                <a:bodyPr wrap="none" rtlCol="0">
+                  <a:spAutoFit/>
+                </a:bodyPr>
+                <a:lstStyle/>
+                <a:p>
+                  <a:pPr/>
+                  <a14:m>
+                    <m:oMathPara xmlns:m="http://schemas.openxmlformats.org/officeDocument/2006/math">
+                      <m:oMathParaPr>
+                        <m:jc m:val="centerGroup"/>
+                      </m:oMathParaPr>
+                      <m:oMath xmlns:m="http://schemas.openxmlformats.org/officeDocument/2006/math">
+                        <m:sSub>
+                          <m:sSubPr>
+                            <m:ctrlPr>
+                              <a:rPr lang="en-US" sz="2400" b="1" i="1" smtClean="0">
+                                <a:latin typeface="Cambria Math" charset="0"/>
+                              </a:rPr>
+                            </m:ctrlPr>
+                          </m:sSubPr>
+                          <m:e>
+                            <m:r>
+                              <a:rPr lang="en-US" sz="2400" b="1" i="1" smtClean="0">
+                                <a:latin typeface="Cambria Math" panose="02040503050406030204" pitchFamily="18" charset="0"/>
+                              </a:rPr>
+                              <m:t>𝑰</m:t>
+                            </m:r>
+                          </m:e>
+                          <m:sub>
+                            <m:r>
+                              <a:rPr lang="en-US" sz="2400" b="1" i="1" smtClean="0">
+                                <a:latin typeface="Cambria Math" panose="02040503050406030204" pitchFamily="18" charset="0"/>
+                              </a:rPr>
+                              <m:t>𝟏</m:t>
+                            </m:r>
+                          </m:sub>
+                        </m:sSub>
+                      </m:oMath>
+                    </m:oMathPara>
+                  </a14:m>
+                  <a:endParaRPr lang="en-US" sz="2400" b="1" dirty="0"/>
+                </a:p>
+              </p:txBody>
+            </p:sp>
+          </mc:Choice>
+          <mc:Fallback>
+            <p:sp>
+              <p:nvSpPr>
+                <p:cNvPr id="45" name="TextBox 44">
+                  <a:extLst>
+                    <a:ext uri="{FF2B5EF4-FFF2-40B4-BE49-F238E27FC236}">
+                      <a16:creationId xmlns:a16="http://schemas.microsoft.com/office/drawing/2014/main" xmlns:a14="http://schemas.microsoft.com/office/drawing/2010/main" xmlns="" id="{789EE21D-8264-6B4F-A914-288BD7311E73}"/>
+                    </a:ext>
+                  </a:extLst>
+                </p:cNvPr>
+                <p:cNvSpPr txBox="1">
+                  <a:spLocks noRot="1" noChangeAspect="1" noMove="1" noResize="1" noEditPoints="1" noAdjustHandles="1" noChangeArrowheads="1" noChangeShapeType="1" noTextEdit="1"/>
+                </p:cNvSpPr>
+                <p:nvPr/>
+              </p:nvSpPr>
+              <p:spPr>
+                <a:xfrm>
+                  <a:off x="-61420" y="4255872"/>
+                  <a:ext cx="535659" cy="461665"/>
+                </a:xfrm>
+                <a:prstGeom prst="rect">
+                  <a:avLst/>
+                </a:prstGeom>
+                <a:blipFill rotWithShape="0">
+                  <a:blip r:embed="rId3"/>
+                  <a:stretch>
+                    <a:fillRect b="-2632"/>
+                  </a:stretch>
+                </a:blipFill>
+              </p:spPr>
+              <p:txBody>
+                <a:bodyPr/>
+                <a:lstStyle/>
+                <a:p>
+                  <a:r>
+                    <a:rPr lang="en-US">
+                      <a:noFill/>
+                    </a:rPr>
+                    <a:t> </a:t>
+                  </a:r>
+                </a:p>
+              </p:txBody>
+            </p:sp>
+          </mc:Fallback>
+        </mc:AlternateContent>
+        <mc:AlternateContent xmlns:mc="http://schemas.openxmlformats.org/markup-compatibility/2006">
+          <mc:Choice xmlns:a14="http://schemas.microsoft.com/office/drawing/2010/main" Requires="a14">
+            <p:sp>
+              <p:nvSpPr>
+                <p:cNvPr id="46" name="TextBox 45">
+                  <a:extLst>
+                    <a:ext uri="{FF2B5EF4-FFF2-40B4-BE49-F238E27FC236}">
+                      <a16:creationId xmlns:a16="http://schemas.microsoft.com/office/drawing/2014/main" xmlns="" id="{B7A59F2B-B700-5F4A-AFEB-84A10F8DBC1D}"/>
+                    </a:ext>
+                  </a:extLst>
+                </p:cNvPr>
+                <p:cNvSpPr txBox="1"/>
+                <p:nvPr/>
+              </p:nvSpPr>
+              <p:spPr>
+                <a:xfrm rot="2183489">
+                  <a:off x="129383" y="3469731"/>
+                  <a:ext cx="535659" cy="461665"/>
+                </a:xfrm>
+                <a:prstGeom prst="rect">
+                  <a:avLst/>
+                </a:prstGeom>
+                <a:noFill/>
+              </p:spPr>
+              <p:txBody>
+                <a:bodyPr wrap="none" rtlCol="0">
+                  <a:spAutoFit/>
+                </a:bodyPr>
+                <a:lstStyle/>
+                <a:p>
+                  <a:pPr/>
+                  <a14:m>
+                    <m:oMathPara xmlns:m="http://schemas.openxmlformats.org/officeDocument/2006/math">
+                      <m:oMathParaPr>
+                        <m:jc m:val="centerGroup"/>
+                      </m:oMathParaPr>
+                      <m:oMath xmlns:m="http://schemas.openxmlformats.org/officeDocument/2006/math">
+                        <m:sSub>
+                          <m:sSubPr>
+                            <m:ctrlPr>
+                              <a:rPr lang="en-US" sz="2400" b="1" i="1" smtClean="0">
+                                <a:latin typeface="Cambria Math" charset="0"/>
+                              </a:rPr>
+                            </m:ctrlPr>
+                          </m:sSubPr>
+                          <m:e>
+                            <m:r>
+                              <a:rPr lang="en-US" sz="2400" b="1" i="1" smtClean="0">
+                                <a:latin typeface="Cambria Math" panose="02040503050406030204" pitchFamily="18" charset="0"/>
+                              </a:rPr>
+                              <m:t>𝑰</m:t>
+                            </m:r>
+                          </m:e>
+                          <m:sub>
+                            <m:r>
+                              <a:rPr lang="en-US" sz="2400" b="1" i="1" smtClean="0">
+                                <a:latin typeface="Cambria Math" panose="02040503050406030204" pitchFamily="18" charset="0"/>
+                              </a:rPr>
+                              <m:t>𝟑</m:t>
+                            </m:r>
+                          </m:sub>
+                        </m:sSub>
+                      </m:oMath>
+                    </m:oMathPara>
+                  </a14:m>
+                  <a:endParaRPr lang="en-US" sz="2400" b="1" dirty="0"/>
+                </a:p>
+              </p:txBody>
+            </p:sp>
+          </mc:Choice>
+          <mc:Fallback>
+            <p:sp>
+              <p:nvSpPr>
+                <p:cNvPr id="46" name="TextBox 45">
+                  <a:extLst>
+                    <a:ext uri="{FF2B5EF4-FFF2-40B4-BE49-F238E27FC236}">
+                      <a16:creationId xmlns:a16="http://schemas.microsoft.com/office/drawing/2014/main" xmlns:a14="http://schemas.microsoft.com/office/drawing/2010/main" xmlns="" id="{B7A59F2B-B700-5F4A-AFEB-84A10F8DBC1D}"/>
+                    </a:ext>
+                  </a:extLst>
+                </p:cNvPr>
+                <p:cNvSpPr txBox="1">
+                  <a:spLocks noRot="1" noChangeAspect="1" noMove="1" noResize="1" noEditPoints="1" noAdjustHandles="1" noChangeArrowheads="1" noChangeShapeType="1" noTextEdit="1"/>
+                </p:cNvSpPr>
+                <p:nvPr/>
+              </p:nvSpPr>
+              <p:spPr>
+                <a:xfrm rot="2183489">
+                  <a:off x="129383" y="3469731"/>
+                  <a:ext cx="535659" cy="461665"/>
+                </a:xfrm>
+                <a:prstGeom prst="rect">
+                  <a:avLst/>
+                </a:prstGeom>
+                <a:blipFill rotWithShape="0">
+                  <a:blip r:embed="rId4"/>
+                  <a:stretch>
+                    <a:fillRect/>
+                  </a:stretch>
+                </a:blipFill>
+              </p:spPr>
+              <p:txBody>
+                <a:bodyPr/>
+                <a:lstStyle/>
+                <a:p>
+                  <a:r>
+                    <a:rPr lang="en-US">
+                      <a:noFill/>
+                    </a:rPr>
+                    <a:t> </a:t>
+                  </a:r>
+                </a:p>
+              </p:txBody>
+            </p:sp>
+          </mc:Fallback>
+        </mc:AlternateContent>
+        <mc:AlternateContent xmlns:mc="http://schemas.openxmlformats.org/markup-compatibility/2006">
+          <mc:Choice xmlns:a14="http://schemas.microsoft.com/office/drawing/2010/main" Requires="a14">
+            <p:sp>
+              <p:nvSpPr>
+                <p:cNvPr id="47" name="TextBox 46">
+                  <a:extLst>
+                    <a:ext uri="{FF2B5EF4-FFF2-40B4-BE49-F238E27FC236}">
+                      <a16:creationId xmlns:a16="http://schemas.microsoft.com/office/drawing/2014/main" xmlns="" id="{7AF0356C-BBD9-C544-822F-688B605FD83A}"/>
+                    </a:ext>
+                  </a:extLst>
+                </p:cNvPr>
+                <p:cNvSpPr txBox="1"/>
+                <p:nvPr/>
+              </p:nvSpPr>
+              <p:spPr>
+                <a:xfrm>
+                  <a:off x="-116840" y="1956016"/>
+                  <a:ext cx="535659" cy="461665"/>
+                </a:xfrm>
+                <a:prstGeom prst="rect">
+                  <a:avLst/>
+                </a:prstGeom>
+                <a:noFill/>
+              </p:spPr>
+              <p:txBody>
+                <a:bodyPr wrap="none" rtlCol="0">
+                  <a:spAutoFit/>
+                </a:bodyPr>
+                <a:lstStyle/>
+                <a:p>
+                  <a:pPr/>
+                  <a14:m>
+                    <m:oMathPara xmlns:m="http://schemas.openxmlformats.org/officeDocument/2006/math">
+                      <m:oMathParaPr>
+                        <m:jc m:val="centerGroup"/>
+                      </m:oMathParaPr>
+                      <m:oMath xmlns:m="http://schemas.openxmlformats.org/officeDocument/2006/math">
+                        <m:sSub>
+                          <m:sSubPr>
+                            <m:ctrlPr>
+                              <a:rPr lang="en-US" sz="2400" b="1" i="1" smtClean="0">
+                                <a:latin typeface="Cambria Math" charset="0"/>
+                              </a:rPr>
+                            </m:ctrlPr>
+                          </m:sSubPr>
+                          <m:e>
+                            <m:r>
+                              <a:rPr lang="en-US" sz="2400" b="1" i="1" smtClean="0">
+                                <a:latin typeface="Cambria Math" panose="02040503050406030204" pitchFamily="18" charset="0"/>
+                              </a:rPr>
+                              <m:t>𝑰</m:t>
+                            </m:r>
+                          </m:e>
+                          <m:sub>
+                            <m:r>
+                              <a:rPr lang="en-US" sz="2400" b="1" i="1" smtClean="0">
+                                <a:latin typeface="Cambria Math" panose="02040503050406030204" pitchFamily="18" charset="0"/>
+                              </a:rPr>
+                              <m:t>𝟏</m:t>
+                            </m:r>
+                          </m:sub>
+                        </m:sSub>
+                      </m:oMath>
+                    </m:oMathPara>
+                  </a14:m>
+                  <a:endParaRPr lang="en-US" sz="2400" b="1" dirty="0"/>
+                </a:p>
+              </p:txBody>
+            </p:sp>
+          </mc:Choice>
+          <mc:Fallback>
+            <p:sp>
+              <p:nvSpPr>
+                <p:cNvPr id="47" name="TextBox 46">
+                  <a:extLst>
+                    <a:ext uri="{FF2B5EF4-FFF2-40B4-BE49-F238E27FC236}">
+                      <a16:creationId xmlns:a16="http://schemas.microsoft.com/office/drawing/2014/main" xmlns:a14="http://schemas.microsoft.com/office/drawing/2010/main" xmlns="" id="{7AF0356C-BBD9-C544-822F-688B605FD83A}"/>
+                    </a:ext>
+                  </a:extLst>
+                </p:cNvPr>
+                <p:cNvSpPr txBox="1">
+                  <a:spLocks noRot="1" noChangeAspect="1" noMove="1" noResize="1" noEditPoints="1" noAdjustHandles="1" noChangeArrowheads="1" noChangeShapeType="1" noTextEdit="1"/>
+                </p:cNvSpPr>
+                <p:nvPr/>
+              </p:nvSpPr>
+              <p:spPr>
+                <a:xfrm>
+                  <a:off x="-116840" y="1956016"/>
+                  <a:ext cx="535659" cy="461665"/>
+                </a:xfrm>
+                <a:prstGeom prst="rect">
+                  <a:avLst/>
+                </a:prstGeom>
+                <a:blipFill rotWithShape="0">
+                  <a:blip r:embed="rId5"/>
+                  <a:stretch>
+                    <a:fillRect b="-1316"/>
+                  </a:stretch>
+                </a:blipFill>
+              </p:spPr>
+              <p:txBody>
+                <a:bodyPr/>
+                <a:lstStyle/>
+                <a:p>
+                  <a:r>
+                    <a:rPr lang="en-US">
+                      <a:noFill/>
+                    </a:rPr>
+                    <a:t> </a:t>
+                  </a:r>
+                </a:p>
+              </p:txBody>
+            </p:sp>
+          </mc:Fallback>
+        </mc:AlternateContent>
+        <mc:AlternateContent xmlns:mc="http://schemas.openxmlformats.org/markup-compatibility/2006">
+          <mc:Choice xmlns:a14="http://schemas.microsoft.com/office/drawing/2010/main" Requires="a14">
+            <p:sp>
+              <p:nvSpPr>
+                <p:cNvPr id="48" name="TextBox 47">
+                  <a:extLst>
+                    <a:ext uri="{FF2B5EF4-FFF2-40B4-BE49-F238E27FC236}">
+                      <a16:creationId xmlns:a16="http://schemas.microsoft.com/office/drawing/2014/main" xmlns="" id="{41D74258-15E1-7846-8456-512D77AB304D}"/>
+                    </a:ext>
+                  </a:extLst>
+                </p:cNvPr>
+                <p:cNvSpPr txBox="1"/>
+                <p:nvPr/>
+              </p:nvSpPr>
+              <p:spPr>
+                <a:xfrm>
+                  <a:off x="1459418" y="2056568"/>
+                  <a:ext cx="535659" cy="461665"/>
+                </a:xfrm>
+                <a:prstGeom prst="rect">
+                  <a:avLst/>
+                </a:prstGeom>
+                <a:noFill/>
+              </p:spPr>
+              <p:txBody>
+                <a:bodyPr wrap="none" rtlCol="0">
+                  <a:spAutoFit/>
+                </a:bodyPr>
+                <a:lstStyle/>
+                <a:p>
+                  <a:pPr/>
+                  <a14:m>
+                    <m:oMathPara xmlns:m="http://schemas.openxmlformats.org/officeDocument/2006/math">
+                      <m:oMathParaPr>
+                        <m:jc m:val="centerGroup"/>
+                      </m:oMathParaPr>
+                      <m:oMath xmlns:m="http://schemas.openxmlformats.org/officeDocument/2006/math">
+                        <m:sSub>
+                          <m:sSubPr>
+                            <m:ctrlPr>
+                              <a:rPr lang="en-US" sz="2400" b="1" i="1" smtClean="0">
+                                <a:latin typeface="Cambria Math" charset="0"/>
+                              </a:rPr>
+                            </m:ctrlPr>
+                          </m:sSubPr>
+                          <m:e>
+                            <m:r>
+                              <a:rPr lang="en-US" sz="2400" b="1" i="1" smtClean="0">
+                                <a:latin typeface="Cambria Math" panose="02040503050406030204" pitchFamily="18" charset="0"/>
+                              </a:rPr>
+                              <m:t>𝑰</m:t>
+                            </m:r>
+                          </m:e>
+                          <m:sub>
+                            <m:r>
+                              <a:rPr lang="en-US" sz="2400" b="1" i="1" smtClean="0">
+                                <a:latin typeface="Cambria Math" panose="02040503050406030204" pitchFamily="18" charset="0"/>
+                              </a:rPr>
+                              <m:t>𝟐</m:t>
+                            </m:r>
+                          </m:sub>
+                        </m:sSub>
+                      </m:oMath>
+                    </m:oMathPara>
+                  </a14:m>
+                  <a:endParaRPr lang="en-US" sz="2400" b="1" dirty="0"/>
+                </a:p>
+              </p:txBody>
+            </p:sp>
+          </mc:Choice>
+          <mc:Fallback>
+            <p:sp>
+              <p:nvSpPr>
+                <p:cNvPr id="48" name="TextBox 47">
+                  <a:extLst>
+                    <a:ext uri="{FF2B5EF4-FFF2-40B4-BE49-F238E27FC236}">
+                      <a16:creationId xmlns:a16="http://schemas.microsoft.com/office/drawing/2014/main" xmlns:a14="http://schemas.microsoft.com/office/drawing/2010/main" xmlns="" id="{41D74258-15E1-7846-8456-512D77AB304D}"/>
+                    </a:ext>
+                  </a:extLst>
+                </p:cNvPr>
+                <p:cNvSpPr txBox="1">
+                  <a:spLocks noRot="1" noChangeAspect="1" noMove="1" noResize="1" noEditPoints="1" noAdjustHandles="1" noChangeArrowheads="1" noChangeShapeType="1" noTextEdit="1"/>
+                </p:cNvSpPr>
+                <p:nvPr/>
+              </p:nvSpPr>
+              <p:spPr>
+                <a:xfrm>
+                  <a:off x="1459418" y="2056568"/>
+                  <a:ext cx="535659" cy="461665"/>
+                </a:xfrm>
+                <a:prstGeom prst="rect">
+                  <a:avLst/>
+                </a:prstGeom>
+                <a:blipFill rotWithShape="0">
+                  <a:blip r:embed="rId6"/>
+                  <a:stretch>
+                    <a:fillRect b="-2632"/>
+                  </a:stretch>
+                </a:blipFill>
+              </p:spPr>
+              <p:txBody>
+                <a:bodyPr/>
+                <a:lstStyle/>
+                <a:p>
+                  <a:r>
+                    <a:rPr lang="en-US">
+                      <a:noFill/>
+                    </a:rPr>
+                    <a:t> </a:t>
+                  </a:r>
+                </a:p>
+              </p:txBody>
+            </p:sp>
+          </mc:Fallback>
+        </mc:AlternateContent>
+        <mc:AlternateContent xmlns:mc="http://schemas.openxmlformats.org/markup-compatibility/2006">
+          <mc:Choice xmlns:a14="http://schemas.microsoft.com/office/drawing/2010/main" Requires="a14">
+            <p:sp>
+              <p:nvSpPr>
+                <p:cNvPr id="49" name="TextBox 48">
+                  <a:extLst>
+                    <a:ext uri="{FF2B5EF4-FFF2-40B4-BE49-F238E27FC236}">
+                      <a16:creationId xmlns:a16="http://schemas.microsoft.com/office/drawing/2014/main" xmlns="" id="{DC47A251-C09A-0849-A1A2-168F9BE58EE0}"/>
+                    </a:ext>
+                  </a:extLst>
+                </p:cNvPr>
+                <p:cNvSpPr txBox="1"/>
+                <p:nvPr/>
+              </p:nvSpPr>
+              <p:spPr>
+                <a:xfrm rot="2183489">
+                  <a:off x="531167" y="172347"/>
+                  <a:ext cx="535659" cy="461665"/>
+                </a:xfrm>
+                <a:prstGeom prst="rect">
+                  <a:avLst/>
+                </a:prstGeom>
+                <a:noFill/>
+              </p:spPr>
+              <p:txBody>
+                <a:bodyPr wrap="none" rtlCol="0">
+                  <a:spAutoFit/>
+                </a:bodyPr>
+                <a:lstStyle/>
+                <a:p>
+                  <a:pPr/>
+                  <a14:m>
+                    <m:oMathPara xmlns:m="http://schemas.openxmlformats.org/officeDocument/2006/math">
+                      <m:oMathParaPr>
+                        <m:jc m:val="centerGroup"/>
+                      </m:oMathParaPr>
+                      <m:oMath xmlns:m="http://schemas.openxmlformats.org/officeDocument/2006/math">
+                        <m:sSub>
+                          <m:sSubPr>
+                            <m:ctrlPr>
+                              <a:rPr lang="en-US" sz="2400" b="1" i="1" smtClean="0">
+                                <a:latin typeface="Cambria Math" charset="0"/>
+                              </a:rPr>
+                            </m:ctrlPr>
+                          </m:sSubPr>
+                          <m:e>
+                            <m:r>
+                              <a:rPr lang="en-US" sz="2400" b="1" i="1" smtClean="0">
+                                <a:latin typeface="Cambria Math" panose="02040503050406030204" pitchFamily="18" charset="0"/>
+                              </a:rPr>
+                              <m:t>𝑰</m:t>
+                            </m:r>
+                          </m:e>
+                          <m:sub>
+                            <m:r>
+                              <a:rPr lang="en-US" sz="2400" b="1" i="1" smtClean="0">
+                                <a:latin typeface="Cambria Math" panose="02040503050406030204" pitchFamily="18" charset="0"/>
+                              </a:rPr>
+                              <m:t>𝟑</m:t>
+                            </m:r>
+                          </m:sub>
+                        </m:sSub>
+                      </m:oMath>
+                    </m:oMathPara>
+                  </a14:m>
+                  <a:endParaRPr lang="en-US" sz="2400" b="1" dirty="0"/>
+                </a:p>
+              </p:txBody>
+            </p:sp>
+          </mc:Choice>
+          <mc:Fallback>
+            <p:sp>
+              <p:nvSpPr>
+                <p:cNvPr id="49" name="TextBox 48">
+                  <a:extLst>
+                    <a:ext uri="{FF2B5EF4-FFF2-40B4-BE49-F238E27FC236}">
+                      <a16:creationId xmlns:a16="http://schemas.microsoft.com/office/drawing/2014/main" xmlns:a14="http://schemas.microsoft.com/office/drawing/2010/main" xmlns="" id="{DC47A251-C09A-0849-A1A2-168F9BE58EE0}"/>
+                    </a:ext>
+                  </a:extLst>
+                </p:cNvPr>
+                <p:cNvSpPr txBox="1">
+                  <a:spLocks noRot="1" noChangeAspect="1" noMove="1" noResize="1" noEditPoints="1" noAdjustHandles="1" noChangeArrowheads="1" noChangeShapeType="1" noTextEdit="1"/>
+                </p:cNvSpPr>
+                <p:nvPr/>
+              </p:nvSpPr>
+              <p:spPr>
+                <a:xfrm rot="2183489">
+                  <a:off x="531167" y="172347"/>
+                  <a:ext cx="535659" cy="461665"/>
+                </a:xfrm>
+                <a:prstGeom prst="rect">
+                  <a:avLst/>
+                </a:prstGeom>
+                <a:blipFill rotWithShape="0">
+                  <a:blip r:embed="rId7"/>
+                  <a:stretch>
+                    <a:fillRect/>
+                  </a:stretch>
+                </a:blipFill>
+              </p:spPr>
+              <p:txBody>
+                <a:bodyPr/>
+                <a:lstStyle/>
+                <a:p>
+                  <a:r>
+                    <a:rPr lang="en-US">
+                      <a:noFill/>
+                    </a:rPr>
+                    <a:t> </a:t>
+                  </a:r>
+                </a:p>
+              </p:txBody>
+            </p:sp>
+          </mc:Fallback>
+        </mc:AlternateContent>
+        <p:cxnSp>
+          <p:nvCxnSpPr>
+            <p:cNvPr id="51" name="Straight Arrow Connector 50">
+              <a:extLst>
+                <a:ext uri="{FF2B5EF4-FFF2-40B4-BE49-F238E27FC236}">
+                  <a16:creationId xmlns:a16="http://schemas.microsoft.com/office/drawing/2014/main" xmlns="" id="{F5FD1473-FC5D-BA48-9AE6-9997C40BAD60}"/>
+                </a:ext>
+              </a:extLst>
+            </p:cNvPr>
+            <p:cNvCxnSpPr>
+              <a:cxnSpLocks/>
+            </p:cNvCxnSpPr>
+            <p:nvPr/>
+          </p:nvCxnSpPr>
+          <p:spPr>
+            <a:xfrm>
+              <a:off x="4420466" y="2663642"/>
+              <a:ext cx="0" cy="1242035"/>
+            </a:xfrm>
+            <a:prstGeom prst="straightConnector1">
+              <a:avLst/>
+            </a:prstGeom>
+            <a:ln w="63500">
+              <a:tailEnd type="triangle"/>
+            </a:ln>
+          </p:spPr>
+          <p:style>
+            <a:lnRef idx="1">
+              <a:schemeClr val="accent1"/>
+            </a:lnRef>
+            <a:fillRef idx="0">
+              <a:schemeClr val="accent1"/>
+            </a:fillRef>
+            <a:effectRef idx="0">
+              <a:schemeClr val="accent1"/>
+            </a:effectRef>
+            <a:fontRef idx="minor">
+              <a:schemeClr val="tx1"/>
+            </a:fontRef>
+          </p:style>
+        </p:cxnSp>
+        <p:cxnSp>
+          <p:nvCxnSpPr>
+            <p:cNvPr id="53" name="Straight Arrow Connector 52">
+              <a:extLst>
+                <a:ext uri="{FF2B5EF4-FFF2-40B4-BE49-F238E27FC236}">
+                  <a16:creationId xmlns:a16="http://schemas.microsoft.com/office/drawing/2014/main" xmlns="" id="{923325C6-8DAF-B64C-901F-119F5739F473}"/>
+                </a:ext>
+              </a:extLst>
+            </p:cNvPr>
+            <p:cNvCxnSpPr>
+              <a:cxnSpLocks/>
+            </p:cNvCxnSpPr>
+            <p:nvPr/>
+          </p:nvCxnSpPr>
+          <p:spPr>
+            <a:xfrm>
+              <a:off x="7520517" y="2642925"/>
+              <a:ext cx="0" cy="1242035"/>
+            </a:xfrm>
+            <a:prstGeom prst="straightConnector1">
+              <a:avLst/>
+            </a:prstGeom>
+            <a:ln w="63500">
+              <a:tailEnd type="triangle"/>
+            </a:ln>
+          </p:spPr>
+          <p:style>
+            <a:lnRef idx="1">
+              <a:schemeClr val="accent1"/>
+            </a:lnRef>
+            <a:fillRef idx="0">
+              <a:schemeClr val="accent1"/>
+            </a:fillRef>
+            <a:effectRef idx="0">
+              <a:schemeClr val="accent1"/>
+            </a:effectRef>
+            <a:fontRef idx="minor">
+              <a:schemeClr val="tx1"/>
+            </a:fontRef>
+          </p:style>
+        </p:cxnSp>
+        <p:cxnSp>
+          <p:nvCxnSpPr>
+            <p:cNvPr id="54" name="Straight Arrow Connector 53">
+              <a:extLst>
+                <a:ext uri="{FF2B5EF4-FFF2-40B4-BE49-F238E27FC236}">
+                  <a16:creationId xmlns:a16="http://schemas.microsoft.com/office/drawing/2014/main" xmlns="" id="{8D4F495E-2CB5-7842-96F2-6CA0E7AD2E20}"/>
+                </a:ext>
+              </a:extLst>
+            </p:cNvPr>
+            <p:cNvCxnSpPr>
+              <a:cxnSpLocks/>
+            </p:cNvCxnSpPr>
+            <p:nvPr/>
+          </p:nvCxnSpPr>
+          <p:spPr>
+            <a:xfrm>
+              <a:off x="11124673" y="2624784"/>
+              <a:ext cx="0" cy="1242035"/>
+            </a:xfrm>
+            <a:prstGeom prst="straightConnector1">
+              <a:avLst/>
+            </a:prstGeom>
+            <a:ln w="63500">
+              <a:tailEnd type="triangle"/>
+            </a:ln>
+          </p:spPr>
+          <p:style>
+            <a:lnRef idx="1">
+              <a:schemeClr val="accent1"/>
+            </a:lnRef>
+            <a:fillRef idx="0">
+              <a:schemeClr val="accent1"/>
+            </a:fillRef>
+            <a:effectRef idx="0">
+              <a:schemeClr val="accent1"/>
+            </a:effectRef>
+            <a:fontRef idx="minor">
+              <a:schemeClr val="tx1"/>
+            </a:fontRef>
+          </p:style>
+        </p:cxnSp>
+        <p:sp>
+          <p:nvSpPr>
+            <p:cNvPr id="55" name="Rectangle 54">
+              <a:extLst>
+                <a:ext uri="{FF2B5EF4-FFF2-40B4-BE49-F238E27FC236}">
+                  <a16:creationId xmlns:a16="http://schemas.microsoft.com/office/drawing/2014/main" xmlns="" id="{FB45C652-363E-AD4B-A3DE-F6BA960A3A70}"/>
                 </a:ext>
               </a:extLst>
             </p:cNvPr>
@@ -4294,175 +5467,32 @@
           </p:nvSpPr>
           <p:spPr>
             <a:xfrm>
-              <a:off x="3286342" y="1993335"/>
-              <a:ext cx="150041" cy="1682261"/>
+              <a:off x="8537961" y="3772915"/>
+              <a:ext cx="857345" cy="1077218"/>
             </a:xfrm>
             <a:prstGeom prst="rect">
               <a:avLst/>
             </a:prstGeom>
-            <a:solidFill>
-              <a:schemeClr val="accent4">
-                <a:lumMod val="40000"/>
-                <a:lumOff val="60000"/>
-              </a:schemeClr>
-            </a:solidFill>
           </p:spPr>
-          <p:style>
-            <a:lnRef idx="2">
-              <a:schemeClr val="accent1">
-                <a:shade val="50000"/>
-              </a:schemeClr>
-            </a:lnRef>
-            <a:fillRef idx="1">
-              <a:schemeClr val="accent1"/>
-            </a:fillRef>
-            <a:effectRef idx="0">
-              <a:schemeClr val="accent1"/>
-            </a:effectRef>
-            <a:fontRef idx="minor">
-              <a:schemeClr val="lt1"/>
-            </a:fontRef>
-          </p:style>
           <p:txBody>
-            <a:bodyPr rtlCol="0" anchor="ctr"/>
+            <a:bodyPr wrap="square">
+              <a:spAutoFit/>
+            </a:bodyPr>
             <a:lstStyle/>
             <a:p>
-              <a:pPr algn="ctr"/>
-              <a:endParaRPr lang="en-US"/>
+              <a:r>
+                <a:rPr lang="en-US" sz="6400" dirty="0"/>
+                <a:t>+</a:t>
+              </a:r>
             </a:p>
           </p:txBody>
         </p:sp>
         <p:sp>
           <p:nvSpPr>
-            <p:cNvPr id="37" name="Rectangle 36">
+            <p:cNvPr id="56" name="Rectangle 55">
               <a:extLst>
                 <a:ext uri="{FF2B5EF4-FFF2-40B4-BE49-F238E27FC236}">
-                  <a16:creationId xmlns:a16="http://schemas.microsoft.com/office/drawing/2014/main" id="{EE054CD7-4A36-A44E-89B6-D7B22590944D}"/>
-                </a:ext>
-              </a:extLst>
-            </p:cNvPr>
-            <p:cNvSpPr/>
-            <p:nvPr/>
-          </p:nvSpPr>
-          <p:spPr>
-            <a:xfrm rot="5400000">
-              <a:off x="4527960" y="1077184"/>
-              <a:ext cx="150041" cy="1682261"/>
-            </a:xfrm>
-            <a:prstGeom prst="rect">
-              <a:avLst/>
-            </a:prstGeom>
-            <a:solidFill>
-              <a:schemeClr val="accent2">
-                <a:lumMod val="60000"/>
-                <a:lumOff val="40000"/>
-              </a:schemeClr>
-            </a:solidFill>
-          </p:spPr>
-          <p:style>
-            <a:lnRef idx="2">
-              <a:schemeClr val="accent1">
-                <a:shade val="50000"/>
-              </a:schemeClr>
-            </a:lnRef>
-            <a:fillRef idx="1">
-              <a:schemeClr val="accent1"/>
-            </a:fillRef>
-            <a:effectRef idx="0">
-              <a:schemeClr val="accent1"/>
-            </a:effectRef>
-            <a:fontRef idx="minor">
-              <a:schemeClr val="lt1"/>
-            </a:fontRef>
-          </p:style>
-          <p:txBody>
-            <a:bodyPr rtlCol="0" anchor="ctr"/>
-            <a:lstStyle/>
-            <a:p>
-              <a:pPr algn="ctr"/>
-              <a:endParaRPr lang="en-US"/>
-            </a:p>
-          </p:txBody>
-        </p:sp>
-        <p:sp>
-          <p:nvSpPr>
-            <p:cNvPr id="38" name="Rectangle 37">
-              <a:extLst>
-                <a:ext uri="{FF2B5EF4-FFF2-40B4-BE49-F238E27FC236}">
-                  <a16:creationId xmlns:a16="http://schemas.microsoft.com/office/drawing/2014/main" id="{2A69634C-3C8F-7349-81AB-203E88AAFC1D}"/>
-                </a:ext>
-              </a:extLst>
-            </p:cNvPr>
-            <p:cNvSpPr/>
-            <p:nvPr/>
-          </p:nvSpPr>
-          <p:spPr>
-            <a:xfrm rot="3016596">
-              <a:off x="4116846" y="379088"/>
-              <a:ext cx="150041" cy="1682261"/>
-            </a:xfrm>
-            <a:prstGeom prst="rect">
-              <a:avLst/>
-            </a:prstGeom>
-            <a:solidFill>
-              <a:schemeClr val="accent5">
-                <a:lumMod val="60000"/>
-                <a:lumOff val="40000"/>
-              </a:schemeClr>
-            </a:solidFill>
-          </p:spPr>
-          <p:style>
-            <a:lnRef idx="2">
-              <a:schemeClr val="accent1">
-                <a:shade val="50000"/>
-              </a:schemeClr>
-            </a:lnRef>
-            <a:fillRef idx="1">
-              <a:schemeClr val="accent1"/>
-            </a:fillRef>
-            <a:effectRef idx="0">
-              <a:schemeClr val="accent1"/>
-            </a:effectRef>
-            <a:fontRef idx="minor">
-              <a:schemeClr val="lt1"/>
-            </a:fontRef>
-          </p:style>
-          <p:txBody>
-            <a:bodyPr rtlCol="0" anchor="ctr"/>
-            <a:lstStyle/>
-            <a:p>
-              <a:pPr algn="ctr"/>
-              <a:endParaRPr lang="en-US"/>
-            </a:p>
-          </p:txBody>
-        </p:sp>
-      </p:grpSp>
-      <p:grpSp>
-        <p:nvGrpSpPr>
-          <p:cNvPr id="39" name="Group 38">
-            <a:extLst>
-              <a:ext uri="{FF2B5EF4-FFF2-40B4-BE49-F238E27FC236}">
-                <a16:creationId xmlns:a16="http://schemas.microsoft.com/office/drawing/2014/main" id="{D8CC6D81-4B92-E649-B350-1A3670F20B49}"/>
-              </a:ext>
-            </a:extLst>
-          </p:cNvPr>
-          <p:cNvGrpSpPr/>
-          <p:nvPr/>
-        </p:nvGrpSpPr>
-        <p:grpSpPr>
-          <a:xfrm>
-            <a:off x="9808035" y="849683"/>
-            <a:ext cx="2157769" cy="2530398"/>
-            <a:chOff x="3286342" y="1145198"/>
-            <a:chExt cx="2157769" cy="2530398"/>
-          </a:xfrm>
-        </p:grpSpPr>
-        <p:sp>
-          <p:nvSpPr>
-            <p:cNvPr id="40" name="Rectangle 39">
-              <a:extLst>
-                <a:ext uri="{FF2B5EF4-FFF2-40B4-BE49-F238E27FC236}">
-                  <a16:creationId xmlns:a16="http://schemas.microsoft.com/office/drawing/2014/main" id="{35304DB2-6E07-9843-8F75-5DB92C1077FC}"/>
+                  <a16:creationId xmlns:a16="http://schemas.microsoft.com/office/drawing/2014/main" xmlns="" id="{5B2904FA-F041-0D4B-94E4-00863C154020}"/>
                 </a:ext>
               </a:extLst>
             </p:cNvPr>
@@ -4471,1150 +5501,147 @@
           </p:nvSpPr>
           <p:spPr>
             <a:xfrm>
-              <a:off x="3286342" y="1993335"/>
-              <a:ext cx="150041" cy="1682261"/>
+              <a:off x="8275540" y="1836208"/>
+              <a:ext cx="857345" cy="1077218"/>
             </a:xfrm>
             <a:prstGeom prst="rect">
               <a:avLst/>
             </a:prstGeom>
-            <a:solidFill>
-              <a:schemeClr val="accent4">
-                <a:lumMod val="40000"/>
-                <a:lumOff val="60000"/>
-              </a:schemeClr>
-            </a:solidFill>
+          </p:spPr>
+          <p:txBody>
+            <a:bodyPr wrap="square">
+              <a:spAutoFit/>
+            </a:bodyPr>
+            <a:lstStyle/>
+            <a:p>
+              <a:r>
+                <a:rPr lang="en-US" sz="6400" dirty="0"/>
+                <a:t>+</a:t>
+              </a:r>
+            </a:p>
+          </p:txBody>
+        </p:sp>
+        <p:sp>
+          <p:nvSpPr>
+            <p:cNvPr id="2" name="TextBox 1">
+              <a:extLst>
+                <a:ext uri="{FF2B5EF4-FFF2-40B4-BE49-F238E27FC236}">
+                  <a16:creationId xmlns:a16="http://schemas.microsoft.com/office/drawing/2014/main" xmlns="" id="{20798E0D-9B05-B845-8D6D-E92A0EB0099E}"/>
+                </a:ext>
+              </a:extLst>
+            </p:cNvPr>
+            <p:cNvSpPr txBox="1"/>
+            <p:nvPr/>
+          </p:nvSpPr>
+          <p:spPr>
+            <a:xfrm>
+              <a:off x="2264769" y="191720"/>
+              <a:ext cx="1364264" cy="1200329"/>
+            </a:xfrm>
+            <a:prstGeom prst="rect">
+              <a:avLst/>
+            </a:prstGeom>
+            <a:noFill/>
+          </p:spPr>
+          <p:txBody>
+            <a:bodyPr wrap="square" rtlCol="0">
+              <a:spAutoFit/>
+            </a:bodyPr>
+            <a:lstStyle/>
+            <a:p>
+              <a:r>
+                <a:rPr lang="en-US" sz="2400" b="1" dirty="0"/>
+                <a:t>Low Rank Factors</a:t>
+              </a:r>
+            </a:p>
+          </p:txBody>
+        </p:sp>
+        <p:cxnSp>
+          <p:nvCxnSpPr>
+            <p:cNvPr id="15" name="Straight Arrow Connector 14">
+              <a:extLst>
+                <a:ext uri="{FF2B5EF4-FFF2-40B4-BE49-F238E27FC236}">
+                  <a16:creationId xmlns:a16="http://schemas.microsoft.com/office/drawing/2014/main" xmlns="" id="{4A6127F0-6E97-BE43-900A-F9474F2F34EB}"/>
+                </a:ext>
+              </a:extLst>
+            </p:cNvPr>
+            <p:cNvCxnSpPr>
+              <a:cxnSpLocks/>
+              <a:stCxn id="31" idx="3"/>
+              <a:endCxn id="2" idx="1"/>
+            </p:cNvCxnSpPr>
+            <p:nvPr/>
+          </p:nvCxnSpPr>
+          <p:spPr>
+            <a:xfrm flipV="1">
+              <a:off x="1338025" y="791885"/>
+              <a:ext cx="926744" cy="128160"/>
+            </a:xfrm>
+            <a:prstGeom prst="straightConnector1">
+              <a:avLst/>
+            </a:prstGeom>
+            <a:ln w="38100">
+              <a:tailEnd type="triangle"/>
+            </a:ln>
           </p:spPr>
           <p:style>
-            <a:lnRef idx="2">
-              <a:schemeClr val="accent1">
-                <a:shade val="50000"/>
-              </a:schemeClr>
+            <a:lnRef idx="1">
+              <a:schemeClr val="accent1"/>
             </a:lnRef>
-            <a:fillRef idx="1">
+            <a:fillRef idx="0">
               <a:schemeClr val="accent1"/>
             </a:fillRef>
             <a:effectRef idx="0">
               <a:schemeClr val="accent1"/>
             </a:effectRef>
             <a:fontRef idx="minor">
-              <a:schemeClr val="lt1"/>
+              <a:schemeClr val="tx1"/>
             </a:fontRef>
           </p:style>
-          <p:txBody>
-            <a:bodyPr rtlCol="0" anchor="ctr"/>
-            <a:lstStyle/>
-            <a:p>
-              <a:pPr algn="ctr"/>
-              <a:endParaRPr lang="en-US"/>
-            </a:p>
-          </p:txBody>
-        </p:sp>
-        <p:sp>
-          <p:nvSpPr>
-            <p:cNvPr id="41" name="Rectangle 40">
+        </p:cxnSp>
+        <p:cxnSp>
+          <p:nvCxnSpPr>
+            <p:cNvPr id="50" name="Straight Arrow Connector 49">
               <a:extLst>
                 <a:ext uri="{FF2B5EF4-FFF2-40B4-BE49-F238E27FC236}">
-                  <a16:creationId xmlns:a16="http://schemas.microsoft.com/office/drawing/2014/main" id="{C40B7C67-EAEB-6B42-8369-4058C9B561F5}"/>
+                  <a16:creationId xmlns:a16="http://schemas.microsoft.com/office/drawing/2014/main" xmlns="" id="{878D664C-32E3-AF4B-BD7A-6CD94AA7C7E9}"/>
                 </a:ext>
               </a:extLst>
             </p:cNvPr>
-            <p:cNvSpPr/>
+            <p:cNvCxnSpPr>
+              <a:cxnSpLocks/>
+              <a:stCxn id="30" idx="1"/>
+            </p:cNvCxnSpPr>
             <p:nvPr/>
-          </p:nvSpPr>
+          </p:nvCxnSpPr>
           <p:spPr>
-            <a:xfrm rot="5400000">
-              <a:off x="4527960" y="1077184"/>
-              <a:ext cx="150041" cy="1682261"/>
+            <a:xfrm flipV="1">
+              <a:off x="1731935" y="920045"/>
+              <a:ext cx="559341" cy="636362"/>
             </a:xfrm>
-            <a:prstGeom prst="rect">
+            <a:prstGeom prst="straightConnector1">
               <a:avLst/>
             </a:prstGeom>
-            <a:solidFill>
-              <a:schemeClr val="accent2">
-                <a:lumMod val="60000"/>
-                <a:lumOff val="40000"/>
-              </a:schemeClr>
-            </a:solidFill>
+            <a:ln w="38100">
+              <a:tailEnd type="triangle"/>
+            </a:ln>
           </p:spPr>
           <p:style>
-            <a:lnRef idx="2">
-              <a:schemeClr val="accent1">
-                <a:shade val="50000"/>
-              </a:schemeClr>
+            <a:lnRef idx="1">
+              <a:schemeClr val="accent1"/>
             </a:lnRef>
-            <a:fillRef idx="1">
+            <a:fillRef idx="0">
               <a:schemeClr val="accent1"/>
             </a:fillRef>
             <a:effectRef idx="0">
               <a:schemeClr val="accent1"/>
             </a:effectRef>
             <a:fontRef idx="minor">
-              <a:schemeClr val="lt1"/>
+              <a:schemeClr val="tx1"/>
             </a:fontRef>
           </p:style>
-          <p:txBody>
-            <a:bodyPr rtlCol="0" anchor="ctr"/>
-            <a:lstStyle/>
-            <a:p>
-              <a:pPr algn="ctr"/>
-              <a:endParaRPr lang="en-US"/>
-            </a:p>
-          </p:txBody>
-        </p:sp>
-        <p:sp>
-          <p:nvSpPr>
-            <p:cNvPr id="42" name="Rectangle 41">
-              <a:extLst>
-                <a:ext uri="{FF2B5EF4-FFF2-40B4-BE49-F238E27FC236}">
-                  <a16:creationId xmlns:a16="http://schemas.microsoft.com/office/drawing/2014/main" id="{59424E4C-7210-F44A-938A-DA90DBD1F614}"/>
-                </a:ext>
-              </a:extLst>
-            </p:cNvPr>
-            <p:cNvSpPr/>
-            <p:nvPr/>
-          </p:nvSpPr>
-          <p:spPr>
-            <a:xfrm rot="3016596">
-              <a:off x="4116846" y="379088"/>
-              <a:ext cx="150041" cy="1682261"/>
-            </a:xfrm>
-            <a:prstGeom prst="rect">
-              <a:avLst/>
-            </a:prstGeom>
-            <a:solidFill>
-              <a:schemeClr val="accent5">
-                <a:lumMod val="60000"/>
-                <a:lumOff val="40000"/>
-              </a:schemeClr>
-            </a:solidFill>
-          </p:spPr>
-          <p:style>
-            <a:lnRef idx="2">
-              <a:schemeClr val="accent1">
-                <a:shade val="50000"/>
-              </a:schemeClr>
-            </a:lnRef>
-            <a:fillRef idx="1">
-              <a:schemeClr val="accent1"/>
-            </a:fillRef>
-            <a:effectRef idx="0">
-              <a:schemeClr val="accent1"/>
-            </a:effectRef>
-            <a:fontRef idx="minor">
-              <a:schemeClr val="lt1"/>
-            </a:fontRef>
-          </p:style>
-          <p:txBody>
-            <a:bodyPr rtlCol="0" anchor="ctr"/>
-            <a:lstStyle/>
-            <a:p>
-              <a:pPr algn="ctr"/>
-              <a:endParaRPr lang="en-US"/>
-            </a:p>
-          </p:txBody>
-        </p:sp>
+        </p:cxnSp>
       </p:grpSp>
-      <mc:AlternateContent xmlns:mc="http://schemas.openxmlformats.org/markup-compatibility/2006" xmlns:a14="http://schemas.microsoft.com/office/drawing/2010/main">
-        <mc:Choice Requires="a14">
-          <p:sp>
-            <p:nvSpPr>
-              <p:cNvPr id="44" name="TextBox 43">
-                <a:extLst>
-                  <a:ext uri="{FF2B5EF4-FFF2-40B4-BE49-F238E27FC236}">
-                    <a16:creationId xmlns:a16="http://schemas.microsoft.com/office/drawing/2014/main" id="{3B1F6128-78F6-AD40-A889-8CE98CB2BA37}"/>
-                  </a:ext>
-                </a:extLst>
-              </p:cNvPr>
-              <p:cNvSpPr txBox="1"/>
-              <p:nvPr/>
-            </p:nvSpPr>
-            <p:spPr>
-              <a:xfrm>
-                <a:off x="912163" y="5353952"/>
-                <a:ext cx="535659" cy="461665"/>
-              </a:xfrm>
-              <a:prstGeom prst="rect">
-                <a:avLst/>
-              </a:prstGeom>
-              <a:noFill/>
-            </p:spPr>
-            <p:txBody>
-              <a:bodyPr wrap="none" rtlCol="0">
-                <a:spAutoFit/>
-              </a:bodyPr>
-              <a:lstStyle/>
-              <a:p>
-                <a:pPr/>
-                <a14:m>
-                  <m:oMathPara xmlns:m="http://schemas.openxmlformats.org/officeDocument/2006/math">
-                    <m:oMathParaPr>
-                      <m:jc m:val="centerGroup"/>
-                    </m:oMathParaPr>
-                    <m:oMath xmlns:m="http://schemas.openxmlformats.org/officeDocument/2006/math">
-                      <m:sSub>
-                        <m:sSubPr>
-                          <m:ctrlPr>
-                            <a:rPr lang="en-US" sz="2400" b="1" i="1" smtClean="0">
-                              <a:latin typeface="Cambria Math" panose="02040503050406030204" pitchFamily="18" charset="0"/>
-                            </a:rPr>
-                          </m:ctrlPr>
-                        </m:sSubPr>
-                        <m:e>
-                          <m:r>
-                            <a:rPr lang="en-US" sz="2400" b="1" i="1" smtClean="0">
-                              <a:latin typeface="Cambria Math" panose="02040503050406030204" pitchFamily="18" charset="0"/>
-                            </a:rPr>
-                            <m:t>𝑰</m:t>
-                          </m:r>
-                        </m:e>
-                        <m:sub>
-                          <m:r>
-                            <a:rPr lang="en-US" sz="2400" b="1" i="1" smtClean="0">
-                              <a:latin typeface="Cambria Math" panose="02040503050406030204" pitchFamily="18" charset="0"/>
-                            </a:rPr>
-                            <m:t>𝟐</m:t>
-                          </m:r>
-                        </m:sub>
-                      </m:sSub>
-                    </m:oMath>
-                  </m:oMathPara>
-                </a14:m>
-                <a:endParaRPr lang="en-US" sz="2400" b="1" dirty="0"/>
-              </a:p>
-            </p:txBody>
-          </p:sp>
-        </mc:Choice>
-        <mc:Fallback xmlns="">
-          <p:sp>
-            <p:nvSpPr>
-              <p:cNvPr id="44" name="TextBox 43">
-                <a:extLst>
-                  <a:ext uri="{FF2B5EF4-FFF2-40B4-BE49-F238E27FC236}">
-                    <a16:creationId xmlns:a16="http://schemas.microsoft.com/office/drawing/2014/main" id="{3B1F6128-78F6-AD40-A889-8CE98CB2BA37}"/>
-                  </a:ext>
-                </a:extLst>
-              </p:cNvPr>
-              <p:cNvSpPr txBox="1">
-                <a:spLocks noRot="1" noChangeAspect="1" noMove="1" noResize="1" noEditPoints="1" noAdjustHandles="1" noChangeArrowheads="1" noChangeShapeType="1" noTextEdit="1"/>
-              </p:cNvSpPr>
-              <p:nvPr/>
-            </p:nvSpPr>
-            <p:spPr>
-              <a:xfrm>
-                <a:off x="912163" y="5353952"/>
-                <a:ext cx="535659" cy="461665"/>
-              </a:xfrm>
-              <a:prstGeom prst="rect">
-                <a:avLst/>
-              </a:prstGeom>
-              <a:blipFill>
-                <a:blip r:embed="rId2"/>
-                <a:stretch>
-                  <a:fillRect b="-2703"/>
-                </a:stretch>
-              </a:blipFill>
-            </p:spPr>
-            <p:txBody>
-              <a:bodyPr/>
-              <a:lstStyle/>
-              <a:p>
-                <a:r>
-                  <a:rPr lang="en-US">
-                    <a:noFill/>
-                  </a:rPr>
-                  <a:t> </a:t>
-                </a:r>
-              </a:p>
-            </p:txBody>
-          </p:sp>
-        </mc:Fallback>
-      </mc:AlternateContent>
-      <mc:AlternateContent xmlns:mc="http://schemas.openxmlformats.org/markup-compatibility/2006" xmlns:a14="http://schemas.microsoft.com/office/drawing/2010/main">
-        <mc:Choice Requires="a14">
-          <p:sp>
-            <p:nvSpPr>
-              <p:cNvPr id="45" name="TextBox 44">
-                <a:extLst>
-                  <a:ext uri="{FF2B5EF4-FFF2-40B4-BE49-F238E27FC236}">
-                    <a16:creationId xmlns:a16="http://schemas.microsoft.com/office/drawing/2014/main" id="{789EE21D-8264-6B4F-A914-288BD7311E73}"/>
-                  </a:ext>
-                </a:extLst>
-              </p:cNvPr>
-              <p:cNvSpPr txBox="1"/>
-              <p:nvPr/>
-            </p:nvSpPr>
-            <p:spPr>
-              <a:xfrm>
-                <a:off x="-61420" y="4255872"/>
-                <a:ext cx="535659" cy="461665"/>
-              </a:xfrm>
-              <a:prstGeom prst="rect">
-                <a:avLst/>
-              </a:prstGeom>
-              <a:noFill/>
-            </p:spPr>
-            <p:txBody>
-              <a:bodyPr wrap="none" rtlCol="0">
-                <a:spAutoFit/>
-              </a:bodyPr>
-              <a:lstStyle/>
-              <a:p>
-                <a:pPr/>
-                <a14:m>
-                  <m:oMathPara xmlns:m="http://schemas.openxmlformats.org/officeDocument/2006/math">
-                    <m:oMathParaPr>
-                      <m:jc m:val="centerGroup"/>
-                    </m:oMathParaPr>
-                    <m:oMath xmlns:m="http://schemas.openxmlformats.org/officeDocument/2006/math">
-                      <m:sSub>
-                        <m:sSubPr>
-                          <m:ctrlPr>
-                            <a:rPr lang="en-US" sz="2400" b="1" i="1" smtClean="0">
-                              <a:latin typeface="Cambria Math" panose="02040503050406030204" pitchFamily="18" charset="0"/>
-                            </a:rPr>
-                          </m:ctrlPr>
-                        </m:sSubPr>
-                        <m:e>
-                          <m:r>
-                            <a:rPr lang="en-US" sz="2400" b="1" i="1" smtClean="0">
-                              <a:latin typeface="Cambria Math" panose="02040503050406030204" pitchFamily="18" charset="0"/>
-                            </a:rPr>
-                            <m:t>𝑰</m:t>
-                          </m:r>
-                        </m:e>
-                        <m:sub>
-                          <m:r>
-                            <a:rPr lang="en-US" sz="2400" b="1" i="1" smtClean="0">
-                              <a:latin typeface="Cambria Math" panose="02040503050406030204" pitchFamily="18" charset="0"/>
-                            </a:rPr>
-                            <m:t>𝟏</m:t>
-                          </m:r>
-                        </m:sub>
-                      </m:sSub>
-                    </m:oMath>
-                  </m:oMathPara>
-                </a14:m>
-                <a:endParaRPr lang="en-US" sz="2400" b="1" dirty="0"/>
-              </a:p>
-            </p:txBody>
-          </p:sp>
-        </mc:Choice>
-        <mc:Fallback xmlns="">
-          <p:sp>
-            <p:nvSpPr>
-              <p:cNvPr id="45" name="TextBox 44">
-                <a:extLst>
-                  <a:ext uri="{FF2B5EF4-FFF2-40B4-BE49-F238E27FC236}">
-                    <a16:creationId xmlns:a16="http://schemas.microsoft.com/office/drawing/2014/main" id="{789EE21D-8264-6B4F-A914-288BD7311E73}"/>
-                  </a:ext>
-                </a:extLst>
-              </p:cNvPr>
-              <p:cNvSpPr txBox="1">
-                <a:spLocks noRot="1" noChangeAspect="1" noMove="1" noResize="1" noEditPoints="1" noAdjustHandles="1" noChangeArrowheads="1" noChangeShapeType="1" noTextEdit="1"/>
-              </p:cNvSpPr>
-              <p:nvPr/>
-            </p:nvSpPr>
-            <p:spPr>
-              <a:xfrm>
-                <a:off x="-61420" y="4255872"/>
-                <a:ext cx="535659" cy="461665"/>
-              </a:xfrm>
-              <a:prstGeom prst="rect">
-                <a:avLst/>
-              </a:prstGeom>
-              <a:blipFill>
-                <a:blip r:embed="rId3"/>
-                <a:stretch>
-                  <a:fillRect b="-2703"/>
-                </a:stretch>
-              </a:blipFill>
-            </p:spPr>
-            <p:txBody>
-              <a:bodyPr/>
-              <a:lstStyle/>
-              <a:p>
-                <a:r>
-                  <a:rPr lang="en-US">
-                    <a:noFill/>
-                  </a:rPr>
-                  <a:t> </a:t>
-                </a:r>
-              </a:p>
-            </p:txBody>
-          </p:sp>
-        </mc:Fallback>
-      </mc:AlternateContent>
-      <mc:AlternateContent xmlns:mc="http://schemas.openxmlformats.org/markup-compatibility/2006" xmlns:a14="http://schemas.microsoft.com/office/drawing/2010/main">
-        <mc:Choice Requires="a14">
-          <p:sp>
-            <p:nvSpPr>
-              <p:cNvPr id="46" name="TextBox 45">
-                <a:extLst>
-                  <a:ext uri="{FF2B5EF4-FFF2-40B4-BE49-F238E27FC236}">
-                    <a16:creationId xmlns:a16="http://schemas.microsoft.com/office/drawing/2014/main" id="{B7A59F2B-B700-5F4A-AFEB-84A10F8DBC1D}"/>
-                  </a:ext>
-                </a:extLst>
-              </p:cNvPr>
-              <p:cNvSpPr txBox="1"/>
-              <p:nvPr/>
-            </p:nvSpPr>
-            <p:spPr>
-              <a:xfrm rot="2183489">
-                <a:off x="129383" y="3469731"/>
-                <a:ext cx="535659" cy="461665"/>
-              </a:xfrm>
-              <a:prstGeom prst="rect">
-                <a:avLst/>
-              </a:prstGeom>
-              <a:noFill/>
-            </p:spPr>
-            <p:txBody>
-              <a:bodyPr wrap="none" rtlCol="0">
-                <a:spAutoFit/>
-              </a:bodyPr>
-              <a:lstStyle/>
-              <a:p>
-                <a:pPr/>
-                <a14:m>
-                  <m:oMathPara xmlns:m="http://schemas.openxmlformats.org/officeDocument/2006/math">
-                    <m:oMathParaPr>
-                      <m:jc m:val="centerGroup"/>
-                    </m:oMathParaPr>
-                    <m:oMath xmlns:m="http://schemas.openxmlformats.org/officeDocument/2006/math">
-                      <m:sSub>
-                        <m:sSubPr>
-                          <m:ctrlPr>
-                            <a:rPr lang="en-US" sz="2400" b="1" i="1" smtClean="0">
-                              <a:latin typeface="Cambria Math" panose="02040503050406030204" pitchFamily="18" charset="0"/>
-                            </a:rPr>
-                          </m:ctrlPr>
-                        </m:sSubPr>
-                        <m:e>
-                          <m:r>
-                            <a:rPr lang="en-US" sz="2400" b="1" i="1" smtClean="0">
-                              <a:latin typeface="Cambria Math" panose="02040503050406030204" pitchFamily="18" charset="0"/>
-                            </a:rPr>
-                            <m:t>𝑰</m:t>
-                          </m:r>
-                        </m:e>
-                        <m:sub>
-                          <m:r>
-                            <a:rPr lang="en-US" sz="2400" b="1" i="1" smtClean="0">
-                              <a:latin typeface="Cambria Math" panose="02040503050406030204" pitchFamily="18" charset="0"/>
-                            </a:rPr>
-                            <m:t>𝟑</m:t>
-                          </m:r>
-                        </m:sub>
-                      </m:sSub>
-                    </m:oMath>
-                  </m:oMathPara>
-                </a14:m>
-                <a:endParaRPr lang="en-US" sz="2400" b="1" dirty="0"/>
-              </a:p>
-            </p:txBody>
-          </p:sp>
-        </mc:Choice>
-        <mc:Fallback xmlns="">
-          <p:sp>
-            <p:nvSpPr>
-              <p:cNvPr id="46" name="TextBox 45">
-                <a:extLst>
-                  <a:ext uri="{FF2B5EF4-FFF2-40B4-BE49-F238E27FC236}">
-                    <a16:creationId xmlns:a16="http://schemas.microsoft.com/office/drawing/2014/main" id="{B7A59F2B-B700-5F4A-AFEB-84A10F8DBC1D}"/>
-                  </a:ext>
-                </a:extLst>
-              </p:cNvPr>
-              <p:cNvSpPr txBox="1">
-                <a:spLocks noRot="1" noChangeAspect="1" noMove="1" noResize="1" noEditPoints="1" noAdjustHandles="1" noChangeArrowheads="1" noChangeShapeType="1" noTextEdit="1"/>
-              </p:cNvSpPr>
-              <p:nvPr/>
-            </p:nvSpPr>
-            <p:spPr>
-              <a:xfrm rot="2183489">
-                <a:off x="129383" y="3469731"/>
-                <a:ext cx="535659" cy="461665"/>
-              </a:xfrm>
-              <a:prstGeom prst="rect">
-                <a:avLst/>
-              </a:prstGeom>
-              <a:blipFill>
-                <a:blip r:embed="rId4"/>
-                <a:stretch>
-                  <a:fillRect/>
-                </a:stretch>
-              </a:blipFill>
-            </p:spPr>
-            <p:txBody>
-              <a:bodyPr/>
-              <a:lstStyle/>
-              <a:p>
-                <a:r>
-                  <a:rPr lang="en-US">
-                    <a:noFill/>
-                  </a:rPr>
-                  <a:t> </a:t>
-                </a:r>
-              </a:p>
-            </p:txBody>
-          </p:sp>
-        </mc:Fallback>
-      </mc:AlternateContent>
-      <mc:AlternateContent xmlns:mc="http://schemas.openxmlformats.org/markup-compatibility/2006" xmlns:a14="http://schemas.microsoft.com/office/drawing/2010/main">
-        <mc:Choice Requires="a14">
-          <p:sp>
-            <p:nvSpPr>
-              <p:cNvPr id="47" name="TextBox 46">
-                <a:extLst>
-                  <a:ext uri="{FF2B5EF4-FFF2-40B4-BE49-F238E27FC236}">
-                    <a16:creationId xmlns:a16="http://schemas.microsoft.com/office/drawing/2014/main" id="{7AF0356C-BBD9-C544-822F-688B605FD83A}"/>
-                  </a:ext>
-                </a:extLst>
-              </p:cNvPr>
-              <p:cNvSpPr txBox="1"/>
-              <p:nvPr/>
-            </p:nvSpPr>
-            <p:spPr>
-              <a:xfrm>
-                <a:off x="-116840" y="1956016"/>
-                <a:ext cx="535659" cy="461665"/>
-              </a:xfrm>
-              <a:prstGeom prst="rect">
-                <a:avLst/>
-              </a:prstGeom>
-              <a:noFill/>
-            </p:spPr>
-            <p:txBody>
-              <a:bodyPr wrap="none" rtlCol="0">
-                <a:spAutoFit/>
-              </a:bodyPr>
-              <a:lstStyle/>
-              <a:p>
-                <a:pPr/>
-                <a14:m>
-                  <m:oMathPara xmlns:m="http://schemas.openxmlformats.org/officeDocument/2006/math">
-                    <m:oMathParaPr>
-                      <m:jc m:val="centerGroup"/>
-                    </m:oMathParaPr>
-                    <m:oMath xmlns:m="http://schemas.openxmlformats.org/officeDocument/2006/math">
-                      <m:sSub>
-                        <m:sSubPr>
-                          <m:ctrlPr>
-                            <a:rPr lang="en-US" sz="2400" b="1" i="1" smtClean="0">
-                              <a:latin typeface="Cambria Math" panose="02040503050406030204" pitchFamily="18" charset="0"/>
-                            </a:rPr>
-                          </m:ctrlPr>
-                        </m:sSubPr>
-                        <m:e>
-                          <m:r>
-                            <a:rPr lang="en-US" sz="2400" b="1" i="1" smtClean="0">
-                              <a:latin typeface="Cambria Math" panose="02040503050406030204" pitchFamily="18" charset="0"/>
-                            </a:rPr>
-                            <m:t>𝑰</m:t>
-                          </m:r>
-                        </m:e>
-                        <m:sub>
-                          <m:r>
-                            <a:rPr lang="en-US" sz="2400" b="1" i="1" smtClean="0">
-                              <a:latin typeface="Cambria Math" panose="02040503050406030204" pitchFamily="18" charset="0"/>
-                            </a:rPr>
-                            <m:t>𝟏</m:t>
-                          </m:r>
-                        </m:sub>
-                      </m:sSub>
-                    </m:oMath>
-                  </m:oMathPara>
-                </a14:m>
-                <a:endParaRPr lang="en-US" sz="2400" b="1" dirty="0"/>
-              </a:p>
-            </p:txBody>
-          </p:sp>
-        </mc:Choice>
-        <mc:Fallback xmlns="">
-          <p:sp>
-            <p:nvSpPr>
-              <p:cNvPr id="47" name="TextBox 46">
-                <a:extLst>
-                  <a:ext uri="{FF2B5EF4-FFF2-40B4-BE49-F238E27FC236}">
-                    <a16:creationId xmlns:a16="http://schemas.microsoft.com/office/drawing/2014/main" id="{7AF0356C-BBD9-C544-822F-688B605FD83A}"/>
-                  </a:ext>
-                </a:extLst>
-              </p:cNvPr>
-              <p:cNvSpPr txBox="1">
-                <a:spLocks noRot="1" noChangeAspect="1" noMove="1" noResize="1" noEditPoints="1" noAdjustHandles="1" noChangeArrowheads="1" noChangeShapeType="1" noTextEdit="1"/>
-              </p:cNvSpPr>
-              <p:nvPr/>
-            </p:nvSpPr>
-            <p:spPr>
-              <a:xfrm>
-                <a:off x="-116840" y="1956016"/>
-                <a:ext cx="535659" cy="461665"/>
-              </a:xfrm>
-              <a:prstGeom prst="rect">
-                <a:avLst/>
-              </a:prstGeom>
-              <a:blipFill>
-                <a:blip r:embed="rId5"/>
-                <a:stretch>
-                  <a:fillRect b="-2703"/>
-                </a:stretch>
-              </a:blipFill>
-            </p:spPr>
-            <p:txBody>
-              <a:bodyPr/>
-              <a:lstStyle/>
-              <a:p>
-                <a:r>
-                  <a:rPr lang="en-US">
-                    <a:noFill/>
-                  </a:rPr>
-                  <a:t> </a:t>
-                </a:r>
-              </a:p>
-            </p:txBody>
-          </p:sp>
-        </mc:Fallback>
-      </mc:AlternateContent>
-      <mc:AlternateContent xmlns:mc="http://schemas.openxmlformats.org/markup-compatibility/2006" xmlns:a14="http://schemas.microsoft.com/office/drawing/2010/main">
-        <mc:Choice Requires="a14">
-          <p:sp>
-            <p:nvSpPr>
-              <p:cNvPr id="48" name="TextBox 47">
-                <a:extLst>
-                  <a:ext uri="{FF2B5EF4-FFF2-40B4-BE49-F238E27FC236}">
-                    <a16:creationId xmlns:a16="http://schemas.microsoft.com/office/drawing/2014/main" id="{41D74258-15E1-7846-8456-512D77AB304D}"/>
-                  </a:ext>
-                </a:extLst>
-              </p:cNvPr>
-              <p:cNvSpPr txBox="1"/>
-              <p:nvPr/>
-            </p:nvSpPr>
-            <p:spPr>
-              <a:xfrm>
-                <a:off x="1459418" y="2056568"/>
-                <a:ext cx="535659" cy="461665"/>
-              </a:xfrm>
-              <a:prstGeom prst="rect">
-                <a:avLst/>
-              </a:prstGeom>
-              <a:noFill/>
-            </p:spPr>
-            <p:txBody>
-              <a:bodyPr wrap="none" rtlCol="0">
-                <a:spAutoFit/>
-              </a:bodyPr>
-              <a:lstStyle/>
-              <a:p>
-                <a:pPr/>
-                <a14:m>
-                  <m:oMathPara xmlns:m="http://schemas.openxmlformats.org/officeDocument/2006/math">
-                    <m:oMathParaPr>
-                      <m:jc m:val="centerGroup"/>
-                    </m:oMathParaPr>
-                    <m:oMath xmlns:m="http://schemas.openxmlformats.org/officeDocument/2006/math">
-                      <m:sSub>
-                        <m:sSubPr>
-                          <m:ctrlPr>
-                            <a:rPr lang="en-US" sz="2400" b="1" i="1" smtClean="0">
-                              <a:latin typeface="Cambria Math" panose="02040503050406030204" pitchFamily="18" charset="0"/>
-                            </a:rPr>
-                          </m:ctrlPr>
-                        </m:sSubPr>
-                        <m:e>
-                          <m:r>
-                            <a:rPr lang="en-US" sz="2400" b="1" i="1" smtClean="0">
-                              <a:latin typeface="Cambria Math" panose="02040503050406030204" pitchFamily="18" charset="0"/>
-                            </a:rPr>
-                            <m:t>𝑰</m:t>
-                          </m:r>
-                        </m:e>
-                        <m:sub>
-                          <m:r>
-                            <a:rPr lang="en-US" sz="2400" b="1" i="1" smtClean="0">
-                              <a:latin typeface="Cambria Math" panose="02040503050406030204" pitchFamily="18" charset="0"/>
-                            </a:rPr>
-                            <m:t>𝟐</m:t>
-                          </m:r>
-                        </m:sub>
-                      </m:sSub>
-                    </m:oMath>
-                  </m:oMathPara>
-                </a14:m>
-                <a:endParaRPr lang="en-US" sz="2400" b="1" dirty="0"/>
-              </a:p>
-            </p:txBody>
-          </p:sp>
-        </mc:Choice>
-        <mc:Fallback xmlns="">
-          <p:sp>
-            <p:nvSpPr>
-              <p:cNvPr id="48" name="TextBox 47">
-                <a:extLst>
-                  <a:ext uri="{FF2B5EF4-FFF2-40B4-BE49-F238E27FC236}">
-                    <a16:creationId xmlns:a16="http://schemas.microsoft.com/office/drawing/2014/main" id="{41D74258-15E1-7846-8456-512D77AB304D}"/>
-                  </a:ext>
-                </a:extLst>
-              </p:cNvPr>
-              <p:cNvSpPr txBox="1">
-                <a:spLocks noRot="1" noChangeAspect="1" noMove="1" noResize="1" noEditPoints="1" noAdjustHandles="1" noChangeArrowheads="1" noChangeShapeType="1" noTextEdit="1"/>
-              </p:cNvSpPr>
-              <p:nvPr/>
-            </p:nvSpPr>
-            <p:spPr>
-              <a:xfrm>
-                <a:off x="1459418" y="2056568"/>
-                <a:ext cx="535659" cy="461665"/>
-              </a:xfrm>
-              <a:prstGeom prst="rect">
-                <a:avLst/>
-              </a:prstGeom>
-              <a:blipFill>
-                <a:blip r:embed="rId6"/>
-                <a:stretch>
-                  <a:fillRect b="-2703"/>
-                </a:stretch>
-              </a:blipFill>
-            </p:spPr>
-            <p:txBody>
-              <a:bodyPr/>
-              <a:lstStyle/>
-              <a:p>
-                <a:r>
-                  <a:rPr lang="en-US">
-                    <a:noFill/>
-                  </a:rPr>
-                  <a:t> </a:t>
-                </a:r>
-              </a:p>
-            </p:txBody>
-          </p:sp>
-        </mc:Fallback>
-      </mc:AlternateContent>
-      <mc:AlternateContent xmlns:mc="http://schemas.openxmlformats.org/markup-compatibility/2006" xmlns:a14="http://schemas.microsoft.com/office/drawing/2010/main">
-        <mc:Choice Requires="a14">
-          <p:sp>
-            <p:nvSpPr>
-              <p:cNvPr id="49" name="TextBox 48">
-                <a:extLst>
-                  <a:ext uri="{FF2B5EF4-FFF2-40B4-BE49-F238E27FC236}">
-                    <a16:creationId xmlns:a16="http://schemas.microsoft.com/office/drawing/2014/main" id="{DC47A251-C09A-0849-A1A2-168F9BE58EE0}"/>
-                  </a:ext>
-                </a:extLst>
-              </p:cNvPr>
-              <p:cNvSpPr txBox="1"/>
-              <p:nvPr/>
-            </p:nvSpPr>
-            <p:spPr>
-              <a:xfrm rot="2183489">
-                <a:off x="531167" y="172347"/>
-                <a:ext cx="535659" cy="461665"/>
-              </a:xfrm>
-              <a:prstGeom prst="rect">
-                <a:avLst/>
-              </a:prstGeom>
-              <a:noFill/>
-            </p:spPr>
-            <p:txBody>
-              <a:bodyPr wrap="none" rtlCol="0">
-                <a:spAutoFit/>
-              </a:bodyPr>
-              <a:lstStyle/>
-              <a:p>
-                <a:pPr/>
-                <a14:m>
-                  <m:oMathPara xmlns:m="http://schemas.openxmlformats.org/officeDocument/2006/math">
-                    <m:oMathParaPr>
-                      <m:jc m:val="centerGroup"/>
-                    </m:oMathParaPr>
-                    <m:oMath xmlns:m="http://schemas.openxmlformats.org/officeDocument/2006/math">
-                      <m:sSub>
-                        <m:sSubPr>
-                          <m:ctrlPr>
-                            <a:rPr lang="en-US" sz="2400" b="1" i="1" smtClean="0">
-                              <a:latin typeface="Cambria Math" panose="02040503050406030204" pitchFamily="18" charset="0"/>
-                            </a:rPr>
-                          </m:ctrlPr>
-                        </m:sSubPr>
-                        <m:e>
-                          <m:r>
-                            <a:rPr lang="en-US" sz="2400" b="1" i="1" smtClean="0">
-                              <a:latin typeface="Cambria Math" panose="02040503050406030204" pitchFamily="18" charset="0"/>
-                            </a:rPr>
-                            <m:t>𝑰</m:t>
-                          </m:r>
-                        </m:e>
-                        <m:sub>
-                          <m:r>
-                            <a:rPr lang="en-US" sz="2400" b="1" i="1" smtClean="0">
-                              <a:latin typeface="Cambria Math" panose="02040503050406030204" pitchFamily="18" charset="0"/>
-                            </a:rPr>
-                            <m:t>𝟑</m:t>
-                          </m:r>
-                        </m:sub>
-                      </m:sSub>
-                    </m:oMath>
-                  </m:oMathPara>
-                </a14:m>
-                <a:endParaRPr lang="en-US" sz="2400" b="1" dirty="0"/>
-              </a:p>
-            </p:txBody>
-          </p:sp>
-        </mc:Choice>
-        <mc:Fallback xmlns="">
-          <p:sp>
-            <p:nvSpPr>
-              <p:cNvPr id="49" name="TextBox 48">
-                <a:extLst>
-                  <a:ext uri="{FF2B5EF4-FFF2-40B4-BE49-F238E27FC236}">
-                    <a16:creationId xmlns:a16="http://schemas.microsoft.com/office/drawing/2014/main" id="{DC47A251-C09A-0849-A1A2-168F9BE58EE0}"/>
-                  </a:ext>
-                </a:extLst>
-              </p:cNvPr>
-              <p:cNvSpPr txBox="1">
-                <a:spLocks noRot="1" noChangeAspect="1" noMove="1" noResize="1" noEditPoints="1" noAdjustHandles="1" noChangeArrowheads="1" noChangeShapeType="1" noTextEdit="1"/>
-              </p:cNvSpPr>
-              <p:nvPr/>
-            </p:nvSpPr>
-            <p:spPr>
-              <a:xfrm rot="2183489">
-                <a:off x="531167" y="172347"/>
-                <a:ext cx="535659" cy="461665"/>
-              </a:xfrm>
-              <a:prstGeom prst="rect">
-                <a:avLst/>
-              </a:prstGeom>
-              <a:blipFill>
-                <a:blip r:embed="rId7"/>
-                <a:stretch>
-                  <a:fillRect/>
-                </a:stretch>
-              </a:blipFill>
-            </p:spPr>
-            <p:txBody>
-              <a:bodyPr/>
-              <a:lstStyle/>
-              <a:p>
-                <a:r>
-                  <a:rPr lang="en-US">
-                    <a:noFill/>
-                  </a:rPr>
-                  <a:t> </a:t>
-                </a:r>
-              </a:p>
-            </p:txBody>
-          </p:sp>
-        </mc:Fallback>
-      </mc:AlternateContent>
-      <p:cxnSp>
-        <p:nvCxnSpPr>
-          <p:cNvPr id="51" name="Straight Arrow Connector 50">
-            <a:extLst>
-              <a:ext uri="{FF2B5EF4-FFF2-40B4-BE49-F238E27FC236}">
-                <a16:creationId xmlns:a16="http://schemas.microsoft.com/office/drawing/2014/main" id="{F5FD1473-FC5D-BA48-9AE6-9997C40BAD60}"/>
-              </a:ext>
-            </a:extLst>
-          </p:cNvPr>
-          <p:cNvCxnSpPr>
-            <a:cxnSpLocks/>
-          </p:cNvCxnSpPr>
-          <p:nvPr/>
-        </p:nvCxnSpPr>
-        <p:spPr>
-          <a:xfrm>
-            <a:off x="4420466" y="2663642"/>
-            <a:ext cx="0" cy="1242035"/>
-          </a:xfrm>
-          <a:prstGeom prst="straightConnector1">
-            <a:avLst/>
-          </a:prstGeom>
-          <a:ln w="63500">
-            <a:tailEnd type="triangle"/>
-          </a:ln>
-        </p:spPr>
-        <p:style>
-          <a:lnRef idx="1">
-            <a:schemeClr val="accent1"/>
-          </a:lnRef>
-          <a:fillRef idx="0">
-            <a:schemeClr val="accent1"/>
-          </a:fillRef>
-          <a:effectRef idx="0">
-            <a:schemeClr val="accent1"/>
-          </a:effectRef>
-          <a:fontRef idx="minor">
-            <a:schemeClr val="tx1"/>
-          </a:fontRef>
-        </p:style>
-      </p:cxnSp>
-      <p:cxnSp>
-        <p:nvCxnSpPr>
-          <p:cNvPr id="53" name="Straight Arrow Connector 52">
-            <a:extLst>
-              <a:ext uri="{FF2B5EF4-FFF2-40B4-BE49-F238E27FC236}">
-                <a16:creationId xmlns:a16="http://schemas.microsoft.com/office/drawing/2014/main" id="{923325C6-8DAF-B64C-901F-119F5739F473}"/>
-              </a:ext>
-            </a:extLst>
-          </p:cNvPr>
-          <p:cNvCxnSpPr>
-            <a:cxnSpLocks/>
-          </p:cNvCxnSpPr>
-          <p:nvPr/>
-        </p:nvCxnSpPr>
-        <p:spPr>
-          <a:xfrm>
-            <a:off x="7520517" y="2642925"/>
-            <a:ext cx="0" cy="1242035"/>
-          </a:xfrm>
-          <a:prstGeom prst="straightConnector1">
-            <a:avLst/>
-          </a:prstGeom>
-          <a:ln w="63500">
-            <a:tailEnd type="triangle"/>
-          </a:ln>
-        </p:spPr>
-        <p:style>
-          <a:lnRef idx="1">
-            <a:schemeClr val="accent1"/>
-          </a:lnRef>
-          <a:fillRef idx="0">
-            <a:schemeClr val="accent1"/>
-          </a:fillRef>
-          <a:effectRef idx="0">
-            <a:schemeClr val="accent1"/>
-          </a:effectRef>
-          <a:fontRef idx="minor">
-            <a:schemeClr val="tx1"/>
-          </a:fontRef>
-        </p:style>
-      </p:cxnSp>
-      <p:cxnSp>
-        <p:nvCxnSpPr>
-          <p:cNvPr id="54" name="Straight Arrow Connector 53">
-            <a:extLst>
-              <a:ext uri="{FF2B5EF4-FFF2-40B4-BE49-F238E27FC236}">
-                <a16:creationId xmlns:a16="http://schemas.microsoft.com/office/drawing/2014/main" id="{8D4F495E-2CB5-7842-96F2-6CA0E7AD2E20}"/>
-              </a:ext>
-            </a:extLst>
-          </p:cNvPr>
-          <p:cNvCxnSpPr>
-            <a:cxnSpLocks/>
-          </p:cNvCxnSpPr>
-          <p:nvPr/>
-        </p:nvCxnSpPr>
-        <p:spPr>
-          <a:xfrm>
-            <a:off x="11124673" y="2624784"/>
-            <a:ext cx="0" cy="1242035"/>
-          </a:xfrm>
-          <a:prstGeom prst="straightConnector1">
-            <a:avLst/>
-          </a:prstGeom>
-          <a:ln w="63500">
-            <a:tailEnd type="triangle"/>
-          </a:ln>
-        </p:spPr>
-        <p:style>
-          <a:lnRef idx="1">
-            <a:schemeClr val="accent1"/>
-          </a:lnRef>
-          <a:fillRef idx="0">
-            <a:schemeClr val="accent1"/>
-          </a:fillRef>
-          <a:effectRef idx="0">
-            <a:schemeClr val="accent1"/>
-          </a:effectRef>
-          <a:fontRef idx="minor">
-            <a:schemeClr val="tx1"/>
-          </a:fontRef>
-        </p:style>
-      </p:cxnSp>
-      <p:sp>
-        <p:nvSpPr>
-          <p:cNvPr id="55" name="Rectangle 54">
-            <a:extLst>
-              <a:ext uri="{FF2B5EF4-FFF2-40B4-BE49-F238E27FC236}">
-                <a16:creationId xmlns:a16="http://schemas.microsoft.com/office/drawing/2014/main" id="{FB45C652-363E-AD4B-A3DE-F6BA960A3A70}"/>
-              </a:ext>
-            </a:extLst>
-          </p:cNvPr>
-          <p:cNvSpPr/>
-          <p:nvPr/>
-        </p:nvSpPr>
-        <p:spPr>
-          <a:xfrm>
-            <a:off x="8537961" y="3772915"/>
-            <a:ext cx="857345" cy="1077218"/>
-          </a:xfrm>
-          <a:prstGeom prst="rect">
-            <a:avLst/>
-          </a:prstGeom>
-        </p:spPr>
-        <p:txBody>
-          <a:bodyPr wrap="square">
-            <a:spAutoFit/>
-          </a:bodyPr>
-          <a:lstStyle/>
-          <a:p>
-            <a:r>
-              <a:rPr lang="en-US" sz="6400" dirty="0"/>
-              <a:t>+</a:t>
-            </a:r>
-          </a:p>
-        </p:txBody>
-      </p:sp>
-      <p:sp>
-        <p:nvSpPr>
-          <p:cNvPr id="56" name="Rectangle 55">
-            <a:extLst>
-              <a:ext uri="{FF2B5EF4-FFF2-40B4-BE49-F238E27FC236}">
-                <a16:creationId xmlns:a16="http://schemas.microsoft.com/office/drawing/2014/main" id="{5B2904FA-F041-0D4B-94E4-00863C154020}"/>
-              </a:ext>
-            </a:extLst>
-          </p:cNvPr>
-          <p:cNvSpPr/>
-          <p:nvPr/>
-        </p:nvSpPr>
-        <p:spPr>
-          <a:xfrm>
-            <a:off x="8275540" y="1836208"/>
-            <a:ext cx="857345" cy="1077218"/>
-          </a:xfrm>
-          <a:prstGeom prst="rect">
-            <a:avLst/>
-          </a:prstGeom>
-        </p:spPr>
-        <p:txBody>
-          <a:bodyPr wrap="square">
-            <a:spAutoFit/>
-          </a:bodyPr>
-          <a:lstStyle/>
-          <a:p>
-            <a:r>
-              <a:rPr lang="en-US" sz="6400" dirty="0"/>
-              <a:t>+</a:t>
-            </a:r>
-          </a:p>
-        </p:txBody>
-      </p:sp>
-      <p:sp>
-        <p:nvSpPr>
-          <p:cNvPr id="2" name="TextBox 1">
-            <a:extLst>
-              <a:ext uri="{FF2B5EF4-FFF2-40B4-BE49-F238E27FC236}">
-                <a16:creationId xmlns:a16="http://schemas.microsoft.com/office/drawing/2014/main" id="{20798E0D-9B05-B845-8D6D-E92A0EB0099E}"/>
-              </a:ext>
-            </a:extLst>
-          </p:cNvPr>
-          <p:cNvSpPr txBox="1"/>
-          <p:nvPr/>
-        </p:nvSpPr>
-        <p:spPr>
-          <a:xfrm>
-            <a:off x="2264769" y="191720"/>
-            <a:ext cx="1148180" cy="1200329"/>
-          </a:xfrm>
-          <a:prstGeom prst="rect">
-            <a:avLst/>
-          </a:prstGeom>
-          <a:noFill/>
-        </p:spPr>
-        <p:txBody>
-          <a:bodyPr wrap="square" rtlCol="0">
-            <a:spAutoFit/>
-          </a:bodyPr>
-          <a:lstStyle/>
-          <a:p>
-            <a:r>
-              <a:rPr lang="en-US" sz="2400" b="1" dirty="0"/>
-              <a:t>Low Rank Factors</a:t>
-            </a:r>
-          </a:p>
-        </p:txBody>
-      </p:sp>
-      <p:cxnSp>
-        <p:nvCxnSpPr>
-          <p:cNvPr id="15" name="Straight Arrow Connector 14">
-            <a:extLst>
-              <a:ext uri="{FF2B5EF4-FFF2-40B4-BE49-F238E27FC236}">
-                <a16:creationId xmlns:a16="http://schemas.microsoft.com/office/drawing/2014/main" id="{4A6127F0-6E97-BE43-900A-F9474F2F34EB}"/>
-              </a:ext>
-            </a:extLst>
-          </p:cNvPr>
-          <p:cNvCxnSpPr>
-            <a:cxnSpLocks/>
-            <a:stCxn id="31" idx="3"/>
-            <a:endCxn id="2" idx="1"/>
-          </p:cNvCxnSpPr>
-          <p:nvPr/>
-        </p:nvCxnSpPr>
-        <p:spPr>
-          <a:xfrm flipV="1">
-            <a:off x="1338025" y="791885"/>
-            <a:ext cx="926744" cy="128160"/>
-          </a:xfrm>
-          <a:prstGeom prst="straightConnector1">
-            <a:avLst/>
-          </a:prstGeom>
-          <a:ln w="38100">
-            <a:tailEnd type="triangle"/>
-          </a:ln>
-        </p:spPr>
-        <p:style>
-          <a:lnRef idx="1">
-            <a:schemeClr val="accent1"/>
-          </a:lnRef>
-          <a:fillRef idx="0">
-            <a:schemeClr val="accent1"/>
-          </a:fillRef>
-          <a:effectRef idx="0">
-            <a:schemeClr val="accent1"/>
-          </a:effectRef>
-          <a:fontRef idx="minor">
-            <a:schemeClr val="tx1"/>
-          </a:fontRef>
-        </p:style>
-      </p:cxnSp>
-      <p:cxnSp>
-        <p:nvCxnSpPr>
-          <p:cNvPr id="50" name="Straight Arrow Connector 49">
-            <a:extLst>
-              <a:ext uri="{FF2B5EF4-FFF2-40B4-BE49-F238E27FC236}">
-                <a16:creationId xmlns:a16="http://schemas.microsoft.com/office/drawing/2014/main" id="{878D664C-32E3-AF4B-BD7A-6CD94AA7C7E9}"/>
-              </a:ext>
-            </a:extLst>
-          </p:cNvPr>
-          <p:cNvCxnSpPr>
-            <a:cxnSpLocks/>
-            <a:stCxn id="30" idx="1"/>
-          </p:cNvCxnSpPr>
-          <p:nvPr/>
-        </p:nvCxnSpPr>
-        <p:spPr>
-          <a:xfrm flipV="1">
-            <a:off x="1731935" y="920045"/>
-            <a:ext cx="559341" cy="636362"/>
-          </a:xfrm>
-          <a:prstGeom prst="straightConnector1">
-            <a:avLst/>
-          </a:prstGeom>
-          <a:ln w="38100">
-            <a:tailEnd type="triangle"/>
-          </a:ln>
-        </p:spPr>
-        <p:style>
-          <a:lnRef idx="1">
-            <a:schemeClr val="accent1"/>
-          </a:lnRef>
-          <a:fillRef idx="0">
-            <a:schemeClr val="accent1"/>
-          </a:fillRef>
-          <a:effectRef idx="0">
-            <a:schemeClr val="accent1"/>
-          </a:effectRef>
-          <a:fontRef idx="minor">
-            <a:schemeClr val="tx1"/>
-          </a:fontRef>
-        </p:style>
-      </p:cxnSp>
     </p:spTree>
     <p:extLst>
       <p:ext uri="{BB962C8B-B14F-4D97-AF65-F5344CB8AC3E}">

</xml_diff>